<commit_message>
Updated slides for final deck 4.30
</commit_message>
<xml_diff>
--- a/Project 1 Div 101 Updated Slides.pptx
+++ b/Project 1 Div 101 Updated Slides.pptx
@@ -4,14 +4,30 @@
   <p:sldMasterIdLst>
     <p:sldMasterId id="2147483673" r:id="rId1"/>
   </p:sldMasterIdLst>
+  <p:notesMasterIdLst>
+    <p:notesMasterId r:id="rId22"/>
+  </p:notesMasterIdLst>
   <p:sldIdLst>
     <p:sldId id="257" r:id="rId2"/>
-    <p:sldId id="262" r:id="rId3"/>
-    <p:sldId id="263" r:id="rId4"/>
-    <p:sldId id="264" r:id="rId5"/>
-    <p:sldId id="265" r:id="rId6"/>
-    <p:sldId id="266" r:id="rId7"/>
-    <p:sldId id="267" r:id="rId8"/>
+    <p:sldId id="270" r:id="rId3"/>
+    <p:sldId id="262" r:id="rId4"/>
+    <p:sldId id="263" r:id="rId5"/>
+    <p:sldId id="264" r:id="rId6"/>
+    <p:sldId id="272" r:id="rId7"/>
+    <p:sldId id="274" r:id="rId8"/>
+    <p:sldId id="275" r:id="rId9"/>
+    <p:sldId id="276" r:id="rId10"/>
+    <p:sldId id="278" r:id="rId11"/>
+    <p:sldId id="277" r:id="rId12"/>
+    <p:sldId id="286" r:id="rId13"/>
+    <p:sldId id="281" r:id="rId14"/>
+    <p:sldId id="287" r:id="rId15"/>
+    <p:sldId id="279" r:id="rId16"/>
+    <p:sldId id="267" r:id="rId17"/>
+    <p:sldId id="282" r:id="rId18"/>
+    <p:sldId id="283" r:id="rId19"/>
+    <p:sldId id="284" r:id="rId20"/>
+    <p:sldId id="285" r:id="rId21"/>
   </p:sldIdLst>
   <p:sldSz cx="12192000" cy="6858000"/>
   <p:notesSz cx="6858000" cy="9144000"/>
@@ -118,12 +134,367 @@
 </p:presentation>
 </file>
 
+<file path=ppt/commentAuthors.xml><?xml version="1.0" encoding="utf-8"?>
+<p:cmAuthorLst xmlns:a="http://schemas.openxmlformats.org/drawingml/2006/main" xmlns:r="http://schemas.openxmlformats.org/officeDocument/2006/relationships" xmlns:p="http://schemas.openxmlformats.org/presentationml/2006/main">
+  <p:cmAuthor id="2" name="Author" initials="A" lastIdx="1" clrIdx="1"/>
+</p:cmAuthorLst>
+</file>
+
 <file path=ppt/revisionInfo.xml><?xml version="1.0" encoding="utf-8"?>
 <p1510:revInfo xmlns:a="http://schemas.openxmlformats.org/drawingml/2006/main" xmlns:r="http://schemas.openxmlformats.org/officeDocument/2006/relationships" xmlns:p1510="http://schemas.microsoft.com/office/powerpoint/2015/10/main">
   <p1510:revLst>
-    <p1510:client id="{FD2D1C58-4419-4CC0-B86D-C1542BBC3AE0}" v="9" dt="2020-02-04T19:06:39.097"/>
+    <p1510:client id="{FD2D1C58-4419-4CC0-B86D-C1542BBC3AE0}" v="296" dt="2020-02-04T21:27:57.361"/>
   </p1510:revLst>
 </p1510:revInfo>
+</file>
+
+<file path=ppt/notesMasters/notesMaster1.xml><?xml version="1.0" encoding="utf-8"?>
+<p:notesMaster xmlns:a="http://schemas.openxmlformats.org/drawingml/2006/main" xmlns:r="http://schemas.openxmlformats.org/officeDocument/2006/relationships" xmlns:p="http://schemas.openxmlformats.org/presentationml/2006/main">
+  <p:cSld>
+    <p:bg>
+      <p:bgRef idx="1001">
+        <a:schemeClr val="bg1"/>
+      </p:bgRef>
+    </p:bg>
+    <p:spTree>
+      <p:nvGrpSpPr>
+        <p:cNvPr id="1" name=""/>
+        <p:cNvGrpSpPr/>
+        <p:nvPr/>
+      </p:nvGrpSpPr>
+      <p:grpSpPr>
+        <a:xfrm>
+          <a:off x="0" y="0"/>
+          <a:ext cx="0" cy="0"/>
+          <a:chOff x="0" y="0"/>
+          <a:chExt cx="0" cy="0"/>
+        </a:xfrm>
+      </p:grpSpPr>
+      <p:sp>
+        <p:nvSpPr>
+          <p:cNvPr id="2" name="Header Placeholder 1"/>
+          <p:cNvSpPr>
+            <a:spLocks noGrp="1"/>
+          </p:cNvSpPr>
+          <p:nvPr>
+            <p:ph type="hdr" sz="quarter"/>
+          </p:nvPr>
+        </p:nvSpPr>
+        <p:spPr>
+          <a:xfrm>
+            <a:off x="0" y="0"/>
+            <a:ext cx="2971800" cy="458788"/>
+          </a:xfrm>
+          <a:prstGeom prst="rect">
+            <a:avLst/>
+          </a:prstGeom>
+        </p:spPr>
+        <p:txBody>
+          <a:bodyPr vert="horz" lIns="91440" tIns="45720" rIns="91440" bIns="45720" rtlCol="0"/>
+          <a:lstStyle>
+            <a:lvl1pPr algn="l">
+              <a:defRPr sz="1200"/>
+            </a:lvl1pPr>
+          </a:lstStyle>
+          <a:p>
+            <a:endParaRPr lang="en-US"/>
+          </a:p>
+        </p:txBody>
+      </p:sp>
+      <p:sp>
+        <p:nvSpPr>
+          <p:cNvPr id="3" name="Date Placeholder 2"/>
+          <p:cNvSpPr>
+            <a:spLocks noGrp="1"/>
+          </p:cNvSpPr>
+          <p:nvPr>
+            <p:ph type="dt" idx="1"/>
+          </p:nvPr>
+        </p:nvSpPr>
+        <p:spPr>
+          <a:xfrm>
+            <a:off x="3884613" y="0"/>
+            <a:ext cx="2971800" cy="458788"/>
+          </a:xfrm>
+          <a:prstGeom prst="rect">
+            <a:avLst/>
+          </a:prstGeom>
+        </p:spPr>
+        <p:txBody>
+          <a:bodyPr vert="horz" lIns="91440" tIns="45720" rIns="91440" bIns="45720" rtlCol="0"/>
+          <a:lstStyle>
+            <a:lvl1pPr algn="r">
+              <a:defRPr sz="1200"/>
+            </a:lvl1pPr>
+          </a:lstStyle>
+          <a:p>
+            <a:fld id="{FEA0BE6D-FEA5-4FFE-A5C7-7ACEF8A2EA06}" type="datetimeFigureOut">
+              <a:rPr lang="en-US" smtClean="0"/>
+              <a:t>2/4/2020</a:t>
+            </a:fld>
+            <a:endParaRPr lang="en-US"/>
+          </a:p>
+        </p:txBody>
+      </p:sp>
+      <p:sp>
+        <p:nvSpPr>
+          <p:cNvPr id="4" name="Slide Image Placeholder 3"/>
+          <p:cNvSpPr>
+            <a:spLocks noGrp="1" noRot="1" noChangeAspect="1"/>
+          </p:cNvSpPr>
+          <p:nvPr>
+            <p:ph type="sldImg" idx="2"/>
+          </p:nvPr>
+        </p:nvSpPr>
+        <p:spPr>
+          <a:xfrm>
+            <a:off x="685800" y="1143000"/>
+            <a:ext cx="5486400" cy="3086100"/>
+          </a:xfrm>
+          <a:prstGeom prst="rect">
+            <a:avLst/>
+          </a:prstGeom>
+          <a:noFill/>
+          <a:ln w="12700">
+            <a:solidFill>
+              <a:prstClr val="black"/>
+            </a:solidFill>
+          </a:ln>
+        </p:spPr>
+        <p:txBody>
+          <a:bodyPr vert="horz" lIns="91440" tIns="45720" rIns="91440" bIns="45720" rtlCol="0" anchor="ctr"/>
+          <a:lstStyle/>
+          <a:p>
+            <a:endParaRPr lang="en-US"/>
+          </a:p>
+        </p:txBody>
+      </p:sp>
+      <p:sp>
+        <p:nvSpPr>
+          <p:cNvPr id="5" name="Notes Placeholder 4"/>
+          <p:cNvSpPr>
+            <a:spLocks noGrp="1"/>
+          </p:cNvSpPr>
+          <p:nvPr>
+            <p:ph type="body" sz="quarter" idx="3"/>
+          </p:nvPr>
+        </p:nvSpPr>
+        <p:spPr>
+          <a:xfrm>
+            <a:off x="685800" y="4400550"/>
+            <a:ext cx="5486400" cy="3600450"/>
+          </a:xfrm>
+          <a:prstGeom prst="rect">
+            <a:avLst/>
+          </a:prstGeom>
+        </p:spPr>
+        <p:txBody>
+          <a:bodyPr vert="horz" lIns="91440" tIns="45720" rIns="91440" bIns="45720" rtlCol="0"/>
+          <a:lstStyle/>
+          <a:p>
+            <a:pPr lvl="0"/>
+            <a:r>
+              <a:rPr lang="en-US"/>
+              <a:t>Click to edit Master text styles</a:t>
+            </a:r>
+          </a:p>
+          <a:p>
+            <a:pPr lvl="1"/>
+            <a:r>
+              <a:rPr lang="en-US"/>
+              <a:t>Second level</a:t>
+            </a:r>
+          </a:p>
+          <a:p>
+            <a:pPr lvl="2"/>
+            <a:r>
+              <a:rPr lang="en-US"/>
+              <a:t>Third level</a:t>
+            </a:r>
+          </a:p>
+          <a:p>
+            <a:pPr lvl="3"/>
+            <a:r>
+              <a:rPr lang="en-US"/>
+              <a:t>Fourth level</a:t>
+            </a:r>
+          </a:p>
+          <a:p>
+            <a:pPr lvl="4"/>
+            <a:r>
+              <a:rPr lang="en-US"/>
+              <a:t>Fifth level</a:t>
+            </a:r>
+          </a:p>
+        </p:txBody>
+      </p:sp>
+      <p:sp>
+        <p:nvSpPr>
+          <p:cNvPr id="6" name="Footer Placeholder 5"/>
+          <p:cNvSpPr>
+            <a:spLocks noGrp="1"/>
+          </p:cNvSpPr>
+          <p:nvPr>
+            <p:ph type="ftr" sz="quarter" idx="4"/>
+          </p:nvPr>
+        </p:nvSpPr>
+        <p:spPr>
+          <a:xfrm>
+            <a:off x="0" y="8685213"/>
+            <a:ext cx="2971800" cy="458787"/>
+          </a:xfrm>
+          <a:prstGeom prst="rect">
+            <a:avLst/>
+          </a:prstGeom>
+        </p:spPr>
+        <p:txBody>
+          <a:bodyPr vert="horz" lIns="91440" tIns="45720" rIns="91440" bIns="45720" rtlCol="0" anchor="b"/>
+          <a:lstStyle>
+            <a:lvl1pPr algn="l">
+              <a:defRPr sz="1200"/>
+            </a:lvl1pPr>
+          </a:lstStyle>
+          <a:p>
+            <a:endParaRPr lang="en-US"/>
+          </a:p>
+        </p:txBody>
+      </p:sp>
+      <p:sp>
+        <p:nvSpPr>
+          <p:cNvPr id="7" name="Slide Number Placeholder 6"/>
+          <p:cNvSpPr>
+            <a:spLocks noGrp="1"/>
+          </p:cNvSpPr>
+          <p:nvPr>
+            <p:ph type="sldNum" sz="quarter" idx="5"/>
+          </p:nvPr>
+        </p:nvSpPr>
+        <p:spPr>
+          <a:xfrm>
+            <a:off x="3884613" y="8685213"/>
+            <a:ext cx="2971800" cy="458787"/>
+          </a:xfrm>
+          <a:prstGeom prst="rect">
+            <a:avLst/>
+          </a:prstGeom>
+        </p:spPr>
+        <p:txBody>
+          <a:bodyPr vert="horz" lIns="91440" tIns="45720" rIns="91440" bIns="45720" rtlCol="0" anchor="b"/>
+          <a:lstStyle>
+            <a:lvl1pPr algn="r">
+              <a:defRPr sz="1200"/>
+            </a:lvl1pPr>
+          </a:lstStyle>
+          <a:p>
+            <a:fld id="{851E61E6-743A-46BC-968B-E46C9AC33949}" type="slidenum">
+              <a:rPr lang="en-US" smtClean="0"/>
+              <a:t>‹#›</a:t>
+            </a:fld>
+            <a:endParaRPr lang="en-US"/>
+          </a:p>
+        </p:txBody>
+      </p:sp>
+    </p:spTree>
+    <p:extLst>
+      <p:ext uri="{BB962C8B-B14F-4D97-AF65-F5344CB8AC3E}">
+        <p14:creationId xmlns:p14="http://schemas.microsoft.com/office/powerpoint/2010/main" val="2730267977"/>
+      </p:ext>
+    </p:extLst>
+  </p:cSld>
+  <p:clrMap bg1="lt1" tx1="dk1" bg2="lt2" tx2="dk2" accent1="accent1" accent2="accent2" accent3="accent3" accent4="accent4" accent5="accent5" accent6="accent6" hlink="hlink" folHlink="folHlink"/>
+  <p:notesStyle>
+    <a:lvl1pPr marL="0" algn="l" defTabSz="914400" rtl="0" eaLnBrk="1" latinLnBrk="0" hangingPunct="1">
+      <a:defRPr sz="1200" kern="1200">
+        <a:solidFill>
+          <a:schemeClr val="tx1"/>
+        </a:solidFill>
+        <a:latin typeface="+mn-lt"/>
+        <a:ea typeface="+mn-ea"/>
+        <a:cs typeface="+mn-cs"/>
+      </a:defRPr>
+    </a:lvl1pPr>
+    <a:lvl2pPr marL="457200" algn="l" defTabSz="914400" rtl="0" eaLnBrk="1" latinLnBrk="0" hangingPunct="1">
+      <a:defRPr sz="1200" kern="1200">
+        <a:solidFill>
+          <a:schemeClr val="tx1"/>
+        </a:solidFill>
+        <a:latin typeface="+mn-lt"/>
+        <a:ea typeface="+mn-ea"/>
+        <a:cs typeface="+mn-cs"/>
+      </a:defRPr>
+    </a:lvl2pPr>
+    <a:lvl3pPr marL="914400" algn="l" defTabSz="914400" rtl="0" eaLnBrk="1" latinLnBrk="0" hangingPunct="1">
+      <a:defRPr sz="1200" kern="1200">
+        <a:solidFill>
+          <a:schemeClr val="tx1"/>
+        </a:solidFill>
+        <a:latin typeface="+mn-lt"/>
+        <a:ea typeface="+mn-ea"/>
+        <a:cs typeface="+mn-cs"/>
+      </a:defRPr>
+    </a:lvl3pPr>
+    <a:lvl4pPr marL="1371600" algn="l" defTabSz="914400" rtl="0" eaLnBrk="1" latinLnBrk="0" hangingPunct="1">
+      <a:defRPr sz="1200" kern="1200">
+        <a:solidFill>
+          <a:schemeClr val="tx1"/>
+        </a:solidFill>
+        <a:latin typeface="+mn-lt"/>
+        <a:ea typeface="+mn-ea"/>
+        <a:cs typeface="+mn-cs"/>
+      </a:defRPr>
+    </a:lvl4pPr>
+    <a:lvl5pPr marL="1828800" algn="l" defTabSz="914400" rtl="0" eaLnBrk="1" latinLnBrk="0" hangingPunct="1">
+      <a:defRPr sz="1200" kern="1200">
+        <a:solidFill>
+          <a:schemeClr val="tx1"/>
+        </a:solidFill>
+        <a:latin typeface="+mn-lt"/>
+        <a:ea typeface="+mn-ea"/>
+        <a:cs typeface="+mn-cs"/>
+      </a:defRPr>
+    </a:lvl5pPr>
+    <a:lvl6pPr marL="2286000" algn="l" defTabSz="914400" rtl="0" eaLnBrk="1" latinLnBrk="0" hangingPunct="1">
+      <a:defRPr sz="1200" kern="1200">
+        <a:solidFill>
+          <a:schemeClr val="tx1"/>
+        </a:solidFill>
+        <a:latin typeface="+mn-lt"/>
+        <a:ea typeface="+mn-ea"/>
+        <a:cs typeface="+mn-cs"/>
+      </a:defRPr>
+    </a:lvl6pPr>
+    <a:lvl7pPr marL="2743200" algn="l" defTabSz="914400" rtl="0" eaLnBrk="1" latinLnBrk="0" hangingPunct="1">
+      <a:defRPr sz="1200" kern="1200">
+        <a:solidFill>
+          <a:schemeClr val="tx1"/>
+        </a:solidFill>
+        <a:latin typeface="+mn-lt"/>
+        <a:ea typeface="+mn-ea"/>
+        <a:cs typeface="+mn-cs"/>
+      </a:defRPr>
+    </a:lvl7pPr>
+    <a:lvl8pPr marL="3200400" algn="l" defTabSz="914400" rtl="0" eaLnBrk="1" latinLnBrk="0" hangingPunct="1">
+      <a:defRPr sz="1200" kern="1200">
+        <a:solidFill>
+          <a:schemeClr val="tx1"/>
+        </a:solidFill>
+        <a:latin typeface="+mn-lt"/>
+        <a:ea typeface="+mn-ea"/>
+        <a:cs typeface="+mn-cs"/>
+      </a:defRPr>
+    </a:lvl8pPr>
+    <a:lvl9pPr marL="3657600" algn="l" defTabSz="914400" rtl="0" eaLnBrk="1" latinLnBrk="0" hangingPunct="1">
+      <a:defRPr sz="1200" kern="1200">
+        <a:solidFill>
+          <a:schemeClr val="tx1"/>
+        </a:solidFill>
+        <a:latin typeface="+mn-lt"/>
+        <a:ea typeface="+mn-ea"/>
+        <a:cs typeface="+mn-cs"/>
+      </a:defRPr>
+    </a:lvl9pPr>
+  </p:notesStyle>
+</p:notesMaster>
 </file>
 
 <file path=ppt/slideLayouts/slideLayout1.xml><?xml version="1.0" encoding="utf-8"?>
@@ -4934,6 +5305,2216 @@
 </p:sld>
 </file>
 
+<file path=ppt/slides/slide10.xml><?xml version="1.0" encoding="utf-8"?>
+<p:sld xmlns:a="http://schemas.openxmlformats.org/drawingml/2006/main" xmlns:r="http://schemas.openxmlformats.org/officeDocument/2006/relationships" xmlns:p="http://schemas.openxmlformats.org/presentationml/2006/main">
+  <p:cSld>
+    <p:spTree>
+      <p:nvGrpSpPr>
+        <p:cNvPr id="1" name=""/>
+        <p:cNvGrpSpPr/>
+        <p:nvPr/>
+      </p:nvGrpSpPr>
+      <p:grpSpPr>
+        <a:xfrm>
+          <a:off x="0" y="0"/>
+          <a:ext cx="0" cy="0"/>
+          <a:chOff x="0" y="0"/>
+          <a:chExt cx="0" cy="0"/>
+        </a:xfrm>
+      </p:grpSpPr>
+      <p:sp>
+        <p:nvSpPr>
+          <p:cNvPr id="2" name="Title 1">
+            <a:extLst>
+              <a:ext uri="{FF2B5EF4-FFF2-40B4-BE49-F238E27FC236}">
+                <a16:creationId xmlns:a16="http://schemas.microsoft.com/office/drawing/2014/main" id="{80424138-66F7-4170-87EC-2D22214AAA7E}"/>
+              </a:ext>
+            </a:extLst>
+          </p:cNvPr>
+          <p:cNvSpPr>
+            <a:spLocks noGrp="1"/>
+          </p:cNvSpPr>
+          <p:nvPr>
+            <p:ph type="title"/>
+          </p:nvPr>
+        </p:nvSpPr>
+        <p:spPr/>
+        <p:txBody>
+          <a:bodyPr/>
+          <a:lstStyle/>
+          <a:p>
+            <a:r>
+              <a:rPr lang="en-US" dirty="0"/>
+              <a:t>Hold for </a:t>
+            </a:r>
+            <a:r>
+              <a:rPr lang="en-US" dirty="0" err="1"/>
+              <a:t>Yannik</a:t>
+            </a:r>
+            <a:r>
+              <a:rPr lang="en-US" dirty="0"/>
+              <a:t> Slides (Population Growth)</a:t>
+            </a:r>
+          </a:p>
+        </p:txBody>
+      </p:sp>
+      <p:sp>
+        <p:nvSpPr>
+          <p:cNvPr id="3" name="Content Placeholder 2">
+            <a:extLst>
+              <a:ext uri="{FF2B5EF4-FFF2-40B4-BE49-F238E27FC236}">
+                <a16:creationId xmlns:a16="http://schemas.microsoft.com/office/drawing/2014/main" id="{C6FF12C0-6FE2-45DE-8176-662DBDFD9565}"/>
+              </a:ext>
+            </a:extLst>
+          </p:cNvPr>
+          <p:cNvSpPr>
+            <a:spLocks noGrp="1"/>
+          </p:cNvSpPr>
+          <p:nvPr>
+            <p:ph idx="1"/>
+          </p:nvPr>
+        </p:nvSpPr>
+        <p:spPr/>
+        <p:txBody>
+          <a:bodyPr/>
+          <a:lstStyle/>
+          <a:p>
+            <a:endParaRPr lang="en-US"/>
+          </a:p>
+        </p:txBody>
+      </p:sp>
+    </p:spTree>
+    <p:extLst>
+      <p:ext uri="{BB962C8B-B14F-4D97-AF65-F5344CB8AC3E}">
+        <p14:creationId xmlns:p14="http://schemas.microsoft.com/office/powerpoint/2010/main" val="1312312425"/>
+      </p:ext>
+    </p:extLst>
+  </p:cSld>
+  <p:clrMapOvr>
+    <a:masterClrMapping/>
+  </p:clrMapOvr>
+</p:sld>
+</file>
+
+<file path=ppt/slides/slide11.xml><?xml version="1.0" encoding="utf-8"?>
+<p:sld xmlns:a="http://schemas.openxmlformats.org/drawingml/2006/main" xmlns:r="http://schemas.openxmlformats.org/officeDocument/2006/relationships" xmlns:p="http://schemas.openxmlformats.org/presentationml/2006/main">
+  <p:cSld>
+    <p:spTree>
+      <p:nvGrpSpPr>
+        <p:cNvPr id="1" name=""/>
+        <p:cNvGrpSpPr/>
+        <p:nvPr/>
+      </p:nvGrpSpPr>
+      <p:grpSpPr>
+        <a:xfrm>
+          <a:off x="0" y="0"/>
+          <a:ext cx="0" cy="0"/>
+          <a:chOff x="0" y="0"/>
+          <a:chExt cx="0" cy="0"/>
+        </a:xfrm>
+      </p:grpSpPr>
+      <p:sp>
+        <p:nvSpPr>
+          <p:cNvPr id="2" name="Title 1">
+            <a:extLst>
+              <a:ext uri="{FF2B5EF4-FFF2-40B4-BE49-F238E27FC236}">
+                <a16:creationId xmlns:a16="http://schemas.microsoft.com/office/drawing/2014/main" id="{737F0781-F9D8-4B95-A554-A082FD9AB1B4}"/>
+              </a:ext>
+            </a:extLst>
+          </p:cNvPr>
+          <p:cNvSpPr>
+            <a:spLocks noGrp="1"/>
+          </p:cNvSpPr>
+          <p:nvPr>
+            <p:ph type="title"/>
+          </p:nvPr>
+        </p:nvSpPr>
+        <p:spPr/>
+        <p:txBody>
+          <a:bodyPr/>
+          <a:lstStyle/>
+          <a:p>
+            <a:r>
+              <a:rPr lang="en-US" dirty="0"/>
+              <a:t>Does Poverty Rate Impact Home Price?</a:t>
+            </a:r>
+          </a:p>
+        </p:txBody>
+      </p:sp>
+      <p:pic>
+        <p:nvPicPr>
+          <p:cNvPr id="7174" name="Picture 6">
+            <a:extLst>
+              <a:ext uri="{FF2B5EF4-FFF2-40B4-BE49-F238E27FC236}">
+                <a16:creationId xmlns:a16="http://schemas.microsoft.com/office/drawing/2014/main" id="{34F8770E-A483-4123-A1F9-E02C8EB93E61}"/>
+              </a:ext>
+            </a:extLst>
+          </p:cNvPr>
+          <p:cNvPicPr>
+            <a:picLocks noChangeAspect="1" noChangeArrowheads="1"/>
+          </p:cNvPicPr>
+          <p:nvPr/>
+        </p:nvPicPr>
+        <p:blipFill>
+          <a:blip r:embed="rId2">
+            <a:extLst>
+              <a:ext uri="{28A0092B-C50C-407E-A947-70E740481C1C}">
+                <a14:useLocalDpi xmlns:a14="http://schemas.microsoft.com/office/drawing/2010/main" val="0"/>
+              </a:ext>
+            </a:extLst>
+          </a:blip>
+          <a:srcRect/>
+          <a:stretch>
+            <a:fillRect/>
+          </a:stretch>
+        </p:blipFill>
+        <p:spPr bwMode="auto">
+          <a:xfrm>
+            <a:off x="9086508" y="2474907"/>
+            <a:ext cx="2737724" cy="2737724"/>
+          </a:xfrm>
+          <a:prstGeom prst="rect">
+            <a:avLst/>
+          </a:prstGeom>
+          <a:noFill/>
+          <a:extLst>
+            <a:ext uri="{909E8E84-426E-40DD-AFC4-6F175D3DCCD1}">
+              <a14:hiddenFill xmlns:a14="http://schemas.microsoft.com/office/drawing/2010/main">
+                <a:solidFill>
+                  <a:srgbClr val="FFFFFF"/>
+                </a:solidFill>
+              </a14:hiddenFill>
+            </a:ext>
+          </a:extLst>
+        </p:spPr>
+      </p:pic>
+      <p:pic>
+        <p:nvPicPr>
+          <p:cNvPr id="7176" name="Picture 8">
+            <a:extLst>
+              <a:ext uri="{FF2B5EF4-FFF2-40B4-BE49-F238E27FC236}">
+                <a16:creationId xmlns:a16="http://schemas.microsoft.com/office/drawing/2014/main" id="{315406DA-CA0C-4684-8808-8220F1618DB3}"/>
+              </a:ext>
+            </a:extLst>
+          </p:cNvPr>
+          <p:cNvPicPr>
+            <a:picLocks noChangeAspect="1" noChangeArrowheads="1"/>
+          </p:cNvPicPr>
+          <p:nvPr/>
+        </p:nvPicPr>
+        <p:blipFill>
+          <a:blip r:embed="rId3">
+            <a:extLst>
+              <a:ext uri="{28A0092B-C50C-407E-A947-70E740481C1C}">
+                <a14:useLocalDpi xmlns:a14="http://schemas.microsoft.com/office/drawing/2010/main" val="0"/>
+              </a:ext>
+            </a:extLst>
+          </a:blip>
+          <a:srcRect/>
+          <a:stretch>
+            <a:fillRect/>
+          </a:stretch>
+        </p:blipFill>
+        <p:spPr bwMode="auto">
+          <a:xfrm>
+            <a:off x="6155091" y="2474907"/>
+            <a:ext cx="2737724" cy="2737724"/>
+          </a:xfrm>
+          <a:prstGeom prst="rect">
+            <a:avLst/>
+          </a:prstGeom>
+          <a:noFill/>
+          <a:extLst>
+            <a:ext uri="{909E8E84-426E-40DD-AFC4-6F175D3DCCD1}">
+              <a14:hiddenFill xmlns:a14="http://schemas.microsoft.com/office/drawing/2010/main">
+                <a:solidFill>
+                  <a:srgbClr val="FFFFFF"/>
+                </a:solidFill>
+              </a14:hiddenFill>
+            </a:ext>
+          </a:extLst>
+        </p:spPr>
+      </p:pic>
+      <p:pic>
+        <p:nvPicPr>
+          <p:cNvPr id="7178" name="Picture 10">
+            <a:extLst>
+              <a:ext uri="{FF2B5EF4-FFF2-40B4-BE49-F238E27FC236}">
+                <a16:creationId xmlns:a16="http://schemas.microsoft.com/office/drawing/2014/main" id="{00DB5FBB-840C-4651-B15D-5F5C8B2D9756}"/>
+              </a:ext>
+            </a:extLst>
+          </p:cNvPr>
+          <p:cNvPicPr>
+            <a:picLocks noChangeAspect="1" noChangeArrowheads="1"/>
+          </p:cNvPicPr>
+          <p:nvPr/>
+        </p:nvPicPr>
+        <p:blipFill>
+          <a:blip r:embed="rId4">
+            <a:extLst>
+              <a:ext uri="{28A0092B-C50C-407E-A947-70E740481C1C}">
+                <a14:useLocalDpi xmlns:a14="http://schemas.microsoft.com/office/drawing/2010/main" val="0"/>
+              </a:ext>
+            </a:extLst>
+          </a:blip>
+          <a:srcRect/>
+          <a:stretch>
+            <a:fillRect/>
+          </a:stretch>
+        </p:blipFill>
+        <p:spPr bwMode="auto">
+          <a:xfrm>
+            <a:off x="3267479" y="2474908"/>
+            <a:ext cx="2737723" cy="2737723"/>
+          </a:xfrm>
+          <a:prstGeom prst="rect">
+            <a:avLst/>
+          </a:prstGeom>
+          <a:noFill/>
+          <a:extLst>
+            <a:ext uri="{909E8E84-426E-40DD-AFC4-6F175D3DCCD1}">
+              <a14:hiddenFill xmlns:a14="http://schemas.microsoft.com/office/drawing/2010/main">
+                <a:solidFill>
+                  <a:srgbClr val="FFFFFF"/>
+                </a:solidFill>
+              </a14:hiddenFill>
+            </a:ext>
+          </a:extLst>
+        </p:spPr>
+      </p:pic>
+      <p:pic>
+        <p:nvPicPr>
+          <p:cNvPr id="7180" name="Picture 12">
+            <a:extLst>
+              <a:ext uri="{FF2B5EF4-FFF2-40B4-BE49-F238E27FC236}">
+                <a16:creationId xmlns:a16="http://schemas.microsoft.com/office/drawing/2014/main" id="{4DA0EA7E-1C91-4230-BF76-167A20DC20DF}"/>
+              </a:ext>
+            </a:extLst>
+          </p:cNvPr>
+          <p:cNvPicPr>
+            <a:picLocks noChangeAspect="1" noChangeArrowheads="1"/>
+          </p:cNvPicPr>
+          <p:nvPr/>
+        </p:nvPicPr>
+        <p:blipFill>
+          <a:blip r:embed="rId5">
+            <a:extLst>
+              <a:ext uri="{28A0092B-C50C-407E-A947-70E740481C1C}">
+                <a14:useLocalDpi xmlns:a14="http://schemas.microsoft.com/office/drawing/2010/main" val="0"/>
+              </a:ext>
+            </a:extLst>
+          </a:blip>
+          <a:srcRect/>
+          <a:stretch>
+            <a:fillRect/>
+          </a:stretch>
+        </p:blipFill>
+        <p:spPr bwMode="auto">
+          <a:xfrm>
+            <a:off x="400619" y="2474908"/>
+            <a:ext cx="2737724" cy="2737724"/>
+          </a:xfrm>
+          <a:prstGeom prst="rect">
+            <a:avLst/>
+          </a:prstGeom>
+          <a:noFill/>
+          <a:extLst>
+            <a:ext uri="{909E8E84-426E-40DD-AFC4-6F175D3DCCD1}">
+              <a14:hiddenFill xmlns:a14="http://schemas.microsoft.com/office/drawing/2010/main">
+                <a:solidFill>
+                  <a:srgbClr val="FFFFFF"/>
+                </a:solidFill>
+              </a14:hiddenFill>
+            </a:ext>
+          </a:extLst>
+        </p:spPr>
+      </p:pic>
+      <p:sp>
+        <p:nvSpPr>
+          <p:cNvPr id="10" name="TextBox 9">
+            <a:extLst>
+              <a:ext uri="{FF2B5EF4-FFF2-40B4-BE49-F238E27FC236}">
+                <a16:creationId xmlns:a16="http://schemas.microsoft.com/office/drawing/2014/main" id="{0D29C158-19A2-4F58-8609-AF2096620483}"/>
+              </a:ext>
+            </a:extLst>
+          </p:cNvPr>
+          <p:cNvSpPr txBox="1"/>
+          <p:nvPr/>
+        </p:nvSpPr>
+        <p:spPr>
+          <a:xfrm>
+            <a:off x="1271217" y="5573233"/>
+            <a:ext cx="9853983" cy="369332"/>
+          </a:xfrm>
+          <a:prstGeom prst="rect">
+            <a:avLst/>
+          </a:prstGeom>
+          <a:solidFill>
+            <a:schemeClr val="tx1">
+              <a:lumMod val="65000"/>
+              <a:lumOff val="35000"/>
+            </a:schemeClr>
+          </a:solidFill>
+        </p:spPr>
+        <p:txBody>
+          <a:bodyPr wrap="square" rtlCol="0">
+            <a:spAutoFit/>
+          </a:bodyPr>
+          <a:lstStyle/>
+          <a:p>
+            <a:pPr algn="ctr"/>
+            <a:r>
+              <a:rPr lang="en-US" dirty="0">
+                <a:solidFill>
+                  <a:schemeClr val="bg1"/>
+                </a:solidFill>
+              </a:rPr>
+              <a:t>Takeaway: Median home price increases across years when the poverty rate increases</a:t>
+            </a:r>
+          </a:p>
+        </p:txBody>
+      </p:sp>
+      <p:sp>
+        <p:nvSpPr>
+          <p:cNvPr id="11" name="Footer Placeholder 3">
+            <a:extLst>
+              <a:ext uri="{FF2B5EF4-FFF2-40B4-BE49-F238E27FC236}">
+                <a16:creationId xmlns:a16="http://schemas.microsoft.com/office/drawing/2014/main" id="{3C750B37-1312-493D-B453-CFB28601C81B}"/>
+              </a:ext>
+            </a:extLst>
+          </p:cNvPr>
+          <p:cNvSpPr>
+            <a:spLocks noGrp="1"/>
+          </p:cNvSpPr>
+          <p:nvPr>
+            <p:ph type="ftr" sz="quarter" idx="11"/>
+          </p:nvPr>
+        </p:nvSpPr>
+        <p:spPr>
+          <a:xfrm>
+            <a:off x="1066800" y="6035040"/>
+            <a:ext cx="5816600" cy="365760"/>
+          </a:xfrm>
+        </p:spPr>
+        <p:txBody>
+          <a:bodyPr/>
+          <a:lstStyle/>
+          <a:p>
+            <a:r>
+              <a:rPr lang="en-US" dirty="0"/>
+              <a:t>Zillow Research Data, Census API Data</a:t>
+            </a:r>
+          </a:p>
+        </p:txBody>
+      </p:sp>
+      <p:sp>
+        <p:nvSpPr>
+          <p:cNvPr id="12" name="TextBox 11">
+            <a:extLst>
+              <a:ext uri="{FF2B5EF4-FFF2-40B4-BE49-F238E27FC236}">
+                <a16:creationId xmlns:a16="http://schemas.microsoft.com/office/drawing/2014/main" id="{16F0F219-CDCB-41AA-90E5-0143869F9A24}"/>
+              </a:ext>
+            </a:extLst>
+          </p:cNvPr>
+          <p:cNvSpPr txBox="1"/>
+          <p:nvPr/>
+        </p:nvSpPr>
+        <p:spPr>
+          <a:xfrm>
+            <a:off x="832723" y="1948031"/>
+            <a:ext cx="1873516" cy="369332"/>
+          </a:xfrm>
+          <a:prstGeom prst="rect">
+            <a:avLst/>
+          </a:prstGeom>
+          <a:solidFill>
+            <a:schemeClr val="tx1">
+              <a:lumMod val="65000"/>
+              <a:lumOff val="35000"/>
+            </a:schemeClr>
+          </a:solidFill>
+        </p:spPr>
+        <p:txBody>
+          <a:bodyPr wrap="square" rtlCol="0">
+            <a:spAutoFit/>
+          </a:bodyPr>
+          <a:lstStyle/>
+          <a:p>
+            <a:pPr algn="ctr"/>
+            <a:r>
+              <a:rPr lang="en-US" dirty="0">
+                <a:solidFill>
+                  <a:schemeClr val="bg1"/>
+                </a:solidFill>
+              </a:rPr>
+              <a:t>2015</a:t>
+            </a:r>
+          </a:p>
+        </p:txBody>
+      </p:sp>
+      <p:sp>
+        <p:nvSpPr>
+          <p:cNvPr id="13" name="TextBox 12">
+            <a:extLst>
+              <a:ext uri="{FF2B5EF4-FFF2-40B4-BE49-F238E27FC236}">
+                <a16:creationId xmlns:a16="http://schemas.microsoft.com/office/drawing/2014/main" id="{07FD693C-8911-43FE-8B3D-2364366B520D}"/>
+              </a:ext>
+            </a:extLst>
+          </p:cNvPr>
+          <p:cNvSpPr txBox="1"/>
+          <p:nvPr/>
+        </p:nvSpPr>
+        <p:spPr>
+          <a:xfrm>
+            <a:off x="3699582" y="1948031"/>
+            <a:ext cx="1873516" cy="369332"/>
+          </a:xfrm>
+          <a:prstGeom prst="rect">
+            <a:avLst/>
+          </a:prstGeom>
+          <a:solidFill>
+            <a:schemeClr val="tx1">
+              <a:lumMod val="65000"/>
+              <a:lumOff val="35000"/>
+            </a:schemeClr>
+          </a:solidFill>
+        </p:spPr>
+        <p:txBody>
+          <a:bodyPr wrap="square" rtlCol="0">
+            <a:spAutoFit/>
+          </a:bodyPr>
+          <a:lstStyle/>
+          <a:p>
+            <a:pPr algn="ctr"/>
+            <a:r>
+              <a:rPr lang="en-US" dirty="0">
+                <a:solidFill>
+                  <a:schemeClr val="bg1"/>
+                </a:solidFill>
+              </a:rPr>
+              <a:t>2016</a:t>
+            </a:r>
+          </a:p>
+        </p:txBody>
+      </p:sp>
+      <p:sp>
+        <p:nvSpPr>
+          <p:cNvPr id="14" name="TextBox 13">
+            <a:extLst>
+              <a:ext uri="{FF2B5EF4-FFF2-40B4-BE49-F238E27FC236}">
+                <a16:creationId xmlns:a16="http://schemas.microsoft.com/office/drawing/2014/main" id="{01AC2F9C-B4DE-4480-B02D-33FE67E67EC6}"/>
+              </a:ext>
+            </a:extLst>
+          </p:cNvPr>
+          <p:cNvSpPr txBox="1"/>
+          <p:nvPr/>
+        </p:nvSpPr>
+        <p:spPr>
+          <a:xfrm>
+            <a:off x="6618904" y="1948031"/>
+            <a:ext cx="1873516" cy="369332"/>
+          </a:xfrm>
+          <a:prstGeom prst="rect">
+            <a:avLst/>
+          </a:prstGeom>
+          <a:solidFill>
+            <a:schemeClr val="tx1">
+              <a:lumMod val="65000"/>
+              <a:lumOff val="35000"/>
+            </a:schemeClr>
+          </a:solidFill>
+        </p:spPr>
+        <p:txBody>
+          <a:bodyPr wrap="square" rtlCol="0">
+            <a:spAutoFit/>
+          </a:bodyPr>
+          <a:lstStyle/>
+          <a:p>
+            <a:pPr algn="ctr"/>
+            <a:r>
+              <a:rPr lang="en-US" dirty="0">
+                <a:solidFill>
+                  <a:schemeClr val="bg1"/>
+                </a:solidFill>
+              </a:rPr>
+              <a:t>2017</a:t>
+            </a:r>
+          </a:p>
+        </p:txBody>
+      </p:sp>
+      <p:sp>
+        <p:nvSpPr>
+          <p:cNvPr id="15" name="TextBox 14">
+            <a:extLst>
+              <a:ext uri="{FF2B5EF4-FFF2-40B4-BE49-F238E27FC236}">
+                <a16:creationId xmlns:a16="http://schemas.microsoft.com/office/drawing/2014/main" id="{B6E8AF94-3096-4EA7-99C1-3291401B5D51}"/>
+              </a:ext>
+            </a:extLst>
+          </p:cNvPr>
+          <p:cNvSpPr txBox="1"/>
+          <p:nvPr/>
+        </p:nvSpPr>
+        <p:spPr>
+          <a:xfrm>
+            <a:off x="9631316" y="1948031"/>
+            <a:ext cx="1873516" cy="369332"/>
+          </a:xfrm>
+          <a:prstGeom prst="rect">
+            <a:avLst/>
+          </a:prstGeom>
+          <a:solidFill>
+            <a:schemeClr val="tx1">
+              <a:lumMod val="65000"/>
+              <a:lumOff val="35000"/>
+            </a:schemeClr>
+          </a:solidFill>
+        </p:spPr>
+        <p:txBody>
+          <a:bodyPr wrap="square" rtlCol="0">
+            <a:spAutoFit/>
+          </a:bodyPr>
+          <a:lstStyle/>
+          <a:p>
+            <a:pPr algn="ctr"/>
+            <a:r>
+              <a:rPr lang="en-US" dirty="0">
+                <a:solidFill>
+                  <a:schemeClr val="bg1"/>
+                </a:solidFill>
+              </a:rPr>
+              <a:t>2018</a:t>
+            </a:r>
+          </a:p>
+        </p:txBody>
+      </p:sp>
+    </p:spTree>
+    <p:extLst>
+      <p:ext uri="{BB962C8B-B14F-4D97-AF65-F5344CB8AC3E}">
+        <p14:creationId xmlns:p14="http://schemas.microsoft.com/office/powerpoint/2010/main" val="1680002086"/>
+      </p:ext>
+    </p:extLst>
+  </p:cSld>
+  <p:clrMapOvr>
+    <a:masterClrMapping/>
+  </p:clrMapOvr>
+</p:sld>
+</file>
+
+<file path=ppt/slides/slide12.xml><?xml version="1.0" encoding="utf-8"?>
+<p:sld xmlns:a="http://schemas.openxmlformats.org/drawingml/2006/main" xmlns:r="http://schemas.openxmlformats.org/officeDocument/2006/relationships" xmlns:p="http://schemas.openxmlformats.org/presentationml/2006/main">
+  <p:cSld>
+    <p:spTree>
+      <p:nvGrpSpPr>
+        <p:cNvPr id="1" name=""/>
+        <p:cNvGrpSpPr/>
+        <p:nvPr/>
+      </p:nvGrpSpPr>
+      <p:grpSpPr>
+        <a:xfrm>
+          <a:off x="0" y="0"/>
+          <a:ext cx="0" cy="0"/>
+          <a:chOff x="0" y="0"/>
+          <a:chExt cx="0" cy="0"/>
+        </a:xfrm>
+      </p:grpSpPr>
+      <p:sp>
+        <p:nvSpPr>
+          <p:cNvPr id="2" name="Title 1">
+            <a:extLst>
+              <a:ext uri="{FF2B5EF4-FFF2-40B4-BE49-F238E27FC236}">
+                <a16:creationId xmlns:a16="http://schemas.microsoft.com/office/drawing/2014/main" id="{737F0781-F9D8-4B95-A554-A082FD9AB1B4}"/>
+              </a:ext>
+            </a:extLst>
+          </p:cNvPr>
+          <p:cNvSpPr>
+            <a:spLocks noGrp="1"/>
+          </p:cNvSpPr>
+          <p:nvPr>
+            <p:ph type="title"/>
+          </p:nvPr>
+        </p:nvSpPr>
+        <p:spPr/>
+        <p:txBody>
+          <a:bodyPr/>
+          <a:lstStyle/>
+          <a:p>
+            <a:r>
+              <a:rPr lang="en-US" dirty="0"/>
+              <a:t>Does Unemployment Rate Impact House Price?</a:t>
+            </a:r>
+          </a:p>
+        </p:txBody>
+      </p:sp>
+      <p:sp>
+        <p:nvSpPr>
+          <p:cNvPr id="10" name="TextBox 9">
+            <a:extLst>
+              <a:ext uri="{FF2B5EF4-FFF2-40B4-BE49-F238E27FC236}">
+                <a16:creationId xmlns:a16="http://schemas.microsoft.com/office/drawing/2014/main" id="{0D29C158-19A2-4F58-8609-AF2096620483}"/>
+              </a:ext>
+            </a:extLst>
+          </p:cNvPr>
+          <p:cNvSpPr txBox="1"/>
+          <p:nvPr/>
+        </p:nvSpPr>
+        <p:spPr>
+          <a:xfrm>
+            <a:off x="1271217" y="5383584"/>
+            <a:ext cx="9853983" cy="646331"/>
+          </a:xfrm>
+          <a:prstGeom prst="rect">
+            <a:avLst/>
+          </a:prstGeom>
+          <a:solidFill>
+            <a:schemeClr val="tx1">
+              <a:lumMod val="65000"/>
+              <a:lumOff val="35000"/>
+            </a:schemeClr>
+          </a:solidFill>
+        </p:spPr>
+        <p:txBody>
+          <a:bodyPr wrap="square" rtlCol="0">
+            <a:spAutoFit/>
+          </a:bodyPr>
+          <a:lstStyle/>
+          <a:p>
+            <a:pPr algn="ctr"/>
+            <a:r>
+              <a:rPr lang="en-US" dirty="0">
+                <a:solidFill>
+                  <a:schemeClr val="bg1"/>
+                </a:solidFill>
+              </a:rPr>
+              <a:t>Takeaway: Areas with a higher unemployment rate among homeowners are less expensive to live in than areas with a low unemployment rate among homeowners</a:t>
+            </a:r>
+          </a:p>
+        </p:txBody>
+      </p:sp>
+      <p:sp>
+        <p:nvSpPr>
+          <p:cNvPr id="11" name="Footer Placeholder 3">
+            <a:extLst>
+              <a:ext uri="{FF2B5EF4-FFF2-40B4-BE49-F238E27FC236}">
+                <a16:creationId xmlns:a16="http://schemas.microsoft.com/office/drawing/2014/main" id="{3C750B37-1312-493D-B453-CFB28601C81B}"/>
+              </a:ext>
+            </a:extLst>
+          </p:cNvPr>
+          <p:cNvSpPr>
+            <a:spLocks noGrp="1"/>
+          </p:cNvSpPr>
+          <p:nvPr>
+            <p:ph type="ftr" sz="quarter" idx="11"/>
+          </p:nvPr>
+        </p:nvSpPr>
+        <p:spPr>
+          <a:xfrm>
+            <a:off x="1066800" y="6035040"/>
+            <a:ext cx="5816600" cy="365760"/>
+          </a:xfrm>
+        </p:spPr>
+        <p:txBody>
+          <a:bodyPr/>
+          <a:lstStyle/>
+          <a:p>
+            <a:r>
+              <a:rPr lang="en-US" dirty="0"/>
+              <a:t>Zillow Research Data, Census API Data</a:t>
+            </a:r>
+          </a:p>
+        </p:txBody>
+      </p:sp>
+      <p:pic>
+        <p:nvPicPr>
+          <p:cNvPr id="11268" name="Picture 4">
+            <a:extLst>
+              <a:ext uri="{FF2B5EF4-FFF2-40B4-BE49-F238E27FC236}">
+                <a16:creationId xmlns:a16="http://schemas.microsoft.com/office/drawing/2014/main" id="{FD27CEAA-BA64-4303-B6B8-82A0CED3B108}"/>
+              </a:ext>
+            </a:extLst>
+          </p:cNvPr>
+          <p:cNvPicPr>
+            <a:picLocks noChangeAspect="1" noChangeArrowheads="1"/>
+          </p:cNvPicPr>
+          <p:nvPr/>
+        </p:nvPicPr>
+        <p:blipFill>
+          <a:blip r:embed="rId2">
+            <a:extLst>
+              <a:ext uri="{28A0092B-C50C-407E-A947-70E740481C1C}">
+                <a14:useLocalDpi xmlns:a14="http://schemas.microsoft.com/office/drawing/2010/main" val="0"/>
+              </a:ext>
+            </a:extLst>
+          </a:blip>
+          <a:srcRect/>
+          <a:stretch>
+            <a:fillRect/>
+          </a:stretch>
+        </p:blipFill>
+        <p:spPr bwMode="auto">
+          <a:xfrm>
+            <a:off x="723672" y="2504593"/>
+            <a:ext cx="2543771" cy="2543771"/>
+          </a:xfrm>
+          <a:prstGeom prst="rect">
+            <a:avLst/>
+          </a:prstGeom>
+          <a:noFill/>
+          <a:extLst>
+            <a:ext uri="{909E8E84-426E-40DD-AFC4-6F175D3DCCD1}">
+              <a14:hiddenFill xmlns:a14="http://schemas.microsoft.com/office/drawing/2010/main">
+                <a:solidFill>
+                  <a:srgbClr val="FFFFFF"/>
+                </a:solidFill>
+              </a14:hiddenFill>
+            </a:ext>
+          </a:extLst>
+        </p:spPr>
+      </p:pic>
+      <p:pic>
+        <p:nvPicPr>
+          <p:cNvPr id="11270" name="Picture 6">
+            <a:extLst>
+              <a:ext uri="{FF2B5EF4-FFF2-40B4-BE49-F238E27FC236}">
+                <a16:creationId xmlns:a16="http://schemas.microsoft.com/office/drawing/2014/main" id="{28891A54-E837-4934-AAF8-290BD301369A}"/>
+              </a:ext>
+            </a:extLst>
+          </p:cNvPr>
+          <p:cNvPicPr>
+            <a:picLocks noChangeAspect="1" noChangeArrowheads="1"/>
+          </p:cNvPicPr>
+          <p:nvPr/>
+        </p:nvPicPr>
+        <p:blipFill>
+          <a:blip r:embed="rId3">
+            <a:extLst>
+              <a:ext uri="{28A0092B-C50C-407E-A947-70E740481C1C}">
+                <a14:useLocalDpi xmlns:a14="http://schemas.microsoft.com/office/drawing/2010/main" val="0"/>
+              </a:ext>
+            </a:extLst>
+          </a:blip>
+          <a:srcRect/>
+          <a:stretch>
+            <a:fillRect/>
+          </a:stretch>
+        </p:blipFill>
+        <p:spPr bwMode="auto">
+          <a:xfrm>
+            <a:off x="3605827" y="2504591"/>
+            <a:ext cx="2543771" cy="2543771"/>
+          </a:xfrm>
+          <a:prstGeom prst="rect">
+            <a:avLst/>
+          </a:prstGeom>
+          <a:noFill/>
+          <a:extLst>
+            <a:ext uri="{909E8E84-426E-40DD-AFC4-6F175D3DCCD1}">
+              <a14:hiddenFill xmlns:a14="http://schemas.microsoft.com/office/drawing/2010/main">
+                <a:solidFill>
+                  <a:srgbClr val="FFFFFF"/>
+                </a:solidFill>
+              </a14:hiddenFill>
+            </a:ext>
+          </a:extLst>
+        </p:spPr>
+      </p:pic>
+      <p:pic>
+        <p:nvPicPr>
+          <p:cNvPr id="11272" name="Picture 8">
+            <a:extLst>
+              <a:ext uri="{FF2B5EF4-FFF2-40B4-BE49-F238E27FC236}">
+                <a16:creationId xmlns:a16="http://schemas.microsoft.com/office/drawing/2014/main" id="{B06570CC-BCB7-4016-B159-00577F379879}"/>
+              </a:ext>
+            </a:extLst>
+          </p:cNvPr>
+          <p:cNvPicPr>
+            <a:picLocks noChangeAspect="1" noChangeArrowheads="1"/>
+          </p:cNvPicPr>
+          <p:nvPr/>
+        </p:nvPicPr>
+        <p:blipFill>
+          <a:blip r:embed="rId4">
+            <a:extLst>
+              <a:ext uri="{28A0092B-C50C-407E-A947-70E740481C1C}">
+                <a14:useLocalDpi xmlns:a14="http://schemas.microsoft.com/office/drawing/2010/main" val="0"/>
+              </a:ext>
+            </a:extLst>
+          </a:blip>
+          <a:srcRect/>
+          <a:stretch>
+            <a:fillRect/>
+          </a:stretch>
+        </p:blipFill>
+        <p:spPr bwMode="auto">
+          <a:xfrm>
+            <a:off x="6380788" y="2504591"/>
+            <a:ext cx="2543771" cy="2543771"/>
+          </a:xfrm>
+          <a:prstGeom prst="rect">
+            <a:avLst/>
+          </a:prstGeom>
+          <a:noFill/>
+          <a:extLst>
+            <a:ext uri="{909E8E84-426E-40DD-AFC4-6F175D3DCCD1}">
+              <a14:hiddenFill xmlns:a14="http://schemas.microsoft.com/office/drawing/2010/main">
+                <a:solidFill>
+                  <a:srgbClr val="FFFFFF"/>
+                </a:solidFill>
+              </a14:hiddenFill>
+            </a:ext>
+          </a:extLst>
+        </p:spPr>
+      </p:pic>
+      <p:pic>
+        <p:nvPicPr>
+          <p:cNvPr id="11274" name="Picture 10">
+            <a:extLst>
+              <a:ext uri="{FF2B5EF4-FFF2-40B4-BE49-F238E27FC236}">
+                <a16:creationId xmlns:a16="http://schemas.microsoft.com/office/drawing/2014/main" id="{0895ED79-3E0C-4C8F-ACB7-D58F8B78B1D0}"/>
+              </a:ext>
+            </a:extLst>
+          </p:cNvPr>
+          <p:cNvPicPr>
+            <a:picLocks noChangeAspect="1" noChangeArrowheads="1"/>
+          </p:cNvPicPr>
+          <p:nvPr/>
+        </p:nvPicPr>
+        <p:blipFill>
+          <a:blip r:embed="rId5">
+            <a:extLst>
+              <a:ext uri="{28A0092B-C50C-407E-A947-70E740481C1C}">
+                <a14:useLocalDpi xmlns:a14="http://schemas.microsoft.com/office/drawing/2010/main" val="0"/>
+              </a:ext>
+            </a:extLst>
+          </a:blip>
+          <a:srcRect/>
+          <a:stretch>
+            <a:fillRect/>
+          </a:stretch>
+        </p:blipFill>
+        <p:spPr bwMode="auto">
+          <a:xfrm>
+            <a:off x="9155749" y="2504591"/>
+            <a:ext cx="2543771" cy="2543771"/>
+          </a:xfrm>
+          <a:prstGeom prst="rect">
+            <a:avLst/>
+          </a:prstGeom>
+          <a:noFill/>
+          <a:extLst>
+            <a:ext uri="{909E8E84-426E-40DD-AFC4-6F175D3DCCD1}">
+              <a14:hiddenFill xmlns:a14="http://schemas.microsoft.com/office/drawing/2010/main">
+                <a:solidFill>
+                  <a:srgbClr val="FFFFFF"/>
+                </a:solidFill>
+              </a14:hiddenFill>
+            </a:ext>
+          </a:extLst>
+        </p:spPr>
+      </p:pic>
+      <p:sp>
+        <p:nvSpPr>
+          <p:cNvPr id="14" name="TextBox 13">
+            <a:extLst>
+              <a:ext uri="{FF2B5EF4-FFF2-40B4-BE49-F238E27FC236}">
+                <a16:creationId xmlns:a16="http://schemas.microsoft.com/office/drawing/2014/main" id="{153B5689-1C1D-41E7-9606-B6787B74FD1D}"/>
+              </a:ext>
+            </a:extLst>
+          </p:cNvPr>
+          <p:cNvSpPr txBox="1"/>
+          <p:nvPr/>
+        </p:nvSpPr>
+        <p:spPr>
+          <a:xfrm>
+            <a:off x="1058799" y="1948033"/>
+            <a:ext cx="1873516" cy="369332"/>
+          </a:xfrm>
+          <a:prstGeom prst="rect">
+            <a:avLst/>
+          </a:prstGeom>
+          <a:solidFill>
+            <a:schemeClr val="tx1">
+              <a:lumMod val="65000"/>
+              <a:lumOff val="35000"/>
+            </a:schemeClr>
+          </a:solidFill>
+        </p:spPr>
+        <p:txBody>
+          <a:bodyPr wrap="square" rtlCol="0">
+            <a:spAutoFit/>
+          </a:bodyPr>
+          <a:lstStyle/>
+          <a:p>
+            <a:pPr algn="ctr"/>
+            <a:r>
+              <a:rPr lang="en-US" dirty="0">
+                <a:solidFill>
+                  <a:schemeClr val="bg1"/>
+                </a:solidFill>
+              </a:rPr>
+              <a:t>2015</a:t>
+            </a:r>
+          </a:p>
+        </p:txBody>
+      </p:sp>
+      <p:sp>
+        <p:nvSpPr>
+          <p:cNvPr id="15" name="TextBox 14">
+            <a:extLst>
+              <a:ext uri="{FF2B5EF4-FFF2-40B4-BE49-F238E27FC236}">
+                <a16:creationId xmlns:a16="http://schemas.microsoft.com/office/drawing/2014/main" id="{F979EEEB-0804-424E-A12B-74CE26627BC0}"/>
+              </a:ext>
+            </a:extLst>
+          </p:cNvPr>
+          <p:cNvSpPr txBox="1"/>
+          <p:nvPr/>
+        </p:nvSpPr>
+        <p:spPr>
+          <a:xfrm>
+            <a:off x="4047481" y="1948031"/>
+            <a:ext cx="1873516" cy="369332"/>
+          </a:xfrm>
+          <a:prstGeom prst="rect">
+            <a:avLst/>
+          </a:prstGeom>
+          <a:solidFill>
+            <a:schemeClr val="tx1">
+              <a:lumMod val="65000"/>
+              <a:lumOff val="35000"/>
+            </a:schemeClr>
+          </a:solidFill>
+        </p:spPr>
+        <p:txBody>
+          <a:bodyPr wrap="square" rtlCol="0">
+            <a:spAutoFit/>
+          </a:bodyPr>
+          <a:lstStyle/>
+          <a:p>
+            <a:pPr algn="ctr"/>
+            <a:r>
+              <a:rPr lang="en-US" dirty="0">
+                <a:solidFill>
+                  <a:schemeClr val="bg1"/>
+                </a:solidFill>
+              </a:rPr>
+              <a:t>2016</a:t>
+            </a:r>
+          </a:p>
+        </p:txBody>
+      </p:sp>
+      <p:sp>
+        <p:nvSpPr>
+          <p:cNvPr id="16" name="TextBox 15">
+            <a:extLst>
+              <a:ext uri="{FF2B5EF4-FFF2-40B4-BE49-F238E27FC236}">
+                <a16:creationId xmlns:a16="http://schemas.microsoft.com/office/drawing/2014/main" id="{175A0B3E-9769-4715-8DF3-A7551CC0F977}"/>
+              </a:ext>
+            </a:extLst>
+          </p:cNvPr>
+          <p:cNvSpPr txBox="1"/>
+          <p:nvPr/>
+        </p:nvSpPr>
+        <p:spPr>
+          <a:xfrm>
+            <a:off x="6767867" y="1948031"/>
+            <a:ext cx="1873516" cy="369332"/>
+          </a:xfrm>
+          <a:prstGeom prst="rect">
+            <a:avLst/>
+          </a:prstGeom>
+          <a:solidFill>
+            <a:schemeClr val="tx1">
+              <a:lumMod val="65000"/>
+              <a:lumOff val="35000"/>
+            </a:schemeClr>
+          </a:solidFill>
+        </p:spPr>
+        <p:txBody>
+          <a:bodyPr wrap="square" rtlCol="0">
+            <a:spAutoFit/>
+          </a:bodyPr>
+          <a:lstStyle/>
+          <a:p>
+            <a:pPr algn="ctr"/>
+            <a:r>
+              <a:rPr lang="en-US" dirty="0">
+                <a:solidFill>
+                  <a:schemeClr val="bg1"/>
+                </a:solidFill>
+              </a:rPr>
+              <a:t>2017</a:t>
+            </a:r>
+          </a:p>
+        </p:txBody>
+      </p:sp>
+      <p:sp>
+        <p:nvSpPr>
+          <p:cNvPr id="17" name="TextBox 16">
+            <a:extLst>
+              <a:ext uri="{FF2B5EF4-FFF2-40B4-BE49-F238E27FC236}">
+                <a16:creationId xmlns:a16="http://schemas.microsoft.com/office/drawing/2014/main" id="{A52045B8-E7FA-4EC5-A691-EAEC886113CD}"/>
+              </a:ext>
+            </a:extLst>
+          </p:cNvPr>
+          <p:cNvSpPr txBox="1"/>
+          <p:nvPr/>
+        </p:nvSpPr>
+        <p:spPr>
+          <a:xfrm>
+            <a:off x="9490876" y="1948031"/>
+            <a:ext cx="1873516" cy="369332"/>
+          </a:xfrm>
+          <a:prstGeom prst="rect">
+            <a:avLst/>
+          </a:prstGeom>
+          <a:solidFill>
+            <a:schemeClr val="tx1">
+              <a:lumMod val="65000"/>
+              <a:lumOff val="35000"/>
+            </a:schemeClr>
+          </a:solidFill>
+        </p:spPr>
+        <p:txBody>
+          <a:bodyPr wrap="square" rtlCol="0">
+            <a:spAutoFit/>
+          </a:bodyPr>
+          <a:lstStyle/>
+          <a:p>
+            <a:pPr algn="ctr"/>
+            <a:r>
+              <a:rPr lang="en-US" dirty="0">
+                <a:solidFill>
+                  <a:schemeClr val="bg1"/>
+                </a:solidFill>
+              </a:rPr>
+              <a:t>2018</a:t>
+            </a:r>
+          </a:p>
+        </p:txBody>
+      </p:sp>
+    </p:spTree>
+    <p:extLst>
+      <p:ext uri="{BB962C8B-B14F-4D97-AF65-F5344CB8AC3E}">
+        <p14:creationId xmlns:p14="http://schemas.microsoft.com/office/powerpoint/2010/main" val="1509445066"/>
+      </p:ext>
+    </p:extLst>
+  </p:cSld>
+  <p:clrMapOvr>
+    <a:masterClrMapping/>
+  </p:clrMapOvr>
+</p:sld>
+</file>
+
+<file path=ppt/slides/slide13.xml><?xml version="1.0" encoding="utf-8"?>
+<p:sld xmlns:a="http://schemas.openxmlformats.org/drawingml/2006/main" xmlns:r="http://schemas.openxmlformats.org/officeDocument/2006/relationships" xmlns:p="http://schemas.openxmlformats.org/presentationml/2006/main">
+  <p:cSld>
+    <p:spTree>
+      <p:nvGrpSpPr>
+        <p:cNvPr id="1" name=""/>
+        <p:cNvGrpSpPr/>
+        <p:nvPr/>
+      </p:nvGrpSpPr>
+      <p:grpSpPr>
+        <a:xfrm>
+          <a:off x="0" y="0"/>
+          <a:ext cx="0" cy="0"/>
+          <a:chOff x="0" y="0"/>
+          <a:chExt cx="0" cy="0"/>
+        </a:xfrm>
+      </p:grpSpPr>
+      <p:sp>
+        <p:nvSpPr>
+          <p:cNvPr id="2" name="Title 1">
+            <a:extLst>
+              <a:ext uri="{FF2B5EF4-FFF2-40B4-BE49-F238E27FC236}">
+                <a16:creationId xmlns:a16="http://schemas.microsoft.com/office/drawing/2014/main" id="{F070D64D-BA64-4601-901A-5F3F1FC10F15}"/>
+              </a:ext>
+            </a:extLst>
+          </p:cNvPr>
+          <p:cNvSpPr>
+            <a:spLocks noGrp="1"/>
+          </p:cNvSpPr>
+          <p:nvPr>
+            <p:ph type="title"/>
+          </p:nvPr>
+        </p:nvSpPr>
+        <p:spPr/>
+        <p:txBody>
+          <a:bodyPr/>
+          <a:lstStyle/>
+          <a:p>
+            <a:r>
+              <a:rPr lang="en-US" dirty="0"/>
+              <a:t>How Does Education Impact The Median Home Prices by Zip Code?</a:t>
+            </a:r>
+          </a:p>
+        </p:txBody>
+      </p:sp>
+      <p:pic>
+        <p:nvPicPr>
+          <p:cNvPr id="7" name="Picture 2">
+            <a:extLst>
+              <a:ext uri="{FF2B5EF4-FFF2-40B4-BE49-F238E27FC236}">
+                <a16:creationId xmlns:a16="http://schemas.microsoft.com/office/drawing/2014/main" id="{E359F2E0-D420-423D-89EF-B924DD83AF61}"/>
+              </a:ext>
+            </a:extLst>
+          </p:cNvPr>
+          <p:cNvPicPr>
+            <a:picLocks noChangeAspect="1" noChangeArrowheads="1"/>
+          </p:cNvPicPr>
+          <p:nvPr/>
+        </p:nvPicPr>
+        <p:blipFill>
+          <a:blip r:embed="rId2">
+            <a:extLst>
+              <a:ext uri="{28A0092B-C50C-407E-A947-70E740481C1C}">
+                <a14:useLocalDpi xmlns:a14="http://schemas.microsoft.com/office/drawing/2010/main" val="0"/>
+              </a:ext>
+            </a:extLst>
+          </a:blip>
+          <a:srcRect/>
+          <a:stretch>
+            <a:fillRect/>
+          </a:stretch>
+        </p:blipFill>
+        <p:spPr bwMode="auto">
+          <a:xfrm>
+            <a:off x="526556" y="2564570"/>
+            <a:ext cx="2429720" cy="2429720"/>
+          </a:xfrm>
+          <a:prstGeom prst="rect">
+            <a:avLst/>
+          </a:prstGeom>
+          <a:noFill/>
+          <a:extLst>
+            <a:ext uri="{909E8E84-426E-40DD-AFC4-6F175D3DCCD1}">
+              <a14:hiddenFill xmlns:a14="http://schemas.microsoft.com/office/drawing/2010/main">
+                <a:solidFill>
+                  <a:srgbClr val="FFFFFF"/>
+                </a:solidFill>
+              </a14:hiddenFill>
+            </a:ext>
+          </a:extLst>
+        </p:spPr>
+      </p:pic>
+      <p:pic>
+        <p:nvPicPr>
+          <p:cNvPr id="9224" name="Picture 8">
+            <a:extLst>
+              <a:ext uri="{FF2B5EF4-FFF2-40B4-BE49-F238E27FC236}">
+                <a16:creationId xmlns:a16="http://schemas.microsoft.com/office/drawing/2014/main" id="{76C6A34F-DBE7-4506-B9AF-3687ED6DBC64}"/>
+              </a:ext>
+            </a:extLst>
+          </p:cNvPr>
+          <p:cNvPicPr>
+            <a:picLocks noChangeAspect="1" noChangeArrowheads="1"/>
+          </p:cNvPicPr>
+          <p:nvPr/>
+        </p:nvPicPr>
+        <p:blipFill>
+          <a:blip r:embed="rId3">
+            <a:extLst>
+              <a:ext uri="{28A0092B-C50C-407E-A947-70E740481C1C}">
+                <a14:useLocalDpi xmlns:a14="http://schemas.microsoft.com/office/drawing/2010/main" val="0"/>
+              </a:ext>
+            </a:extLst>
+          </a:blip>
+          <a:srcRect/>
+          <a:stretch>
+            <a:fillRect/>
+          </a:stretch>
+        </p:blipFill>
+        <p:spPr bwMode="auto">
+          <a:xfrm>
+            <a:off x="3395691" y="2564570"/>
+            <a:ext cx="2429720" cy="2429720"/>
+          </a:xfrm>
+          <a:prstGeom prst="rect">
+            <a:avLst/>
+          </a:prstGeom>
+          <a:noFill/>
+          <a:extLst>
+            <a:ext uri="{909E8E84-426E-40DD-AFC4-6F175D3DCCD1}">
+              <a14:hiddenFill xmlns:a14="http://schemas.microsoft.com/office/drawing/2010/main">
+                <a:solidFill>
+                  <a:srgbClr val="FFFFFF"/>
+                </a:solidFill>
+              </a14:hiddenFill>
+            </a:ext>
+          </a:extLst>
+        </p:spPr>
+      </p:pic>
+      <p:pic>
+        <p:nvPicPr>
+          <p:cNvPr id="9226" name="Picture 10">
+            <a:extLst>
+              <a:ext uri="{FF2B5EF4-FFF2-40B4-BE49-F238E27FC236}">
+                <a16:creationId xmlns:a16="http://schemas.microsoft.com/office/drawing/2014/main" id="{2E4F3DA0-16A2-45A1-9A7A-306F48C6311D}"/>
+              </a:ext>
+            </a:extLst>
+          </p:cNvPr>
+          <p:cNvPicPr>
+            <a:picLocks noChangeAspect="1" noChangeArrowheads="1"/>
+          </p:cNvPicPr>
+          <p:nvPr/>
+        </p:nvPicPr>
+        <p:blipFill>
+          <a:blip r:embed="rId4">
+            <a:extLst>
+              <a:ext uri="{28A0092B-C50C-407E-A947-70E740481C1C}">
+                <a14:useLocalDpi xmlns:a14="http://schemas.microsoft.com/office/drawing/2010/main" val="0"/>
+              </a:ext>
+            </a:extLst>
+          </a:blip>
+          <a:srcRect/>
+          <a:stretch>
+            <a:fillRect/>
+          </a:stretch>
+        </p:blipFill>
+        <p:spPr bwMode="auto">
+          <a:xfrm>
+            <a:off x="6215547" y="2564570"/>
+            <a:ext cx="2429720" cy="2429720"/>
+          </a:xfrm>
+          <a:prstGeom prst="rect">
+            <a:avLst/>
+          </a:prstGeom>
+          <a:noFill/>
+          <a:extLst>
+            <a:ext uri="{909E8E84-426E-40DD-AFC4-6F175D3DCCD1}">
+              <a14:hiddenFill xmlns:a14="http://schemas.microsoft.com/office/drawing/2010/main">
+                <a:solidFill>
+                  <a:srgbClr val="FFFFFF"/>
+                </a:solidFill>
+              </a14:hiddenFill>
+            </a:ext>
+          </a:extLst>
+        </p:spPr>
+      </p:pic>
+      <p:pic>
+        <p:nvPicPr>
+          <p:cNvPr id="9228" name="Picture 12">
+            <a:extLst>
+              <a:ext uri="{FF2B5EF4-FFF2-40B4-BE49-F238E27FC236}">
+                <a16:creationId xmlns:a16="http://schemas.microsoft.com/office/drawing/2014/main" id="{4D024026-6066-481B-989C-ED8AE007523B}"/>
+              </a:ext>
+            </a:extLst>
+          </p:cNvPr>
+          <p:cNvPicPr>
+            <a:picLocks noChangeAspect="1" noChangeArrowheads="1"/>
+          </p:cNvPicPr>
+          <p:nvPr/>
+        </p:nvPicPr>
+        <p:blipFill>
+          <a:blip r:embed="rId5">
+            <a:extLst>
+              <a:ext uri="{28A0092B-C50C-407E-A947-70E740481C1C}">
+                <a14:useLocalDpi xmlns:a14="http://schemas.microsoft.com/office/drawing/2010/main" val="0"/>
+              </a:ext>
+            </a:extLst>
+          </a:blip>
+          <a:srcRect/>
+          <a:stretch>
+            <a:fillRect/>
+          </a:stretch>
+        </p:blipFill>
+        <p:spPr bwMode="auto">
+          <a:xfrm>
+            <a:off x="8958747" y="2564570"/>
+            <a:ext cx="2429720" cy="2429720"/>
+          </a:xfrm>
+          <a:prstGeom prst="rect">
+            <a:avLst/>
+          </a:prstGeom>
+          <a:noFill/>
+          <a:extLst>
+            <a:ext uri="{909E8E84-426E-40DD-AFC4-6F175D3DCCD1}">
+              <a14:hiddenFill xmlns:a14="http://schemas.microsoft.com/office/drawing/2010/main">
+                <a:solidFill>
+                  <a:srgbClr val="FFFFFF"/>
+                </a:solidFill>
+              </a14:hiddenFill>
+            </a:ext>
+          </a:extLst>
+        </p:spPr>
+      </p:pic>
+      <p:sp>
+        <p:nvSpPr>
+          <p:cNvPr id="11" name="TextBox 10">
+            <a:extLst>
+              <a:ext uri="{FF2B5EF4-FFF2-40B4-BE49-F238E27FC236}">
+                <a16:creationId xmlns:a16="http://schemas.microsoft.com/office/drawing/2014/main" id="{6B5E1C57-240F-4E7B-849B-ACD73C5CA67A}"/>
+              </a:ext>
+            </a:extLst>
+          </p:cNvPr>
+          <p:cNvSpPr txBox="1"/>
+          <p:nvPr/>
+        </p:nvSpPr>
+        <p:spPr>
+          <a:xfrm>
+            <a:off x="1271217" y="5135200"/>
+            <a:ext cx="9853983" cy="923330"/>
+          </a:xfrm>
+          <a:prstGeom prst="rect">
+            <a:avLst/>
+          </a:prstGeom>
+          <a:solidFill>
+            <a:schemeClr val="tx1">
+              <a:lumMod val="65000"/>
+              <a:lumOff val="35000"/>
+            </a:schemeClr>
+          </a:solidFill>
+        </p:spPr>
+        <p:txBody>
+          <a:bodyPr wrap="square" rtlCol="0">
+            <a:spAutoFit/>
+          </a:bodyPr>
+          <a:lstStyle/>
+          <a:p>
+            <a:pPr algn="ctr"/>
+            <a:r>
+              <a:rPr lang="en-US" dirty="0">
+                <a:solidFill>
+                  <a:schemeClr val="bg1"/>
+                </a:solidFill>
+              </a:rPr>
+              <a:t>Takeaway: On average, zip codes that contain more people who have completed a Bachelor’s degree are more expensive to live in than zip codes where fewer people have completed a Bachelor’s degree</a:t>
+            </a:r>
+          </a:p>
+        </p:txBody>
+      </p:sp>
+      <p:sp>
+        <p:nvSpPr>
+          <p:cNvPr id="12" name="Footer Placeholder 3">
+            <a:extLst>
+              <a:ext uri="{FF2B5EF4-FFF2-40B4-BE49-F238E27FC236}">
+                <a16:creationId xmlns:a16="http://schemas.microsoft.com/office/drawing/2014/main" id="{9F679D7B-F533-40C1-8A3D-A79C88A180E7}"/>
+              </a:ext>
+            </a:extLst>
+          </p:cNvPr>
+          <p:cNvSpPr>
+            <a:spLocks noGrp="1"/>
+          </p:cNvSpPr>
+          <p:nvPr>
+            <p:ph type="ftr" sz="quarter" idx="11"/>
+          </p:nvPr>
+        </p:nvSpPr>
+        <p:spPr>
+          <a:xfrm>
+            <a:off x="1066800" y="6035040"/>
+            <a:ext cx="5816600" cy="365760"/>
+          </a:xfrm>
+        </p:spPr>
+        <p:txBody>
+          <a:bodyPr/>
+          <a:lstStyle/>
+          <a:p>
+            <a:r>
+              <a:rPr lang="en-US" dirty="0"/>
+              <a:t>Zillow Research Data, Census API Data</a:t>
+            </a:r>
+          </a:p>
+        </p:txBody>
+      </p:sp>
+      <p:sp>
+        <p:nvSpPr>
+          <p:cNvPr id="13" name="TextBox 12">
+            <a:extLst>
+              <a:ext uri="{FF2B5EF4-FFF2-40B4-BE49-F238E27FC236}">
+                <a16:creationId xmlns:a16="http://schemas.microsoft.com/office/drawing/2014/main" id="{469EC402-2CDE-42AB-87E3-74704EE3BCDF}"/>
+              </a:ext>
+            </a:extLst>
+          </p:cNvPr>
+          <p:cNvSpPr txBox="1"/>
+          <p:nvPr/>
+        </p:nvSpPr>
+        <p:spPr>
+          <a:xfrm>
+            <a:off x="804658" y="2054328"/>
+            <a:ext cx="1873516" cy="369332"/>
+          </a:xfrm>
+          <a:prstGeom prst="rect">
+            <a:avLst/>
+          </a:prstGeom>
+          <a:solidFill>
+            <a:schemeClr val="tx1">
+              <a:lumMod val="65000"/>
+              <a:lumOff val="35000"/>
+            </a:schemeClr>
+          </a:solidFill>
+        </p:spPr>
+        <p:txBody>
+          <a:bodyPr wrap="square" rtlCol="0">
+            <a:spAutoFit/>
+          </a:bodyPr>
+          <a:lstStyle/>
+          <a:p>
+            <a:pPr algn="ctr"/>
+            <a:r>
+              <a:rPr lang="en-US" dirty="0">
+                <a:solidFill>
+                  <a:schemeClr val="bg1"/>
+                </a:solidFill>
+              </a:rPr>
+              <a:t>2015</a:t>
+            </a:r>
+          </a:p>
+        </p:txBody>
+      </p:sp>
+      <p:sp>
+        <p:nvSpPr>
+          <p:cNvPr id="14" name="TextBox 13">
+            <a:extLst>
+              <a:ext uri="{FF2B5EF4-FFF2-40B4-BE49-F238E27FC236}">
+                <a16:creationId xmlns:a16="http://schemas.microsoft.com/office/drawing/2014/main" id="{EF34E711-072E-4B83-9DE0-85D36E3055A6}"/>
+              </a:ext>
+            </a:extLst>
+          </p:cNvPr>
+          <p:cNvSpPr txBox="1"/>
+          <p:nvPr/>
+        </p:nvSpPr>
+        <p:spPr>
+          <a:xfrm>
+            <a:off x="3673793" y="2054328"/>
+            <a:ext cx="1873516" cy="369332"/>
+          </a:xfrm>
+          <a:prstGeom prst="rect">
+            <a:avLst/>
+          </a:prstGeom>
+          <a:solidFill>
+            <a:schemeClr val="tx1">
+              <a:lumMod val="65000"/>
+              <a:lumOff val="35000"/>
+            </a:schemeClr>
+          </a:solidFill>
+        </p:spPr>
+        <p:txBody>
+          <a:bodyPr wrap="square" rtlCol="0">
+            <a:spAutoFit/>
+          </a:bodyPr>
+          <a:lstStyle/>
+          <a:p>
+            <a:pPr algn="ctr"/>
+            <a:r>
+              <a:rPr lang="en-US" dirty="0">
+                <a:solidFill>
+                  <a:schemeClr val="bg1"/>
+                </a:solidFill>
+              </a:rPr>
+              <a:t>2016</a:t>
+            </a:r>
+          </a:p>
+        </p:txBody>
+      </p:sp>
+      <p:sp>
+        <p:nvSpPr>
+          <p:cNvPr id="15" name="TextBox 14">
+            <a:extLst>
+              <a:ext uri="{FF2B5EF4-FFF2-40B4-BE49-F238E27FC236}">
+                <a16:creationId xmlns:a16="http://schemas.microsoft.com/office/drawing/2014/main" id="{5925C548-509F-4F6A-A857-5ECC79998430}"/>
+              </a:ext>
+            </a:extLst>
+          </p:cNvPr>
+          <p:cNvSpPr txBox="1"/>
+          <p:nvPr/>
+        </p:nvSpPr>
+        <p:spPr>
+          <a:xfrm>
+            <a:off x="6493649" y="2054328"/>
+            <a:ext cx="1873516" cy="369332"/>
+          </a:xfrm>
+          <a:prstGeom prst="rect">
+            <a:avLst/>
+          </a:prstGeom>
+          <a:solidFill>
+            <a:schemeClr val="tx1">
+              <a:lumMod val="65000"/>
+              <a:lumOff val="35000"/>
+            </a:schemeClr>
+          </a:solidFill>
+        </p:spPr>
+        <p:txBody>
+          <a:bodyPr wrap="square" rtlCol="0">
+            <a:spAutoFit/>
+          </a:bodyPr>
+          <a:lstStyle/>
+          <a:p>
+            <a:pPr algn="ctr"/>
+            <a:r>
+              <a:rPr lang="en-US" dirty="0">
+                <a:solidFill>
+                  <a:schemeClr val="bg1"/>
+                </a:solidFill>
+              </a:rPr>
+              <a:t>2017</a:t>
+            </a:r>
+          </a:p>
+        </p:txBody>
+      </p:sp>
+      <p:sp>
+        <p:nvSpPr>
+          <p:cNvPr id="16" name="TextBox 15">
+            <a:extLst>
+              <a:ext uri="{FF2B5EF4-FFF2-40B4-BE49-F238E27FC236}">
+                <a16:creationId xmlns:a16="http://schemas.microsoft.com/office/drawing/2014/main" id="{C4E4CE75-CC73-444B-B97B-2F924294F8B6}"/>
+              </a:ext>
+            </a:extLst>
+          </p:cNvPr>
+          <p:cNvSpPr txBox="1"/>
+          <p:nvPr/>
+        </p:nvSpPr>
+        <p:spPr>
+          <a:xfrm>
+            <a:off x="9167824" y="2054328"/>
+            <a:ext cx="1873516" cy="369332"/>
+          </a:xfrm>
+          <a:prstGeom prst="rect">
+            <a:avLst/>
+          </a:prstGeom>
+          <a:solidFill>
+            <a:schemeClr val="tx1">
+              <a:lumMod val="65000"/>
+              <a:lumOff val="35000"/>
+            </a:schemeClr>
+          </a:solidFill>
+        </p:spPr>
+        <p:txBody>
+          <a:bodyPr wrap="square" rtlCol="0">
+            <a:spAutoFit/>
+          </a:bodyPr>
+          <a:lstStyle/>
+          <a:p>
+            <a:pPr algn="ctr"/>
+            <a:r>
+              <a:rPr lang="en-US" dirty="0">
+                <a:solidFill>
+                  <a:schemeClr val="bg1"/>
+                </a:solidFill>
+              </a:rPr>
+              <a:t>2018</a:t>
+            </a:r>
+          </a:p>
+        </p:txBody>
+      </p:sp>
+    </p:spTree>
+    <p:extLst>
+      <p:ext uri="{BB962C8B-B14F-4D97-AF65-F5344CB8AC3E}">
+        <p14:creationId xmlns:p14="http://schemas.microsoft.com/office/powerpoint/2010/main" val="2617795900"/>
+      </p:ext>
+    </p:extLst>
+  </p:cSld>
+  <p:clrMapOvr>
+    <a:masterClrMapping/>
+  </p:clrMapOvr>
+</p:sld>
+</file>
+
+<file path=ppt/slides/slide14.xml><?xml version="1.0" encoding="utf-8"?>
+<p:sld xmlns:a="http://schemas.openxmlformats.org/drawingml/2006/main" xmlns:r="http://schemas.openxmlformats.org/officeDocument/2006/relationships" xmlns:p="http://schemas.openxmlformats.org/presentationml/2006/main">
+  <p:cSld>
+    <p:spTree>
+      <p:nvGrpSpPr>
+        <p:cNvPr id="1" name=""/>
+        <p:cNvGrpSpPr/>
+        <p:nvPr/>
+      </p:nvGrpSpPr>
+      <p:grpSpPr>
+        <a:xfrm>
+          <a:off x="0" y="0"/>
+          <a:ext cx="0" cy="0"/>
+          <a:chOff x="0" y="0"/>
+          <a:chExt cx="0" cy="0"/>
+        </a:xfrm>
+      </p:grpSpPr>
+      <p:sp>
+        <p:nvSpPr>
+          <p:cNvPr id="2" name="Title 1">
+            <a:extLst>
+              <a:ext uri="{FF2B5EF4-FFF2-40B4-BE49-F238E27FC236}">
+                <a16:creationId xmlns:a16="http://schemas.microsoft.com/office/drawing/2014/main" id="{77CF0920-EE46-4ADF-8AFE-90DFA403912B}"/>
+              </a:ext>
+            </a:extLst>
+          </p:cNvPr>
+          <p:cNvSpPr>
+            <a:spLocks noGrp="1"/>
+          </p:cNvSpPr>
+          <p:nvPr>
+            <p:ph type="title"/>
+          </p:nvPr>
+        </p:nvSpPr>
+        <p:spPr/>
+        <p:txBody>
+          <a:bodyPr/>
+          <a:lstStyle/>
+          <a:p>
+            <a:r>
+              <a:rPr lang="en-US" dirty="0"/>
+              <a:t>Conclusions</a:t>
+            </a:r>
+          </a:p>
+        </p:txBody>
+      </p:sp>
+      <p:sp>
+        <p:nvSpPr>
+          <p:cNvPr id="3" name="Content Placeholder 2">
+            <a:extLst>
+              <a:ext uri="{FF2B5EF4-FFF2-40B4-BE49-F238E27FC236}">
+                <a16:creationId xmlns:a16="http://schemas.microsoft.com/office/drawing/2014/main" id="{DC2029A2-C07E-40E2-AEB4-CFAB6045B215}"/>
+              </a:ext>
+            </a:extLst>
+          </p:cNvPr>
+          <p:cNvSpPr>
+            <a:spLocks noGrp="1"/>
+          </p:cNvSpPr>
+          <p:nvPr>
+            <p:ph idx="1"/>
+          </p:nvPr>
+        </p:nvSpPr>
+        <p:spPr/>
+        <p:txBody>
+          <a:bodyPr/>
+          <a:lstStyle/>
+          <a:p>
+            <a:r>
+              <a:rPr lang="en-US" dirty="0"/>
+              <a:t>The price of homes in Georgia is increasing</a:t>
+            </a:r>
+          </a:p>
+          <a:p>
+            <a:r>
+              <a:rPr lang="en-US" dirty="0"/>
+              <a:t>Tara points……………..</a:t>
+            </a:r>
+          </a:p>
+          <a:p>
+            <a:r>
+              <a:rPr lang="en-US" dirty="0"/>
+              <a:t>Yannick points…………….</a:t>
+            </a:r>
+          </a:p>
+          <a:p>
+            <a:r>
+              <a:rPr lang="en-US" dirty="0"/>
+              <a:t>Zip codes with higher poverty rates in Georgia are less expensive to live in than those with lower poverty rates</a:t>
+            </a:r>
+          </a:p>
+          <a:p>
+            <a:r>
+              <a:rPr lang="en-US" dirty="0"/>
+              <a:t>Zip codes with higher unemployment rates in Georgia are less expensive to live in than those with lower unemployment rates</a:t>
+            </a:r>
+          </a:p>
+          <a:p>
+            <a:r>
+              <a:rPr lang="en-US" dirty="0"/>
+              <a:t>Zip codes with fewer highly educated people in Georgia are less expensive to live in than those with more highly educated people</a:t>
+            </a:r>
+          </a:p>
+          <a:p>
+            <a:endParaRPr lang="en-US" dirty="0"/>
+          </a:p>
+        </p:txBody>
+      </p:sp>
+    </p:spTree>
+    <p:extLst>
+      <p:ext uri="{BB962C8B-B14F-4D97-AF65-F5344CB8AC3E}">
+        <p14:creationId xmlns:p14="http://schemas.microsoft.com/office/powerpoint/2010/main" val="4188248600"/>
+      </p:ext>
+    </p:extLst>
+  </p:cSld>
+  <p:clrMapOvr>
+    <a:masterClrMapping/>
+  </p:clrMapOvr>
+</p:sld>
+</file>
+
+<file path=ppt/slides/slide15.xml><?xml version="1.0" encoding="utf-8"?>
+<p:sld xmlns:a="http://schemas.openxmlformats.org/drawingml/2006/main" xmlns:r="http://schemas.openxmlformats.org/officeDocument/2006/relationships" xmlns:p="http://schemas.openxmlformats.org/presentationml/2006/main">
+  <p:cSld>
+    <p:spTree>
+      <p:nvGrpSpPr>
+        <p:cNvPr id="1" name=""/>
+        <p:cNvGrpSpPr/>
+        <p:nvPr/>
+      </p:nvGrpSpPr>
+      <p:grpSpPr>
+        <a:xfrm>
+          <a:off x="0" y="0"/>
+          <a:ext cx="0" cy="0"/>
+          <a:chOff x="0" y="0"/>
+          <a:chExt cx="0" cy="0"/>
+        </a:xfrm>
+      </p:grpSpPr>
+      <p:sp>
+        <p:nvSpPr>
+          <p:cNvPr id="2" name="Title 1">
+            <a:extLst>
+              <a:ext uri="{FF2B5EF4-FFF2-40B4-BE49-F238E27FC236}">
+                <a16:creationId xmlns:a16="http://schemas.microsoft.com/office/drawing/2014/main" id="{13934363-2F03-4422-B996-F499D6A560E2}"/>
+              </a:ext>
+            </a:extLst>
+          </p:cNvPr>
+          <p:cNvSpPr>
+            <a:spLocks noGrp="1"/>
+          </p:cNvSpPr>
+          <p:nvPr>
+            <p:ph type="title"/>
+          </p:nvPr>
+        </p:nvSpPr>
+        <p:spPr/>
+        <p:txBody>
+          <a:bodyPr/>
+          <a:lstStyle/>
+          <a:p>
+            <a:r>
+              <a:rPr lang="en-US" dirty="0"/>
+              <a:t>What’s Next?</a:t>
+            </a:r>
+          </a:p>
+        </p:txBody>
+      </p:sp>
+      <p:sp>
+        <p:nvSpPr>
+          <p:cNvPr id="3" name="Content Placeholder 2">
+            <a:extLst>
+              <a:ext uri="{FF2B5EF4-FFF2-40B4-BE49-F238E27FC236}">
+                <a16:creationId xmlns:a16="http://schemas.microsoft.com/office/drawing/2014/main" id="{B5D5F71B-9D32-4663-A240-D664E71BE9A4}"/>
+              </a:ext>
+            </a:extLst>
+          </p:cNvPr>
+          <p:cNvSpPr>
+            <a:spLocks noGrp="1"/>
+          </p:cNvSpPr>
+          <p:nvPr>
+            <p:ph idx="1"/>
+          </p:nvPr>
+        </p:nvSpPr>
+        <p:spPr>
+          <a:xfrm>
+            <a:off x="1066800" y="2103120"/>
+            <a:ext cx="10207150" cy="3849624"/>
+          </a:xfrm>
+        </p:spPr>
+        <p:txBody>
+          <a:bodyPr>
+            <a:normAutofit/>
+          </a:bodyPr>
+          <a:lstStyle/>
+          <a:p>
+            <a:pPr marL="0" indent="0">
+              <a:buNone/>
+            </a:pPr>
+            <a:r>
+              <a:rPr lang="en-US" sz="2200" b="1" dirty="0"/>
+              <a:t>If we had a few more weeks to investigate…</a:t>
+            </a:r>
+          </a:p>
+          <a:p>
+            <a:r>
+              <a:rPr lang="en-US" sz="2200" dirty="0"/>
+              <a:t>We’d love to look at how various data points are correlated.</a:t>
+            </a:r>
+          </a:p>
+          <a:p>
+            <a:pPr lvl="1"/>
+            <a:r>
+              <a:rPr lang="en-US" sz="2000" dirty="0"/>
+              <a:t>Does count of bachelor’s degrees per capita increase as stronger job opportunities increase?</a:t>
+            </a:r>
+          </a:p>
+          <a:p>
+            <a:pPr lvl="1"/>
+            <a:r>
+              <a:rPr lang="en-US" sz="2000" dirty="0"/>
+              <a:t>Does the split of white collar/blue collar job opportunities impact home price?</a:t>
+            </a:r>
+          </a:p>
+          <a:p>
+            <a:pPr lvl="1"/>
+            <a:r>
+              <a:rPr lang="en-US" sz="2000" dirty="0"/>
+              <a:t>How do things like commute distances to the city, walking scores, and access to public transportation factor into home price?</a:t>
+            </a:r>
+          </a:p>
+          <a:p>
+            <a:pPr lvl="1"/>
+            <a:r>
+              <a:rPr lang="en-US" sz="2000" dirty="0"/>
+              <a:t>Does split of rental opportunities versus “owned” homes impact the median price of sale?</a:t>
+            </a:r>
+          </a:p>
+          <a:p>
+            <a:pPr lvl="1"/>
+            <a:endParaRPr lang="en-US" sz="2000" dirty="0"/>
+          </a:p>
+        </p:txBody>
+      </p:sp>
+    </p:spTree>
+    <p:extLst>
+      <p:ext uri="{BB962C8B-B14F-4D97-AF65-F5344CB8AC3E}">
+        <p14:creationId xmlns:p14="http://schemas.microsoft.com/office/powerpoint/2010/main" val="2217742411"/>
+      </p:ext>
+    </p:extLst>
+  </p:cSld>
+  <p:clrMapOvr>
+    <a:masterClrMapping/>
+  </p:clrMapOvr>
+</p:sld>
+</file>
+
+<file path=ppt/slides/slide16.xml><?xml version="1.0" encoding="utf-8"?>
+<p:sld xmlns:a="http://schemas.openxmlformats.org/drawingml/2006/main" xmlns:r="http://schemas.openxmlformats.org/officeDocument/2006/relationships" xmlns:p="http://schemas.openxmlformats.org/presentationml/2006/main">
+  <p:cSld>
+    <p:spTree>
+      <p:nvGrpSpPr>
+        <p:cNvPr id="1" name=""/>
+        <p:cNvGrpSpPr/>
+        <p:nvPr/>
+      </p:nvGrpSpPr>
+      <p:grpSpPr>
+        <a:xfrm>
+          <a:off x="0" y="0"/>
+          <a:ext cx="0" cy="0"/>
+          <a:chOff x="0" y="0"/>
+          <a:chExt cx="0" cy="0"/>
+        </a:xfrm>
+      </p:grpSpPr>
+      <p:sp>
+        <p:nvSpPr>
+          <p:cNvPr id="4" name="Title 3">
+            <a:extLst>
+              <a:ext uri="{FF2B5EF4-FFF2-40B4-BE49-F238E27FC236}">
+                <a16:creationId xmlns:a16="http://schemas.microsoft.com/office/drawing/2014/main" id="{1DC3E42C-322F-4668-B91D-29559CA77912}"/>
+              </a:ext>
+            </a:extLst>
+          </p:cNvPr>
+          <p:cNvSpPr>
+            <a:spLocks noGrp="1"/>
+          </p:cNvSpPr>
+          <p:nvPr>
+            <p:ph type="title"/>
+          </p:nvPr>
+        </p:nvSpPr>
+        <p:spPr/>
+        <p:txBody>
+          <a:bodyPr/>
+          <a:lstStyle/>
+          <a:p>
+            <a:r>
+              <a:rPr lang="en-US" dirty="0"/>
+              <a:t>Q&amp;A</a:t>
+            </a:r>
+          </a:p>
+        </p:txBody>
+      </p:sp>
+      <p:sp>
+        <p:nvSpPr>
+          <p:cNvPr id="5" name="Text Placeholder 4">
+            <a:extLst>
+              <a:ext uri="{FF2B5EF4-FFF2-40B4-BE49-F238E27FC236}">
+                <a16:creationId xmlns:a16="http://schemas.microsoft.com/office/drawing/2014/main" id="{0EC2B2B3-B7A1-4292-A5C2-74D8CB7ED2BC}"/>
+              </a:ext>
+            </a:extLst>
+          </p:cNvPr>
+          <p:cNvSpPr>
+            <a:spLocks noGrp="1"/>
+          </p:cNvSpPr>
+          <p:nvPr>
+            <p:ph type="body" idx="1"/>
+          </p:nvPr>
+        </p:nvSpPr>
+        <p:spPr/>
+        <p:txBody>
+          <a:bodyPr/>
+          <a:lstStyle/>
+          <a:p>
+            <a:r>
+              <a:rPr lang="en-US" dirty="0"/>
+              <a:t>Thank you!</a:t>
+            </a:r>
+          </a:p>
+        </p:txBody>
+      </p:sp>
+    </p:spTree>
+    <p:extLst>
+      <p:ext uri="{BB962C8B-B14F-4D97-AF65-F5344CB8AC3E}">
+        <p14:creationId xmlns:p14="http://schemas.microsoft.com/office/powerpoint/2010/main" val="3635850535"/>
+      </p:ext>
+    </p:extLst>
+  </p:cSld>
+  <p:clrMapOvr>
+    <a:masterClrMapping/>
+  </p:clrMapOvr>
+</p:sld>
+</file>
+
+<file path=ppt/slides/slide17.xml><?xml version="1.0" encoding="utf-8"?>
+<p:sld xmlns:a="http://schemas.openxmlformats.org/drawingml/2006/main" xmlns:r="http://schemas.openxmlformats.org/officeDocument/2006/relationships" xmlns:p="http://schemas.openxmlformats.org/presentationml/2006/main">
+  <p:cSld>
+    <p:spTree>
+      <p:nvGrpSpPr>
+        <p:cNvPr id="1" name=""/>
+        <p:cNvGrpSpPr/>
+        <p:nvPr/>
+      </p:nvGrpSpPr>
+      <p:grpSpPr>
+        <a:xfrm>
+          <a:off x="0" y="0"/>
+          <a:ext cx="0" cy="0"/>
+          <a:chOff x="0" y="0"/>
+          <a:chExt cx="0" cy="0"/>
+        </a:xfrm>
+      </p:grpSpPr>
+      <p:sp>
+        <p:nvSpPr>
+          <p:cNvPr id="4" name="Title 3">
+            <a:extLst>
+              <a:ext uri="{FF2B5EF4-FFF2-40B4-BE49-F238E27FC236}">
+                <a16:creationId xmlns:a16="http://schemas.microsoft.com/office/drawing/2014/main" id="{1DC3E42C-322F-4668-B91D-29559CA77912}"/>
+              </a:ext>
+            </a:extLst>
+          </p:cNvPr>
+          <p:cNvSpPr>
+            <a:spLocks noGrp="1"/>
+          </p:cNvSpPr>
+          <p:nvPr>
+            <p:ph type="title"/>
+          </p:nvPr>
+        </p:nvSpPr>
+        <p:spPr/>
+        <p:txBody>
+          <a:bodyPr/>
+          <a:lstStyle/>
+          <a:p>
+            <a:r>
+              <a:rPr lang="en-US" dirty="0"/>
+              <a:t>Appendix</a:t>
+            </a:r>
+          </a:p>
+        </p:txBody>
+      </p:sp>
+    </p:spTree>
+    <p:extLst>
+      <p:ext uri="{BB962C8B-B14F-4D97-AF65-F5344CB8AC3E}">
+        <p14:creationId xmlns:p14="http://schemas.microsoft.com/office/powerpoint/2010/main" val="2797155901"/>
+      </p:ext>
+    </p:extLst>
+  </p:cSld>
+  <p:clrMapOvr>
+    <a:masterClrMapping/>
+  </p:clrMapOvr>
+</p:sld>
+</file>
+
+<file path=ppt/slides/slide18.xml><?xml version="1.0" encoding="utf-8"?>
+<p:sld xmlns:a="http://schemas.openxmlformats.org/drawingml/2006/main" xmlns:r="http://schemas.openxmlformats.org/officeDocument/2006/relationships" xmlns:p="http://schemas.openxmlformats.org/presentationml/2006/main">
+  <p:cSld>
+    <p:spTree>
+      <p:nvGrpSpPr>
+        <p:cNvPr id="1" name=""/>
+        <p:cNvGrpSpPr/>
+        <p:nvPr/>
+      </p:nvGrpSpPr>
+      <p:grpSpPr>
+        <a:xfrm>
+          <a:off x="0" y="0"/>
+          <a:ext cx="0" cy="0"/>
+          <a:chOff x="0" y="0"/>
+          <a:chExt cx="0" cy="0"/>
+        </a:xfrm>
+      </p:grpSpPr>
+      <p:sp>
+        <p:nvSpPr>
+          <p:cNvPr id="2" name="Title 1">
+            <a:extLst>
+              <a:ext uri="{FF2B5EF4-FFF2-40B4-BE49-F238E27FC236}">
+                <a16:creationId xmlns:a16="http://schemas.microsoft.com/office/drawing/2014/main" id="{F070D64D-BA64-4601-901A-5F3F1FC10F15}"/>
+              </a:ext>
+            </a:extLst>
+          </p:cNvPr>
+          <p:cNvSpPr>
+            <a:spLocks noGrp="1"/>
+          </p:cNvSpPr>
+          <p:nvPr>
+            <p:ph type="title"/>
+          </p:nvPr>
+        </p:nvSpPr>
+        <p:spPr/>
+        <p:txBody>
+          <a:bodyPr/>
+          <a:lstStyle/>
+          <a:p>
+            <a:r>
+              <a:rPr lang="en-US" dirty="0"/>
+              <a:t>Home Price By City Over Year</a:t>
+            </a:r>
+          </a:p>
+        </p:txBody>
+      </p:sp>
+      <p:pic>
+        <p:nvPicPr>
+          <p:cNvPr id="3074" name="Picture 2">
+            <a:extLst>
+              <a:ext uri="{FF2B5EF4-FFF2-40B4-BE49-F238E27FC236}">
+                <a16:creationId xmlns:a16="http://schemas.microsoft.com/office/drawing/2014/main" id="{C8BEF1EA-BC1E-427A-ADF2-2BB144B6B720}"/>
+              </a:ext>
+            </a:extLst>
+          </p:cNvPr>
+          <p:cNvPicPr>
+            <a:picLocks noChangeAspect="1" noChangeArrowheads="1"/>
+          </p:cNvPicPr>
+          <p:nvPr/>
+        </p:nvPicPr>
+        <p:blipFill>
+          <a:blip r:embed="rId2">
+            <a:extLst>
+              <a:ext uri="{28A0092B-C50C-407E-A947-70E740481C1C}">
+                <a14:useLocalDpi xmlns:a14="http://schemas.microsoft.com/office/drawing/2010/main" val="0"/>
+              </a:ext>
+            </a:extLst>
+          </a:blip>
+          <a:srcRect/>
+          <a:stretch>
+            <a:fillRect/>
+          </a:stretch>
+        </p:blipFill>
+        <p:spPr bwMode="auto">
+          <a:xfrm>
+            <a:off x="2463952" y="1583867"/>
+            <a:ext cx="6953690" cy="4751227"/>
+          </a:xfrm>
+          <a:prstGeom prst="rect">
+            <a:avLst/>
+          </a:prstGeom>
+          <a:noFill/>
+          <a:extLst>
+            <a:ext uri="{909E8E84-426E-40DD-AFC4-6F175D3DCCD1}">
+              <a14:hiddenFill xmlns:a14="http://schemas.microsoft.com/office/drawing/2010/main">
+                <a:solidFill>
+                  <a:srgbClr val="FFFFFF"/>
+                </a:solidFill>
+              </a14:hiddenFill>
+            </a:ext>
+          </a:extLst>
+        </p:spPr>
+      </p:pic>
+    </p:spTree>
+    <p:extLst>
+      <p:ext uri="{BB962C8B-B14F-4D97-AF65-F5344CB8AC3E}">
+        <p14:creationId xmlns:p14="http://schemas.microsoft.com/office/powerpoint/2010/main" val="4172235550"/>
+      </p:ext>
+    </p:extLst>
+  </p:cSld>
+  <p:clrMapOvr>
+    <a:masterClrMapping/>
+  </p:clrMapOvr>
+</p:sld>
+</file>
+
+<file path=ppt/slides/slide19.xml><?xml version="1.0" encoding="utf-8"?>
+<p:sld xmlns:a="http://schemas.openxmlformats.org/drawingml/2006/main" xmlns:r="http://schemas.openxmlformats.org/officeDocument/2006/relationships" xmlns:p="http://schemas.openxmlformats.org/presentationml/2006/main">
+  <p:cSld>
+    <p:spTree>
+      <p:nvGrpSpPr>
+        <p:cNvPr id="1" name=""/>
+        <p:cNvGrpSpPr/>
+        <p:nvPr/>
+      </p:nvGrpSpPr>
+      <p:grpSpPr>
+        <a:xfrm>
+          <a:off x="0" y="0"/>
+          <a:ext cx="0" cy="0"/>
+          <a:chOff x="0" y="0"/>
+          <a:chExt cx="0" cy="0"/>
+        </a:xfrm>
+      </p:grpSpPr>
+      <p:sp>
+        <p:nvSpPr>
+          <p:cNvPr id="2" name="Title 1">
+            <a:extLst>
+              <a:ext uri="{FF2B5EF4-FFF2-40B4-BE49-F238E27FC236}">
+                <a16:creationId xmlns:a16="http://schemas.microsoft.com/office/drawing/2014/main" id="{87DB1CCB-9980-4EB3-AC3A-11EC6FDC8B5E}"/>
+              </a:ext>
+            </a:extLst>
+          </p:cNvPr>
+          <p:cNvSpPr>
+            <a:spLocks noGrp="1"/>
+          </p:cNvSpPr>
+          <p:nvPr>
+            <p:ph type="title"/>
+          </p:nvPr>
+        </p:nvSpPr>
+        <p:spPr/>
+        <p:txBody>
+          <a:bodyPr/>
+          <a:lstStyle/>
+          <a:p>
+            <a:r>
+              <a:rPr lang="en-US" dirty="0"/>
+              <a:t>Home Price by County/City – The Economic Decline</a:t>
+            </a:r>
+          </a:p>
+        </p:txBody>
+      </p:sp>
+      <p:pic>
+        <p:nvPicPr>
+          <p:cNvPr id="5122" name="Picture 2">
+            <a:extLst>
+              <a:ext uri="{FF2B5EF4-FFF2-40B4-BE49-F238E27FC236}">
+                <a16:creationId xmlns:a16="http://schemas.microsoft.com/office/drawing/2014/main" id="{51E742A7-A1C8-4270-A28A-C4C4443FFE29}"/>
+              </a:ext>
+            </a:extLst>
+          </p:cNvPr>
+          <p:cNvPicPr>
+            <a:picLocks noChangeAspect="1" noChangeArrowheads="1"/>
+          </p:cNvPicPr>
+          <p:nvPr/>
+        </p:nvPicPr>
+        <p:blipFill>
+          <a:blip r:embed="rId2">
+            <a:extLst>
+              <a:ext uri="{28A0092B-C50C-407E-A947-70E740481C1C}">
+                <a14:useLocalDpi xmlns:a14="http://schemas.microsoft.com/office/drawing/2010/main" val="0"/>
+              </a:ext>
+            </a:extLst>
+          </a:blip>
+          <a:srcRect/>
+          <a:stretch>
+            <a:fillRect/>
+          </a:stretch>
+        </p:blipFill>
+        <p:spPr bwMode="auto">
+          <a:xfrm>
+            <a:off x="1946180" y="2068949"/>
+            <a:ext cx="8299640" cy="4477904"/>
+          </a:xfrm>
+          <a:prstGeom prst="rect">
+            <a:avLst/>
+          </a:prstGeom>
+          <a:noFill/>
+          <a:extLst>
+            <a:ext uri="{909E8E84-426E-40DD-AFC4-6F175D3DCCD1}">
+              <a14:hiddenFill xmlns:a14="http://schemas.microsoft.com/office/drawing/2010/main">
+                <a:solidFill>
+                  <a:srgbClr val="FFFFFF"/>
+                </a:solidFill>
+              </a14:hiddenFill>
+            </a:ext>
+          </a:extLst>
+        </p:spPr>
+      </p:pic>
+    </p:spTree>
+    <p:extLst>
+      <p:ext uri="{BB962C8B-B14F-4D97-AF65-F5344CB8AC3E}">
+        <p14:creationId xmlns:p14="http://schemas.microsoft.com/office/powerpoint/2010/main" val="4146859826"/>
+      </p:ext>
+    </p:extLst>
+  </p:cSld>
+  <p:clrMapOvr>
+    <a:masterClrMapping/>
+  </p:clrMapOvr>
+</p:sld>
+</file>
+
 <file path=ppt/slides/slide2.xml><?xml version="1.0" encoding="utf-8"?>
 <p:sld xmlns:a="http://schemas.openxmlformats.org/drawingml/2006/main" xmlns:r="http://schemas.openxmlformats.org/officeDocument/2006/relationships" xmlns:p="http://schemas.openxmlformats.org/presentationml/2006/main">
   <p:cSld>
@@ -4953,10 +7534,10 @@
       </p:grpSpPr>
       <p:sp>
         <p:nvSpPr>
-          <p:cNvPr id="2" name="Title 1">
+          <p:cNvPr id="4" name="Title 3">
             <a:extLst>
               <a:ext uri="{FF2B5EF4-FFF2-40B4-BE49-F238E27FC236}">
-                <a16:creationId xmlns:a16="http://schemas.microsoft.com/office/drawing/2014/main" id="{DC232407-F64D-4808-BF2A-640982B3BD4D}"/>
+                <a16:creationId xmlns:a16="http://schemas.microsoft.com/office/drawing/2014/main" id="{1DC3E42C-322F-4668-B91D-29559CA77912}"/>
               </a:ext>
             </a:extLst>
           </p:cNvPr>
@@ -4969,45 +7550,127 @@
         </p:nvSpPr>
         <p:spPr/>
         <p:txBody>
-          <a:bodyPr/>
+          <a:bodyPr>
+            <a:normAutofit/>
+          </a:bodyPr>
           <a:lstStyle/>
           <a:p>
             <a:r>
               <a:rPr lang="en-US" dirty="0"/>
-              <a:t>Motivation and Summary</a:t>
-            </a:r>
-          </a:p>
-        </p:txBody>
-      </p:sp>
-      <p:sp>
-        <p:nvSpPr>
-          <p:cNvPr id="3" name="Content Placeholder 2">
-            <a:extLst>
-              <a:ext uri="{FF2B5EF4-FFF2-40B4-BE49-F238E27FC236}">
-                <a16:creationId xmlns:a16="http://schemas.microsoft.com/office/drawing/2014/main" id="{0EE66E69-2005-4CB1-B1CB-A0FF3C85DADE}"/>
-              </a:ext>
-            </a:extLst>
-          </p:cNvPr>
-          <p:cNvSpPr>
-            <a:spLocks noGrp="1"/>
-          </p:cNvSpPr>
-          <p:nvPr>
-            <p:ph idx="1"/>
-          </p:nvPr>
-        </p:nvSpPr>
-        <p:spPr/>
-        <p:txBody>
-          <a:bodyPr/>
-          <a:lstStyle/>
-          <a:p>
-            <a:endParaRPr lang="en-US"/>
+              <a:t>Background</a:t>
+            </a:r>
           </a:p>
         </p:txBody>
       </p:sp>
     </p:spTree>
     <p:extLst>
       <p:ext uri="{BB962C8B-B14F-4D97-AF65-F5344CB8AC3E}">
-        <p14:creationId xmlns:p14="http://schemas.microsoft.com/office/powerpoint/2010/main" val="4014630145"/>
+        <p14:creationId xmlns:p14="http://schemas.microsoft.com/office/powerpoint/2010/main" val="1926954445"/>
+      </p:ext>
+    </p:extLst>
+  </p:cSld>
+  <p:clrMapOvr>
+    <a:masterClrMapping/>
+  </p:clrMapOvr>
+</p:sld>
+</file>
+
+<file path=ppt/slides/slide20.xml><?xml version="1.0" encoding="utf-8"?>
+<p:sld xmlns:a="http://schemas.openxmlformats.org/drawingml/2006/main" xmlns:r="http://schemas.openxmlformats.org/officeDocument/2006/relationships" xmlns:p="http://schemas.openxmlformats.org/presentationml/2006/main">
+  <p:cSld>
+    <p:spTree>
+      <p:nvGrpSpPr>
+        <p:cNvPr id="1" name=""/>
+        <p:cNvGrpSpPr/>
+        <p:nvPr/>
+      </p:nvGrpSpPr>
+      <p:grpSpPr>
+        <a:xfrm>
+          <a:off x="0" y="0"/>
+          <a:ext cx="0" cy="0"/>
+          <a:chOff x="0" y="0"/>
+          <a:chExt cx="0" cy="0"/>
+        </a:xfrm>
+      </p:grpSpPr>
+      <p:sp>
+        <p:nvSpPr>
+          <p:cNvPr id="2" name="Title 1">
+            <a:extLst>
+              <a:ext uri="{FF2B5EF4-FFF2-40B4-BE49-F238E27FC236}">
+                <a16:creationId xmlns:a16="http://schemas.microsoft.com/office/drawing/2014/main" id="{D360B541-BEFF-481C-AC2C-5EE1E681AEAF}"/>
+              </a:ext>
+            </a:extLst>
+          </p:cNvPr>
+          <p:cNvSpPr>
+            <a:spLocks noGrp="1"/>
+          </p:cNvSpPr>
+          <p:nvPr>
+            <p:ph type="title"/>
+          </p:nvPr>
+        </p:nvSpPr>
+        <p:spPr/>
+        <p:txBody>
+          <a:bodyPr/>
+          <a:lstStyle/>
+          <a:p>
+            <a:r>
+              <a:rPr lang="en-US" dirty="0"/>
+              <a:t>Index of Home Price Year over Year</a:t>
+            </a:r>
+          </a:p>
+        </p:txBody>
+      </p:sp>
+      <p:pic>
+        <p:nvPicPr>
+          <p:cNvPr id="6146" name="Picture 2">
+            <a:extLst>
+              <a:ext uri="{FF2B5EF4-FFF2-40B4-BE49-F238E27FC236}">
+                <a16:creationId xmlns:a16="http://schemas.microsoft.com/office/drawing/2014/main" id="{EB45BDAA-BC3C-46E0-8CB6-56448C1981F5}"/>
+              </a:ext>
+            </a:extLst>
+          </p:cNvPr>
+          <p:cNvPicPr>
+            <a:picLocks noChangeAspect="1" noChangeArrowheads="1"/>
+          </p:cNvPicPr>
+          <p:nvPr/>
+        </p:nvPicPr>
+        <p:blipFill>
+          <a:blip r:embed="rId2">
+            <a:extLst>
+              <a:ext uri="{28A0092B-C50C-407E-A947-70E740481C1C}">
+                <a14:useLocalDpi xmlns:a14="http://schemas.microsoft.com/office/drawing/2010/main" val="0"/>
+              </a:ext>
+            </a:extLst>
+          </a:blip>
+          <a:srcRect/>
+          <a:stretch>
+            <a:fillRect/>
+          </a:stretch>
+        </p:blipFill>
+        <p:spPr bwMode="auto">
+          <a:xfrm>
+            <a:off x="2898660" y="2014194"/>
+            <a:ext cx="6394679" cy="4399950"/>
+          </a:xfrm>
+          <a:prstGeom prst="rect">
+            <a:avLst/>
+          </a:prstGeom>
+          <a:noFill/>
+          <a:extLst>
+            <a:ext uri="{909E8E84-426E-40DD-AFC4-6F175D3DCCD1}">
+              <a14:hiddenFill xmlns:a14="http://schemas.microsoft.com/office/drawing/2010/main">
+                <a:solidFill>
+                  <a:srgbClr val="FFFFFF"/>
+                </a:solidFill>
+              </a14:hiddenFill>
+            </a:ext>
+          </a:extLst>
+        </p:spPr>
+      </p:pic>
+    </p:spTree>
+    <p:extLst>
+      <p:ext uri="{BB962C8B-B14F-4D97-AF65-F5344CB8AC3E}">
+        <p14:creationId xmlns:p14="http://schemas.microsoft.com/office/powerpoint/2010/main" val="2283909408"/>
       </p:ext>
     </p:extLst>
   </p:cSld>
@@ -5039,7 +7702,7 @@
           <p:cNvPr id="2" name="Title 1">
             <a:extLst>
               <a:ext uri="{FF2B5EF4-FFF2-40B4-BE49-F238E27FC236}">
-                <a16:creationId xmlns:a16="http://schemas.microsoft.com/office/drawing/2014/main" id="{42634AF6-AAE0-4230-924F-C48C8BDB711B}"/>
+                <a16:creationId xmlns:a16="http://schemas.microsoft.com/office/drawing/2014/main" id="{DC232407-F64D-4808-BF2A-640982B3BD4D}"/>
               </a:ext>
             </a:extLst>
           </p:cNvPr>
@@ -5057,7 +7720,7 @@
           <a:p>
             <a:r>
               <a:rPr lang="en-US" dirty="0"/>
-              <a:t>Questions/Data</a:t>
+              <a:t>Overview of Topic</a:t>
             </a:r>
           </a:p>
         </p:txBody>
@@ -5067,7 +7730,7 @@
           <p:cNvPr id="3" name="Content Placeholder 2">
             <a:extLst>
               <a:ext uri="{FF2B5EF4-FFF2-40B4-BE49-F238E27FC236}">
-                <a16:creationId xmlns:a16="http://schemas.microsoft.com/office/drawing/2014/main" id="{81D00F6F-6CE3-47DB-BBDD-61B771719A9F}"/>
+                <a16:creationId xmlns:a16="http://schemas.microsoft.com/office/drawing/2014/main" id="{0EE66E69-2005-4CB1-B1CB-A0FF3C85DADE}"/>
               </a:ext>
             </a:extLst>
           </p:cNvPr>
@@ -5080,17 +7743,48 @@
         </p:nvSpPr>
         <p:spPr/>
         <p:txBody>
-          <a:bodyPr/>
+          <a:bodyPr>
+            <a:normAutofit/>
+          </a:bodyPr>
           <a:lstStyle/>
           <a:p>
-            <a:endParaRPr lang="en-US"/>
+            <a:pPr marL="0" indent="0">
+              <a:buNone/>
+            </a:pPr>
+            <a:r>
+              <a:rPr lang="en-US" sz="2400" b="1" dirty="0"/>
+              <a:t>Core Question: </a:t>
+            </a:r>
+            <a:r>
+              <a:rPr lang="en-US" sz="2400" dirty="0"/>
+              <a:t>What are the primary drivers which impact the median home price in Georgia?</a:t>
+            </a:r>
+          </a:p>
+          <a:p>
+            <a:pPr marL="0" indent="0">
+              <a:buNone/>
+            </a:pPr>
+            <a:endParaRPr lang="en-US" sz="2400" b="1" dirty="0"/>
+          </a:p>
+          <a:p>
+            <a:pPr marL="0" indent="0">
+              <a:buNone/>
+            </a:pPr>
+            <a:r>
+              <a:rPr lang="en-US" sz="2400" b="1" dirty="0"/>
+              <a:t>Core Strategy: </a:t>
+            </a:r>
+            <a:r>
+              <a:rPr lang="en-US" sz="2400" dirty="0"/>
+              <a:t>Can we look for correlations between median home price and various external factors year over year at the total state level and at the zip code level and see whether they are correlated to increases and decreases in median price.</a:t>
+            </a:r>
           </a:p>
         </p:txBody>
       </p:sp>
     </p:spTree>
     <p:extLst>
       <p:ext uri="{BB962C8B-B14F-4D97-AF65-F5344CB8AC3E}">
-        <p14:creationId xmlns:p14="http://schemas.microsoft.com/office/powerpoint/2010/main" val="493708736"/>
+        <p14:creationId xmlns:p14="http://schemas.microsoft.com/office/powerpoint/2010/main" val="4014630145"/>
       </p:ext>
     </p:extLst>
   </p:cSld>
@@ -5122,7 +7816,7 @@
           <p:cNvPr id="2" name="Title 1">
             <a:extLst>
               <a:ext uri="{FF2B5EF4-FFF2-40B4-BE49-F238E27FC236}">
-                <a16:creationId xmlns:a16="http://schemas.microsoft.com/office/drawing/2014/main" id="{13934363-2F03-4422-B996-F499D6A560E2}"/>
+                <a16:creationId xmlns:a16="http://schemas.microsoft.com/office/drawing/2014/main" id="{42634AF6-AAE0-4230-924F-C48C8BDB711B}"/>
               </a:ext>
             </a:extLst>
           </p:cNvPr>
@@ -5140,7 +7834,7 @@
           <a:p>
             <a:r>
               <a:rPr lang="en-US" dirty="0"/>
-              <a:t>Data Cleanup &amp; Exploration</a:t>
+              <a:t>Questions/Data</a:t>
             </a:r>
           </a:p>
         </p:txBody>
@@ -5150,7 +7844,7 @@
           <p:cNvPr id="3" name="Content Placeholder 2">
             <a:extLst>
               <a:ext uri="{FF2B5EF4-FFF2-40B4-BE49-F238E27FC236}">
-                <a16:creationId xmlns:a16="http://schemas.microsoft.com/office/drawing/2014/main" id="{B5D5F71B-9D32-4663-A240-D664E71BE9A4}"/>
+                <a16:creationId xmlns:a16="http://schemas.microsoft.com/office/drawing/2014/main" id="{81D00F6F-6CE3-47DB-BBDD-61B771719A9F}"/>
               </a:ext>
             </a:extLst>
           </p:cNvPr>
@@ -5163,17 +7857,106 @@
         </p:nvSpPr>
         <p:spPr/>
         <p:txBody>
-          <a:bodyPr/>
+          <a:bodyPr>
+            <a:normAutofit fontScale="85000" lnSpcReduction="20000"/>
+          </a:bodyPr>
           <a:lstStyle/>
           <a:p>
-            <a:endParaRPr lang="en-US"/>
+            <a:r>
+              <a:rPr lang="en-US" sz="2400" b="1" dirty="0"/>
+              <a:t>Questions Asked:</a:t>
+            </a:r>
+          </a:p>
+          <a:p>
+            <a:pPr lvl="1"/>
+            <a:r>
+              <a:rPr lang="en-US" sz="1800" dirty="0"/>
+              <a:t>Have home prices increased or decreased over time in the state of Georgia?</a:t>
+            </a:r>
+          </a:p>
+          <a:p>
+            <a:pPr lvl="1"/>
+            <a:r>
+              <a:rPr lang="en-US" sz="1800" dirty="0"/>
+              <a:t>Do people in Georgia generally buy more expensive homes if they make more money?</a:t>
+            </a:r>
+          </a:p>
+          <a:p>
+            <a:pPr lvl="1"/>
+            <a:r>
+              <a:rPr lang="en-US" sz="1800" dirty="0"/>
+              <a:t>How does the growth in the population affect housing prices in the Georgia?</a:t>
+            </a:r>
+          </a:p>
+          <a:p>
+            <a:pPr lvl="1"/>
+            <a:r>
+              <a:rPr lang="en-US" sz="1800" dirty="0"/>
+              <a:t>What external factors can impact the price of homes in an area?</a:t>
+            </a:r>
+          </a:p>
+          <a:p>
+            <a:pPr lvl="2"/>
+            <a:r>
+              <a:rPr lang="en-US" sz="1600" dirty="0"/>
+              <a:t>Does poverty rate impact home price?</a:t>
+            </a:r>
+          </a:p>
+          <a:p>
+            <a:pPr lvl="2"/>
+            <a:r>
+              <a:rPr lang="en-US" sz="1600" dirty="0"/>
+              <a:t>Does unemployment rate by zip code impact home price?</a:t>
+            </a:r>
+          </a:p>
+          <a:p>
+            <a:pPr lvl="2"/>
+            <a:r>
+              <a:rPr lang="en-US" sz="1600" dirty="0"/>
+              <a:t>Does the count of bachelor’s degrees in a zip code impact the housing price appreciation?</a:t>
+            </a:r>
+          </a:p>
+          <a:p>
+            <a:r>
+              <a:rPr lang="en-US" sz="2400" b="1" dirty="0"/>
+              <a:t>Data Needed:</a:t>
+            </a:r>
+          </a:p>
+          <a:p>
+            <a:pPr lvl="1"/>
+            <a:r>
+              <a:rPr lang="en-US" sz="2000" dirty="0"/>
+              <a:t>Historical home price data and some demographic data for Georgia was obtained from datausa.io</a:t>
+            </a:r>
+          </a:p>
+          <a:p>
+            <a:pPr lvl="1"/>
+            <a:r>
+              <a:rPr lang="en-US" sz="2000" dirty="0"/>
+              <a:t>Some points of interest on historical home price by zip code were collected from Zillow research data</a:t>
+            </a:r>
+          </a:p>
+          <a:p>
+            <a:pPr lvl="1"/>
+            <a:r>
+              <a:rPr lang="en-US" sz="2000" dirty="0"/>
+              <a:t>Some demographic data was obtained from the Census API</a:t>
+            </a:r>
+          </a:p>
+          <a:p>
+            <a:pPr lvl="1"/>
+            <a:endParaRPr lang="en-US" sz="2200" dirty="0"/>
+          </a:p>
+          <a:p>
+            <a:pPr lvl="1"/>
+            <a:endParaRPr lang="en-US" sz="1700" dirty="0"/>
           </a:p>
         </p:txBody>
       </p:sp>
     </p:spTree>
     <p:extLst>
       <p:ext uri="{BB962C8B-B14F-4D97-AF65-F5344CB8AC3E}">
-        <p14:creationId xmlns:p14="http://schemas.microsoft.com/office/powerpoint/2010/main" val="399509930"/>
+        <p14:creationId xmlns:p14="http://schemas.microsoft.com/office/powerpoint/2010/main" val="493708736"/>
       </p:ext>
     </p:extLst>
   </p:cSld>
@@ -5205,7 +7988,7 @@
           <p:cNvPr id="2" name="Title 1">
             <a:extLst>
               <a:ext uri="{FF2B5EF4-FFF2-40B4-BE49-F238E27FC236}">
-                <a16:creationId xmlns:a16="http://schemas.microsoft.com/office/drawing/2014/main" id="{B3258B2C-BA6D-4FBB-A245-60A281881099}"/>
+                <a16:creationId xmlns:a16="http://schemas.microsoft.com/office/drawing/2014/main" id="{13934363-2F03-4422-B996-F499D6A560E2}"/>
               </a:ext>
             </a:extLst>
           </p:cNvPr>
@@ -5223,7 +8006,7 @@
           <a:p>
             <a:r>
               <a:rPr lang="en-US" dirty="0"/>
-              <a:t>Data Analysis</a:t>
+              <a:t>Roadblocks</a:t>
             </a:r>
           </a:p>
         </p:txBody>
@@ -5233,7 +8016,7 @@
           <p:cNvPr id="3" name="Content Placeholder 2">
             <a:extLst>
               <a:ext uri="{FF2B5EF4-FFF2-40B4-BE49-F238E27FC236}">
-                <a16:creationId xmlns:a16="http://schemas.microsoft.com/office/drawing/2014/main" id="{DD0B8020-979F-4A04-8177-295CA2CFEDC1}"/>
+                <a16:creationId xmlns:a16="http://schemas.microsoft.com/office/drawing/2014/main" id="{B5D5F71B-9D32-4663-A240-D664E71BE9A4}"/>
               </a:ext>
             </a:extLst>
           </p:cNvPr>
@@ -5246,17 +8029,117 @@
         </p:nvSpPr>
         <p:spPr/>
         <p:txBody>
-          <a:bodyPr/>
+          <a:bodyPr>
+            <a:normAutofit fontScale="92500" lnSpcReduction="20000"/>
+          </a:bodyPr>
           <a:lstStyle/>
           <a:p>
-            <a:endParaRPr lang="en-US"/>
-          </a:p>
-        </p:txBody>
-      </p:sp>
+            <a:pPr marL="0" indent="0">
+              <a:buNone/>
+            </a:pPr>
+            <a:r>
+              <a:rPr lang="en-US" sz="2400" b="1" u="sng" dirty="0"/>
+              <a:t>Problems Which Arose</a:t>
+            </a:r>
+            <a:endParaRPr lang="en-US" sz="2400" dirty="0"/>
+          </a:p>
+          <a:p>
+            <a:r>
+              <a:rPr lang="en-US" sz="2000" dirty="0"/>
+              <a:t>Retrieval Limits</a:t>
+            </a:r>
+          </a:p>
+          <a:p>
+            <a:pPr lvl="1"/>
+            <a:r>
+              <a:rPr lang="en-US" sz="1600" dirty="0"/>
+              <a:t>Initially, much of our data on the state level and zip code level came from ATTOM real estate APIs.</a:t>
+            </a:r>
+          </a:p>
+          <a:p>
+            <a:pPr lvl="1"/>
+            <a:r>
+              <a:rPr lang="en-US" sz="1600" dirty="0"/>
+              <a:t>This left us scrambling for reliable data sources at the end, and we didn’t get the chance to explore as many factors as we initially intended.</a:t>
+            </a:r>
+          </a:p>
+          <a:p>
+            <a:pPr lvl="1"/>
+            <a:r>
+              <a:rPr lang="en-US" sz="1600" dirty="0"/>
+              <a:t>Some speed considerations depending on what the volume of data was being requested (frequent timeouts)</a:t>
+            </a:r>
+          </a:p>
+          <a:p>
+            <a:pPr lvl="1"/>
+            <a:r>
+              <a:rPr lang="en-US" sz="1600" dirty="0"/>
+              <a:t>Different data sources provided different periods of time, which were at times difficult to combine</a:t>
+            </a:r>
+          </a:p>
+          <a:p>
+            <a:r>
+              <a:rPr lang="en-US" sz="2000" dirty="0"/>
+              <a:t>Scale</a:t>
+            </a:r>
+          </a:p>
+          <a:p>
+            <a:pPr lvl="1"/>
+            <a:r>
+              <a:rPr lang="en-US" sz="1600" dirty="0"/>
+              <a:t>SO MANY factors influence the real estate market!</a:t>
+            </a:r>
+          </a:p>
+          <a:p>
+            <a:pPr lvl="1"/>
+            <a:r>
+              <a:rPr lang="en-US" sz="1600" dirty="0"/>
+              <a:t>If we could isolate every single factor and its exact impact on home price in each zip code in ~2 weeks, we would be off exploiting arbitrage opportunities on the real estate market.</a:t>
+            </a:r>
+          </a:p>
+          <a:p>
+            <a:pPr lvl="1"/>
+            <a:r>
+              <a:rPr lang="en-US" sz="1600" dirty="0"/>
+              <a:t>Our group aligned on choosing a handful of factors which were readily available to test and see what correlations we saw when comparing to home price over time!</a:t>
+            </a:r>
+          </a:p>
+        </p:txBody>
+      </p:sp>
+      <p:pic>
+        <p:nvPicPr>
+          <p:cNvPr id="4" name="Picture 3">
+            <a:extLst>
+              <a:ext uri="{FF2B5EF4-FFF2-40B4-BE49-F238E27FC236}">
+                <a16:creationId xmlns:a16="http://schemas.microsoft.com/office/drawing/2014/main" id="{7AF2C576-8C16-452C-A706-FB5807010CCD}"/>
+              </a:ext>
+            </a:extLst>
+          </p:cNvPr>
+          <p:cNvPicPr>
+            <a:picLocks noChangeAspect="1"/>
+          </p:cNvPicPr>
+          <p:nvPr/>
+        </p:nvPicPr>
+        <p:blipFill>
+          <a:blip r:embed="rId2"/>
+          <a:stretch>
+            <a:fillRect/>
+          </a:stretch>
+        </p:blipFill>
+        <p:spPr>
+          <a:xfrm>
+            <a:off x="8534400" y="1689001"/>
+            <a:ext cx="2428875" cy="828237"/>
+          </a:xfrm>
+          <a:prstGeom prst="rect">
+            <a:avLst/>
+          </a:prstGeom>
+        </p:spPr>
+      </p:pic>
     </p:spTree>
     <p:extLst>
       <p:ext uri="{BB962C8B-B14F-4D97-AF65-F5344CB8AC3E}">
-        <p14:creationId xmlns:p14="http://schemas.microsoft.com/office/powerpoint/2010/main" val="2903660034"/>
+        <p14:creationId xmlns:p14="http://schemas.microsoft.com/office/powerpoint/2010/main" val="399509930"/>
       </p:ext>
     </p:extLst>
   </p:cSld>
@@ -5285,10 +8168,10 @@
       </p:grpSpPr>
       <p:sp>
         <p:nvSpPr>
-          <p:cNvPr id="2" name="Title 1">
+          <p:cNvPr id="4" name="Title 3">
             <a:extLst>
               <a:ext uri="{FF2B5EF4-FFF2-40B4-BE49-F238E27FC236}">
-                <a16:creationId xmlns:a16="http://schemas.microsoft.com/office/drawing/2014/main" id="{B93AB8E0-6686-493C-A760-5E6BD476C891}"/>
+                <a16:creationId xmlns:a16="http://schemas.microsoft.com/office/drawing/2014/main" id="{1DC3E42C-322F-4668-B91D-29559CA77912}"/>
               </a:ext>
             </a:extLst>
           </p:cNvPr>
@@ -5306,40 +8189,15 @@
           <a:p>
             <a:r>
               <a:rPr lang="en-US" dirty="0"/>
-              <a:t>Post Mortem</a:t>
-            </a:r>
-          </a:p>
-        </p:txBody>
-      </p:sp>
-      <p:sp>
-        <p:nvSpPr>
-          <p:cNvPr id="3" name="Content Placeholder 2">
-            <a:extLst>
-              <a:ext uri="{FF2B5EF4-FFF2-40B4-BE49-F238E27FC236}">
-                <a16:creationId xmlns:a16="http://schemas.microsoft.com/office/drawing/2014/main" id="{876D6F0F-5F99-4FA2-B365-B622F099A7A1}"/>
-              </a:ext>
-            </a:extLst>
-          </p:cNvPr>
-          <p:cNvSpPr>
-            <a:spLocks noGrp="1"/>
-          </p:cNvSpPr>
-          <p:nvPr>
-            <p:ph idx="1"/>
-          </p:nvPr>
-        </p:nvSpPr>
-        <p:spPr/>
-        <p:txBody>
-          <a:bodyPr/>
-          <a:lstStyle/>
-          <a:p>
-            <a:endParaRPr lang="en-US"/>
+              <a:t>Data Analysis</a:t>
+            </a:r>
           </a:p>
         </p:txBody>
       </p:sp>
     </p:spTree>
     <p:extLst>
       <p:ext uri="{BB962C8B-B14F-4D97-AF65-F5344CB8AC3E}">
-        <p14:creationId xmlns:p14="http://schemas.microsoft.com/office/powerpoint/2010/main" val="3426493923"/>
+        <p14:creationId xmlns:p14="http://schemas.microsoft.com/office/powerpoint/2010/main" val="3273078692"/>
       </p:ext>
     </p:extLst>
   </p:cSld>
@@ -5368,10 +8226,10 @@
       </p:grpSpPr>
       <p:sp>
         <p:nvSpPr>
-          <p:cNvPr id="4" name="Title 3">
+          <p:cNvPr id="2" name="Title 1">
             <a:extLst>
               <a:ext uri="{FF2B5EF4-FFF2-40B4-BE49-F238E27FC236}">
-                <a16:creationId xmlns:a16="http://schemas.microsoft.com/office/drawing/2014/main" id="{1DC3E42C-322F-4668-B91D-29559CA77912}"/>
+                <a16:creationId xmlns:a16="http://schemas.microsoft.com/office/drawing/2014/main" id="{13934363-2F03-4422-B996-F499D6A560E2}"/>
               </a:ext>
             </a:extLst>
           </p:cNvPr>
@@ -5389,17 +8247,17 @@
           <a:p>
             <a:r>
               <a:rPr lang="en-US" dirty="0"/>
-              <a:t>Q&amp;A</a:t>
-            </a:r>
-          </a:p>
-        </p:txBody>
-      </p:sp>
-      <p:sp>
-        <p:nvSpPr>
-          <p:cNvPr id="5" name="Text Placeholder 4">
+              <a:t>Data Analysis</a:t>
+            </a:r>
+          </a:p>
+        </p:txBody>
+      </p:sp>
+      <p:sp>
+        <p:nvSpPr>
+          <p:cNvPr id="3" name="Content Placeholder 2">
             <a:extLst>
               <a:ext uri="{FF2B5EF4-FFF2-40B4-BE49-F238E27FC236}">
-                <a16:creationId xmlns:a16="http://schemas.microsoft.com/office/drawing/2014/main" id="{0EC2B2B3-B7A1-4292-A5C2-74D8CB7ED2BC}"/>
+                <a16:creationId xmlns:a16="http://schemas.microsoft.com/office/drawing/2014/main" id="{B5D5F71B-9D32-4663-A240-D664E71BE9A4}"/>
               </a:ext>
             </a:extLst>
           </p:cNvPr>
@@ -5407,7 +8265,103 @@
             <a:spLocks noGrp="1"/>
           </p:cNvSpPr>
           <p:nvPr>
-            <p:ph type="body" idx="1"/>
+            <p:ph idx="1"/>
+          </p:nvPr>
+        </p:nvSpPr>
+        <p:spPr>
+          <a:xfrm>
+            <a:off x="1066800" y="2103120"/>
+            <a:ext cx="6506049" cy="3849624"/>
+          </a:xfrm>
+        </p:spPr>
+        <p:txBody>
+          <a:bodyPr>
+            <a:normAutofit/>
+          </a:bodyPr>
+          <a:lstStyle/>
+          <a:p>
+            <a:r>
+              <a:rPr lang="en-US" sz="2200" dirty="0"/>
+              <a:t>Graphical analysis was primarily done with Matplotlib</a:t>
+            </a:r>
+          </a:p>
+          <a:p>
+            <a:r>
+              <a:rPr lang="en-US" sz="2200" dirty="0"/>
+              <a:t>There were many different ways to visualize our data, and this helped us to view the data from different points of view (scatter plots, line graphs, boxplots, </a:t>
+            </a:r>
+            <a:r>
+              <a:rPr lang="en-US" sz="2200" dirty="0" err="1"/>
+              <a:t>etc</a:t>
+            </a:r>
+            <a:r>
+              <a:rPr lang="en-US" sz="2200" dirty="0"/>
+              <a:t>).</a:t>
+            </a:r>
+          </a:p>
+        </p:txBody>
+      </p:sp>
+      <p:pic>
+        <p:nvPicPr>
+          <p:cNvPr id="1026" name="Picture 2" descr="Image result for data analysis&quot;">
+            <a:extLst>
+              <a:ext uri="{FF2B5EF4-FFF2-40B4-BE49-F238E27FC236}">
+                <a16:creationId xmlns:a16="http://schemas.microsoft.com/office/drawing/2014/main" id="{4CE6AF1B-980A-44BD-A529-BDE3542A3135}"/>
+              </a:ext>
+            </a:extLst>
+          </p:cNvPr>
+          <p:cNvPicPr>
+            <a:picLocks noChangeAspect="1" noChangeArrowheads="1"/>
+          </p:cNvPicPr>
+          <p:nvPr/>
+        </p:nvPicPr>
+        <p:blipFill>
+          <a:blip r:embed="rId2">
+            <a:extLst>
+              <a:ext uri="{28A0092B-C50C-407E-A947-70E740481C1C}">
+                <a14:useLocalDpi xmlns:a14="http://schemas.microsoft.com/office/drawing/2010/main" val="0"/>
+              </a:ext>
+            </a:extLst>
+          </a:blip>
+          <a:srcRect/>
+          <a:stretch>
+            <a:fillRect/>
+          </a:stretch>
+        </p:blipFill>
+        <p:spPr bwMode="auto">
+          <a:xfrm>
+            <a:off x="7945703" y="2484288"/>
+            <a:ext cx="3414619" cy="1889423"/>
+          </a:xfrm>
+          <a:prstGeom prst="rect">
+            <a:avLst/>
+          </a:prstGeom>
+          <a:noFill/>
+          <a:extLst>
+            <a:ext uri="{909E8E84-426E-40DD-AFC4-6F175D3DCCD1}">
+              <a14:hiddenFill xmlns:a14="http://schemas.microsoft.com/office/drawing/2010/main">
+                <a:solidFill>
+                  <a:srgbClr val="FFFFFF"/>
+                </a:solidFill>
+              </a14:hiddenFill>
+            </a:ext>
+          </a:extLst>
+        </p:spPr>
+      </p:pic>
+      <p:sp>
+        <p:nvSpPr>
+          <p:cNvPr id="4" name="Footer Placeholder 3">
+            <a:extLst>
+              <a:ext uri="{FF2B5EF4-FFF2-40B4-BE49-F238E27FC236}">
+                <a16:creationId xmlns:a16="http://schemas.microsoft.com/office/drawing/2014/main" id="{7AD0A7BA-3E50-48E7-8239-307EA7BA1307}"/>
+              </a:ext>
+            </a:extLst>
+          </p:cNvPr>
+          <p:cNvSpPr>
+            <a:spLocks noGrp="1"/>
+          </p:cNvSpPr>
+          <p:nvPr>
+            <p:ph type="ftr" sz="quarter" idx="11"/>
           </p:nvPr>
         </p:nvSpPr>
         <p:spPr/>
@@ -5417,7 +8371,7 @@
           <a:p>
             <a:r>
               <a:rPr lang="en-US" dirty="0"/>
-              <a:t>Thank you!</a:t>
+              <a:t>Image from Towards Data Science</a:t>
             </a:r>
           </a:p>
         </p:txBody>
@@ -5425,7 +8379,256 @@
     </p:spTree>
     <p:extLst>
       <p:ext uri="{BB962C8B-B14F-4D97-AF65-F5344CB8AC3E}">
-        <p14:creationId xmlns:p14="http://schemas.microsoft.com/office/powerpoint/2010/main" val="3635850535"/>
+        <p14:creationId xmlns:p14="http://schemas.microsoft.com/office/powerpoint/2010/main" val="3918945532"/>
+      </p:ext>
+    </p:extLst>
+  </p:cSld>
+  <p:clrMapOvr>
+    <a:masterClrMapping/>
+  </p:clrMapOvr>
+</p:sld>
+</file>
+
+<file path=ppt/slides/slide8.xml><?xml version="1.0" encoding="utf-8"?>
+<p:sld xmlns:a="http://schemas.openxmlformats.org/drawingml/2006/main" xmlns:r="http://schemas.openxmlformats.org/officeDocument/2006/relationships" xmlns:p="http://schemas.openxmlformats.org/presentationml/2006/main">
+  <p:cSld>
+    <p:spTree>
+      <p:nvGrpSpPr>
+        <p:cNvPr id="1" name=""/>
+        <p:cNvGrpSpPr/>
+        <p:nvPr/>
+      </p:nvGrpSpPr>
+      <p:grpSpPr>
+        <a:xfrm>
+          <a:off x="0" y="0"/>
+          <a:ext cx="0" cy="0"/>
+          <a:chOff x="0" y="0"/>
+          <a:chExt cx="0" cy="0"/>
+        </a:xfrm>
+      </p:grpSpPr>
+      <p:sp>
+        <p:nvSpPr>
+          <p:cNvPr id="2" name="Title 1">
+            <a:extLst>
+              <a:ext uri="{FF2B5EF4-FFF2-40B4-BE49-F238E27FC236}">
+                <a16:creationId xmlns:a16="http://schemas.microsoft.com/office/drawing/2014/main" id="{1BADF701-516A-4587-9D12-EC8C959DBBAB}"/>
+              </a:ext>
+            </a:extLst>
+          </p:cNvPr>
+          <p:cNvSpPr>
+            <a:spLocks noGrp="1"/>
+          </p:cNvSpPr>
+          <p:nvPr>
+            <p:ph type="title"/>
+          </p:nvPr>
+        </p:nvSpPr>
+        <p:spPr/>
+        <p:txBody>
+          <a:bodyPr/>
+          <a:lstStyle/>
+          <a:p>
+            <a:r>
+              <a:rPr lang="en-US" dirty="0"/>
+              <a:t>Home Price Trends</a:t>
+            </a:r>
+          </a:p>
+        </p:txBody>
+      </p:sp>
+      <p:sp>
+        <p:nvSpPr>
+          <p:cNvPr id="5" name="Footer Placeholder 3">
+            <a:extLst>
+              <a:ext uri="{FF2B5EF4-FFF2-40B4-BE49-F238E27FC236}">
+                <a16:creationId xmlns:a16="http://schemas.microsoft.com/office/drawing/2014/main" id="{841CB834-96E4-4B62-A77E-A586B97A928D}"/>
+              </a:ext>
+            </a:extLst>
+          </p:cNvPr>
+          <p:cNvSpPr>
+            <a:spLocks noGrp="1"/>
+          </p:cNvSpPr>
+          <p:nvPr>
+            <p:ph type="ftr" sz="quarter" idx="11"/>
+          </p:nvPr>
+        </p:nvSpPr>
+        <p:spPr>
+          <a:xfrm>
+            <a:off x="1066800" y="6035040"/>
+            <a:ext cx="5816600" cy="365760"/>
+          </a:xfrm>
+        </p:spPr>
+        <p:txBody>
+          <a:bodyPr/>
+          <a:lstStyle/>
+          <a:p>
+            <a:r>
+              <a:rPr lang="en-US" dirty="0"/>
+              <a:t>Zillow Research Data</a:t>
+            </a:r>
+          </a:p>
+        </p:txBody>
+      </p:sp>
+      <p:sp>
+        <p:nvSpPr>
+          <p:cNvPr id="4" name="TextBox 3">
+            <a:extLst>
+              <a:ext uri="{FF2B5EF4-FFF2-40B4-BE49-F238E27FC236}">
+                <a16:creationId xmlns:a16="http://schemas.microsoft.com/office/drawing/2014/main" id="{C3FC4256-7289-4FA5-8446-CC27BBE8471A}"/>
+              </a:ext>
+            </a:extLst>
+          </p:cNvPr>
+          <p:cNvSpPr txBox="1"/>
+          <p:nvPr/>
+        </p:nvSpPr>
+        <p:spPr>
+          <a:xfrm>
+            <a:off x="8815473" y="3197661"/>
+            <a:ext cx="2732249" cy="1477328"/>
+          </a:xfrm>
+          <a:prstGeom prst="rect">
+            <a:avLst/>
+          </a:prstGeom>
+          <a:solidFill>
+            <a:schemeClr val="tx1">
+              <a:lumMod val="65000"/>
+              <a:lumOff val="35000"/>
+            </a:schemeClr>
+          </a:solidFill>
+        </p:spPr>
+        <p:txBody>
+          <a:bodyPr wrap="square" rtlCol="0">
+            <a:spAutoFit/>
+          </a:bodyPr>
+          <a:lstStyle/>
+          <a:p>
+            <a:pPr algn="ctr"/>
+            <a:r>
+              <a:rPr lang="en-US" dirty="0">
+                <a:solidFill>
+                  <a:schemeClr val="bg1"/>
+                </a:solidFill>
+              </a:rPr>
+              <a:t>Across cities in Georgia, we have seen home price increase steadily over the previous 5 years</a:t>
+            </a:r>
+          </a:p>
+        </p:txBody>
+      </p:sp>
+      <p:pic>
+        <p:nvPicPr>
+          <p:cNvPr id="7" name="Picture 6">
+            <a:extLst>
+              <a:ext uri="{FF2B5EF4-FFF2-40B4-BE49-F238E27FC236}">
+                <a16:creationId xmlns:a16="http://schemas.microsoft.com/office/drawing/2014/main" id="{B1A9E593-D102-4ACF-A934-68D0EA5A7D89}"/>
+              </a:ext>
+            </a:extLst>
+          </p:cNvPr>
+          <p:cNvPicPr>
+            <a:picLocks noChangeAspect="1"/>
+          </p:cNvPicPr>
+          <p:nvPr/>
+        </p:nvPicPr>
+        <p:blipFill>
+          <a:blip r:embed="rId2"/>
+          <a:stretch>
+            <a:fillRect/>
+          </a:stretch>
+        </p:blipFill>
+        <p:spPr>
+          <a:xfrm>
+            <a:off x="1066800" y="1926973"/>
+            <a:ext cx="7474023" cy="4195289"/>
+          </a:xfrm>
+          <a:prstGeom prst="rect">
+            <a:avLst/>
+          </a:prstGeom>
+        </p:spPr>
+      </p:pic>
+    </p:spTree>
+    <p:extLst>
+      <p:ext uri="{BB962C8B-B14F-4D97-AF65-F5344CB8AC3E}">
+        <p14:creationId xmlns:p14="http://schemas.microsoft.com/office/powerpoint/2010/main" val="3707654863"/>
+      </p:ext>
+    </p:extLst>
+  </p:cSld>
+  <p:clrMapOvr>
+    <a:masterClrMapping/>
+  </p:clrMapOvr>
+</p:sld>
+</file>
+
+<file path=ppt/slides/slide9.xml><?xml version="1.0" encoding="utf-8"?>
+<p:sld xmlns:a="http://schemas.openxmlformats.org/drawingml/2006/main" xmlns:r="http://schemas.openxmlformats.org/officeDocument/2006/relationships" xmlns:p="http://schemas.openxmlformats.org/presentationml/2006/main">
+  <p:cSld>
+    <p:spTree>
+      <p:nvGrpSpPr>
+        <p:cNvPr id="1" name=""/>
+        <p:cNvGrpSpPr/>
+        <p:nvPr/>
+      </p:nvGrpSpPr>
+      <p:grpSpPr>
+        <a:xfrm>
+          <a:off x="0" y="0"/>
+          <a:ext cx="0" cy="0"/>
+          <a:chOff x="0" y="0"/>
+          <a:chExt cx="0" cy="0"/>
+        </a:xfrm>
+      </p:grpSpPr>
+      <p:sp>
+        <p:nvSpPr>
+          <p:cNvPr id="2" name="Title 1">
+            <a:extLst>
+              <a:ext uri="{FF2B5EF4-FFF2-40B4-BE49-F238E27FC236}">
+                <a16:creationId xmlns:a16="http://schemas.microsoft.com/office/drawing/2014/main" id="{318BCF67-E019-4BB8-9AB2-F752B055A462}"/>
+              </a:ext>
+            </a:extLst>
+          </p:cNvPr>
+          <p:cNvSpPr>
+            <a:spLocks noGrp="1"/>
+          </p:cNvSpPr>
+          <p:nvPr>
+            <p:ph type="title"/>
+          </p:nvPr>
+        </p:nvSpPr>
+        <p:spPr/>
+        <p:txBody>
+          <a:bodyPr/>
+          <a:lstStyle/>
+          <a:p>
+            <a:r>
+              <a:rPr lang="en-US" dirty="0"/>
+              <a:t>Hold for income slides (Tara)</a:t>
+            </a:r>
+          </a:p>
+        </p:txBody>
+      </p:sp>
+      <p:sp>
+        <p:nvSpPr>
+          <p:cNvPr id="3" name="Content Placeholder 2">
+            <a:extLst>
+              <a:ext uri="{FF2B5EF4-FFF2-40B4-BE49-F238E27FC236}">
+                <a16:creationId xmlns:a16="http://schemas.microsoft.com/office/drawing/2014/main" id="{09E687BB-9B1F-4761-9687-D185921068FE}"/>
+              </a:ext>
+            </a:extLst>
+          </p:cNvPr>
+          <p:cNvSpPr>
+            <a:spLocks noGrp="1"/>
+          </p:cNvSpPr>
+          <p:nvPr>
+            <p:ph idx="1"/>
+          </p:nvPr>
+        </p:nvSpPr>
+        <p:spPr/>
+        <p:txBody>
+          <a:bodyPr/>
+          <a:lstStyle/>
+          <a:p>
+            <a:endParaRPr lang="en-US"/>
+          </a:p>
+        </p:txBody>
+      </p:sp>
+    </p:spTree>
+    <p:extLst>
+      <p:ext uri="{BB962C8B-B14F-4D97-AF65-F5344CB8AC3E}">
+        <p14:creationId xmlns:p14="http://schemas.microsoft.com/office/powerpoint/2010/main" val="2593583500"/>
       </p:ext>
     </p:extLst>
   </p:cSld>
@@ -5709,4 +8912,299 @@
     </a:ext>
   </a:extLst>
 </a:theme>
+</file>
+
+<file path=ppt/theme/theme2.xml><?xml version="1.0" encoding="utf-8"?>
+<a:theme xmlns:a="http://schemas.openxmlformats.org/drawingml/2006/main" name="Office Theme">
+  <a:themeElements>
+    <a:clrScheme name="Office">
+      <a:dk1>
+        <a:sysClr val="windowText" lastClr="000000"/>
+      </a:dk1>
+      <a:lt1>
+        <a:sysClr val="window" lastClr="FFFFFF"/>
+      </a:lt1>
+      <a:dk2>
+        <a:srgbClr val="44546A"/>
+      </a:dk2>
+      <a:lt2>
+        <a:srgbClr val="E7E6E6"/>
+      </a:lt2>
+      <a:accent1>
+        <a:srgbClr val="4472C4"/>
+      </a:accent1>
+      <a:accent2>
+        <a:srgbClr val="ED7D31"/>
+      </a:accent2>
+      <a:accent3>
+        <a:srgbClr val="A5A5A5"/>
+      </a:accent3>
+      <a:accent4>
+        <a:srgbClr val="FFC000"/>
+      </a:accent4>
+      <a:accent5>
+        <a:srgbClr val="5B9BD5"/>
+      </a:accent5>
+      <a:accent6>
+        <a:srgbClr val="70AD47"/>
+      </a:accent6>
+      <a:hlink>
+        <a:srgbClr val="0563C1"/>
+      </a:hlink>
+      <a:folHlink>
+        <a:srgbClr val="954F72"/>
+      </a:folHlink>
+    </a:clrScheme>
+    <a:fontScheme name="Office">
+      <a:majorFont>
+        <a:latin typeface="Calibri Light" panose="020F0302020204030204"/>
+        <a:ea typeface=""/>
+        <a:cs typeface=""/>
+        <a:font script="Jpan" typeface="游ゴシック Light"/>
+        <a:font script="Hang" typeface="맑은 고딕"/>
+        <a:font script="Hans" typeface="等线 Light"/>
+        <a:font script="Hant" typeface="新細明體"/>
+        <a:font script="Arab" typeface="Times New Roman"/>
+        <a:font script="Hebr" typeface="Times New Roman"/>
+        <a:font script="Thai" typeface="Angsana New"/>
+        <a:font script="Ethi" typeface="Nyala"/>
+        <a:font script="Beng" typeface="Vrinda"/>
+        <a:font script="Gujr" typeface="Shruti"/>
+        <a:font script="Khmr" typeface="MoolBoran"/>
+        <a:font script="Knda" typeface="Tunga"/>
+        <a:font script="Guru" typeface="Raavi"/>
+        <a:font script="Cans" typeface="Euphemia"/>
+        <a:font script="Cher" typeface="Plantagenet Cherokee"/>
+        <a:font script="Yiii" typeface="Microsoft Yi Baiti"/>
+        <a:font script="Tibt" typeface="Microsoft Himalaya"/>
+        <a:font script="Thaa" typeface="MV Boli"/>
+        <a:font script="Deva" typeface="Mangal"/>
+        <a:font script="Telu" typeface="Gautami"/>
+        <a:font script="Taml" typeface="Latha"/>
+        <a:font script="Syrc" typeface="Estrangelo Edessa"/>
+        <a:font script="Orya" typeface="Kalinga"/>
+        <a:font script="Mlym" typeface="Kartika"/>
+        <a:font script="Laoo" typeface="DokChampa"/>
+        <a:font script="Sinh" typeface="Iskoola Pota"/>
+        <a:font script="Mong" typeface="Mongolian Baiti"/>
+        <a:font script="Viet" typeface="Times New Roman"/>
+        <a:font script="Uigh" typeface="Microsoft Uighur"/>
+        <a:font script="Geor" typeface="Sylfaen"/>
+        <a:font script="Armn" typeface="Arial"/>
+        <a:font script="Bugi" typeface="Leelawadee UI"/>
+        <a:font script="Bopo" typeface="Microsoft JhengHei"/>
+        <a:font script="Java" typeface="Javanese Text"/>
+        <a:font script="Lisu" typeface="Segoe UI"/>
+        <a:font script="Mymr" typeface="Myanmar Text"/>
+        <a:font script="Nkoo" typeface="Ebrima"/>
+        <a:font script="Olck" typeface="Nirmala UI"/>
+        <a:font script="Osma" typeface="Ebrima"/>
+        <a:font script="Phag" typeface="Phagspa"/>
+        <a:font script="Syrn" typeface="Estrangelo Edessa"/>
+        <a:font script="Syrj" typeface="Estrangelo Edessa"/>
+        <a:font script="Syre" typeface="Estrangelo Edessa"/>
+        <a:font script="Sora" typeface="Nirmala UI"/>
+        <a:font script="Tale" typeface="Microsoft Tai Le"/>
+        <a:font script="Talu" typeface="Microsoft New Tai Lue"/>
+        <a:font script="Tfng" typeface="Ebrima"/>
+      </a:majorFont>
+      <a:minorFont>
+        <a:latin typeface="Calibri" panose="020F0502020204030204"/>
+        <a:ea typeface=""/>
+        <a:cs typeface=""/>
+        <a:font script="Jpan" typeface="游ゴシック"/>
+        <a:font script="Hang" typeface="맑은 고딕"/>
+        <a:font script="Hans" typeface="等线"/>
+        <a:font script="Hant" typeface="新細明體"/>
+        <a:font script="Arab" typeface="Arial"/>
+        <a:font script="Hebr" typeface="Arial"/>
+        <a:font script="Thai" typeface="Cordia New"/>
+        <a:font script="Ethi" typeface="Nyala"/>
+        <a:font script="Beng" typeface="Vrinda"/>
+        <a:font script="Gujr" typeface="Shruti"/>
+        <a:font script="Khmr" typeface="DaunPenh"/>
+        <a:font script="Knda" typeface="Tunga"/>
+        <a:font script="Guru" typeface="Raavi"/>
+        <a:font script="Cans" typeface="Euphemia"/>
+        <a:font script="Cher" typeface="Plantagenet Cherokee"/>
+        <a:font script="Yiii" typeface="Microsoft Yi Baiti"/>
+        <a:font script="Tibt" typeface="Microsoft Himalaya"/>
+        <a:font script="Thaa" typeface="MV Boli"/>
+        <a:font script="Deva" typeface="Mangal"/>
+        <a:font script="Telu" typeface="Gautami"/>
+        <a:font script="Taml" typeface="Latha"/>
+        <a:font script="Syrc" typeface="Estrangelo Edessa"/>
+        <a:font script="Orya" typeface="Kalinga"/>
+        <a:font script="Mlym" typeface="Kartika"/>
+        <a:font script="Laoo" typeface="DokChampa"/>
+        <a:font script="Sinh" typeface="Iskoola Pota"/>
+        <a:font script="Mong" typeface="Mongolian Baiti"/>
+        <a:font script="Viet" typeface="Arial"/>
+        <a:font script="Uigh" typeface="Microsoft Uighur"/>
+        <a:font script="Geor" typeface="Sylfaen"/>
+        <a:font script="Armn" typeface="Arial"/>
+        <a:font script="Bugi" typeface="Leelawadee UI"/>
+        <a:font script="Bopo" typeface="Microsoft JhengHei"/>
+        <a:font script="Java" typeface="Javanese Text"/>
+        <a:font script="Lisu" typeface="Segoe UI"/>
+        <a:font script="Mymr" typeface="Myanmar Text"/>
+        <a:font script="Nkoo" typeface="Ebrima"/>
+        <a:font script="Olck" typeface="Nirmala UI"/>
+        <a:font script="Osma" typeface="Ebrima"/>
+        <a:font script="Phag" typeface="Phagspa"/>
+        <a:font script="Syrn" typeface="Estrangelo Edessa"/>
+        <a:font script="Syrj" typeface="Estrangelo Edessa"/>
+        <a:font script="Syre" typeface="Estrangelo Edessa"/>
+        <a:font script="Sora" typeface="Nirmala UI"/>
+        <a:font script="Tale" typeface="Microsoft Tai Le"/>
+        <a:font script="Talu" typeface="Microsoft New Tai Lue"/>
+        <a:font script="Tfng" typeface="Ebrima"/>
+      </a:minorFont>
+    </a:fontScheme>
+    <a:fmtScheme name="Office">
+      <a:fillStyleLst>
+        <a:solidFill>
+          <a:schemeClr val="phClr"/>
+        </a:solidFill>
+        <a:gradFill rotWithShape="1">
+          <a:gsLst>
+            <a:gs pos="0">
+              <a:schemeClr val="phClr">
+                <a:lumMod val="110000"/>
+                <a:satMod val="105000"/>
+                <a:tint val="67000"/>
+              </a:schemeClr>
+            </a:gs>
+            <a:gs pos="50000">
+              <a:schemeClr val="phClr">
+                <a:lumMod val="105000"/>
+                <a:satMod val="103000"/>
+                <a:tint val="73000"/>
+              </a:schemeClr>
+            </a:gs>
+            <a:gs pos="100000">
+              <a:schemeClr val="phClr">
+                <a:lumMod val="105000"/>
+                <a:satMod val="109000"/>
+                <a:tint val="81000"/>
+              </a:schemeClr>
+            </a:gs>
+          </a:gsLst>
+          <a:lin ang="5400000" scaled="0"/>
+        </a:gradFill>
+        <a:gradFill rotWithShape="1">
+          <a:gsLst>
+            <a:gs pos="0">
+              <a:schemeClr val="phClr">
+                <a:satMod val="103000"/>
+                <a:lumMod val="102000"/>
+                <a:tint val="94000"/>
+              </a:schemeClr>
+            </a:gs>
+            <a:gs pos="50000">
+              <a:schemeClr val="phClr">
+                <a:satMod val="110000"/>
+                <a:lumMod val="100000"/>
+                <a:shade val="100000"/>
+              </a:schemeClr>
+            </a:gs>
+            <a:gs pos="100000">
+              <a:schemeClr val="phClr">
+                <a:lumMod val="99000"/>
+                <a:satMod val="120000"/>
+                <a:shade val="78000"/>
+              </a:schemeClr>
+            </a:gs>
+          </a:gsLst>
+          <a:lin ang="5400000" scaled="0"/>
+        </a:gradFill>
+      </a:fillStyleLst>
+      <a:lnStyleLst>
+        <a:ln w="6350" cap="flat" cmpd="sng" algn="ctr">
+          <a:solidFill>
+            <a:schemeClr val="phClr"/>
+          </a:solidFill>
+          <a:prstDash val="solid"/>
+          <a:miter lim="800000"/>
+        </a:ln>
+        <a:ln w="12700" cap="flat" cmpd="sng" algn="ctr">
+          <a:solidFill>
+            <a:schemeClr val="phClr"/>
+          </a:solidFill>
+          <a:prstDash val="solid"/>
+          <a:miter lim="800000"/>
+        </a:ln>
+        <a:ln w="19050" cap="flat" cmpd="sng" algn="ctr">
+          <a:solidFill>
+            <a:schemeClr val="phClr"/>
+          </a:solidFill>
+          <a:prstDash val="solid"/>
+          <a:miter lim="800000"/>
+        </a:ln>
+      </a:lnStyleLst>
+      <a:effectStyleLst>
+        <a:effectStyle>
+          <a:effectLst/>
+        </a:effectStyle>
+        <a:effectStyle>
+          <a:effectLst/>
+        </a:effectStyle>
+        <a:effectStyle>
+          <a:effectLst>
+            <a:outerShdw blurRad="57150" dist="19050" dir="5400000" algn="ctr" rotWithShape="0">
+              <a:srgbClr val="000000">
+                <a:alpha val="63000"/>
+              </a:srgbClr>
+            </a:outerShdw>
+          </a:effectLst>
+        </a:effectStyle>
+      </a:effectStyleLst>
+      <a:bgFillStyleLst>
+        <a:solidFill>
+          <a:schemeClr val="phClr"/>
+        </a:solidFill>
+        <a:solidFill>
+          <a:schemeClr val="phClr">
+            <a:tint val="95000"/>
+            <a:satMod val="170000"/>
+          </a:schemeClr>
+        </a:solidFill>
+        <a:gradFill rotWithShape="1">
+          <a:gsLst>
+            <a:gs pos="0">
+              <a:schemeClr val="phClr">
+                <a:tint val="93000"/>
+                <a:satMod val="150000"/>
+                <a:shade val="98000"/>
+                <a:lumMod val="102000"/>
+              </a:schemeClr>
+            </a:gs>
+            <a:gs pos="50000">
+              <a:schemeClr val="phClr">
+                <a:tint val="98000"/>
+                <a:satMod val="130000"/>
+                <a:shade val="90000"/>
+                <a:lumMod val="103000"/>
+              </a:schemeClr>
+            </a:gs>
+            <a:gs pos="100000">
+              <a:schemeClr val="phClr">
+                <a:shade val="63000"/>
+                <a:satMod val="120000"/>
+              </a:schemeClr>
+            </a:gs>
+          </a:gsLst>
+          <a:lin ang="5400000" scaled="0"/>
+        </a:gradFill>
+      </a:bgFillStyleLst>
+    </a:fmtScheme>
+  </a:themeElements>
+  <a:objectDefaults/>
+  <a:extraClrSchemeLst/>
+  <a:extLst>
+    <a:ext uri="{05A4C25C-085E-4340-85A3-A5531E510DB2}">
+      <thm15:themeFamily xmlns:thm15="http://schemas.microsoft.com/office/thememl/2012/main" name="Office Theme" id="{62F939B6-93AF-4DB8-9C6B-D6C7DFDC589F}" vid="{4A3C46E8-61CC-4603-A589-7422A47A8E4A}"/>
+    </a:ext>
+  </a:extLst>
+</a:theme>
 </file>
</xml_diff>

<commit_message>
Final upload with slide updates
</commit_message>
<xml_diff>
--- a/Project 1 Div 101 Updated Slides.pptx
+++ b/Project 1 Div 101 Updated Slides.pptx
@@ -5,7 +5,7 @@
     <p:sldMasterId id="2147483673" r:id="rId1"/>
   </p:sldMasterIdLst>
   <p:notesMasterIdLst>
-    <p:notesMasterId r:id="rId22"/>
+    <p:notesMasterId r:id="rId23"/>
   </p:notesMasterIdLst>
   <p:sldIdLst>
     <p:sldId id="257" r:id="rId2"/>
@@ -28,6 +28,7 @@
     <p:sldId id="283" r:id="rId19"/>
     <p:sldId id="284" r:id="rId20"/>
     <p:sldId id="285" r:id="rId21"/>
+    <p:sldId id="288" r:id="rId22"/>
   </p:sldIdLst>
   <p:sldSz cx="12192000" cy="6858000"/>
   <p:notesSz cx="6858000" cy="9144000"/>
@@ -143,7 +144,7 @@
 <file path=ppt/revisionInfo.xml><?xml version="1.0" encoding="utf-8"?>
 <p1510:revInfo xmlns:a="http://schemas.openxmlformats.org/drawingml/2006/main" xmlns:r="http://schemas.openxmlformats.org/officeDocument/2006/relationships" xmlns:p1510="http://schemas.microsoft.com/office/powerpoint/2015/10/main">
   <p1510:revLst>
-    <p1510:client id="{FD2D1C58-4419-4CC0-B86D-C1542BBC3AE0}" v="296" dt="2020-02-04T21:27:57.361"/>
+    <p1510:client id="{FD2D1C58-4419-4CC0-B86D-C1542BBC3AE0}" v="298" dt="2020-02-04T22:39:20.415"/>
   </p1510:revLst>
 </p1510:revInfo>
 </file>
@@ -6976,7 +6977,7 @@
           <a:p>
             <a:r>
               <a:rPr lang="en-US" dirty="0"/>
-              <a:t>The price of homes in Georgia is increasing</a:t>
+              <a:t>As expected, the price of homes in Georgia is increasing year over year across zip codes.</a:t>
             </a:r>
           </a:p>
           <a:p>
@@ -7007,6 +7008,12 @@
             <a:r>
               <a:rPr lang="en-US" dirty="0"/>
               <a:t>Zip codes with fewer highly educated people in Georgia are less expensive to live in than those with more highly educated people</a:t>
+            </a:r>
+          </a:p>
+          <a:p>
+            <a:r>
+              <a:rPr lang="en-US" dirty="0"/>
+              <a:t>Many of these factors are intertwined, and a more robust analysis with a more robust data set would be helpful to identify the key factors that are most correlated with home price in an area.</a:t>
             </a:r>
           </a:p>
           <a:p>
@@ -7096,7 +7103,7 @@
         </p:spPr>
         <p:txBody>
           <a:bodyPr>
-            <a:normAutofit/>
+            <a:normAutofit fontScale="85000" lnSpcReduction="20000"/>
           </a:bodyPr>
           <a:lstStyle/>
           <a:p>
@@ -7111,7 +7118,7 @@
           <a:p>
             <a:r>
               <a:rPr lang="en-US" sz="2200" dirty="0"/>
-              <a:t>We’d love to look at how various data points are correlated.</a:t>
+              <a:t>We’d love to look at how various data points are correlated:</a:t>
             </a:r>
           </a:p>
           <a:p>
@@ -7140,6 +7147,27 @@
             <a:r>
               <a:rPr lang="en-US" sz="2000" dirty="0"/>
               <a:t>Does split of rental opportunities versus “owned” homes impact the median price of sale?</a:t>
+            </a:r>
+          </a:p>
+          <a:p>
+            <a:pPr lvl="1"/>
+            <a:r>
+              <a:rPr lang="en-US" sz="2000" dirty="0"/>
+              <a:t>What factors are caused by the increase in median home price and what factors result in an increase in home price?</a:t>
+            </a:r>
+          </a:p>
+          <a:p>
+            <a:pPr lvl="2"/>
+            <a:r>
+              <a:rPr lang="en-US" sz="1900" dirty="0"/>
+              <a:t>i.e., do prices move down as poverty rates increase, or vice versa?</a:t>
+            </a:r>
+          </a:p>
+          <a:p>
+            <a:pPr lvl="2"/>
+            <a:r>
+              <a:rPr lang="en-US" sz="1900" dirty="0"/>
+              <a:t>Does having more Starbucks Coffee’s or Chipotle’s open in a neighborhood result in the price of rent increasing? Or does Starbucks Coffee and Chipotle select locations that have recently seen a wealthier clientele move in?</a:t>
             </a:r>
           </a:p>
           <a:p>
@@ -7680,6 +7708,93 @@
 </p:sld>
 </file>
 
+<file path=ppt/slides/slide21.xml><?xml version="1.0" encoding="utf-8"?>
+<p:sld xmlns:a="http://schemas.openxmlformats.org/drawingml/2006/main" xmlns:r="http://schemas.openxmlformats.org/officeDocument/2006/relationships" xmlns:p="http://schemas.openxmlformats.org/presentationml/2006/main">
+  <p:cSld>
+    <p:spTree>
+      <p:nvGrpSpPr>
+        <p:cNvPr id="1" name=""/>
+        <p:cNvGrpSpPr/>
+        <p:nvPr/>
+      </p:nvGrpSpPr>
+      <p:grpSpPr>
+        <a:xfrm>
+          <a:off x="0" y="0"/>
+          <a:ext cx="0" cy="0"/>
+          <a:chOff x="0" y="0"/>
+          <a:chExt cx="0" cy="0"/>
+        </a:xfrm>
+      </p:grpSpPr>
+      <p:sp>
+        <p:nvSpPr>
+          <p:cNvPr id="2" name="Title 1">
+            <a:extLst>
+              <a:ext uri="{FF2B5EF4-FFF2-40B4-BE49-F238E27FC236}">
+                <a16:creationId xmlns:a16="http://schemas.microsoft.com/office/drawing/2014/main" id="{F01DD420-5DB4-4BA1-A04C-24691092FA46}"/>
+              </a:ext>
+            </a:extLst>
+          </p:cNvPr>
+          <p:cNvSpPr>
+            <a:spLocks noGrp="1"/>
+          </p:cNvSpPr>
+          <p:nvPr>
+            <p:ph type="title"/>
+          </p:nvPr>
+        </p:nvSpPr>
+        <p:spPr/>
+        <p:txBody>
+          <a:bodyPr/>
+          <a:lstStyle/>
+          <a:p>
+            <a:r>
+              <a:rPr lang="en-US" dirty="0"/>
+              <a:t>Merging Zillow Data with Census Data</a:t>
+            </a:r>
+          </a:p>
+        </p:txBody>
+      </p:sp>
+      <p:pic>
+        <p:nvPicPr>
+          <p:cNvPr id="4" name="Picture 3">
+            <a:extLst>
+              <a:ext uri="{FF2B5EF4-FFF2-40B4-BE49-F238E27FC236}">
+                <a16:creationId xmlns:a16="http://schemas.microsoft.com/office/drawing/2014/main" id="{2F1B1481-2371-460D-B0E3-A57FFAEC677B}"/>
+              </a:ext>
+            </a:extLst>
+          </p:cNvPr>
+          <p:cNvPicPr>
+            <a:picLocks noChangeAspect="1"/>
+          </p:cNvPicPr>
+          <p:nvPr/>
+        </p:nvPicPr>
+        <p:blipFill rotWithShape="1">
+          <a:blip r:embed="rId2"/>
+          <a:srcRect r="9656"/>
+          <a:stretch/>
+        </p:blipFill>
+        <p:spPr>
+          <a:xfrm>
+            <a:off x="1956863" y="1816165"/>
+            <a:ext cx="8278273" cy="4352885"/>
+          </a:xfrm>
+          <a:prstGeom prst="rect">
+            <a:avLst/>
+          </a:prstGeom>
+        </p:spPr>
+      </p:pic>
+    </p:spTree>
+    <p:extLst>
+      <p:ext uri="{BB962C8B-B14F-4D97-AF65-F5344CB8AC3E}">
+        <p14:creationId xmlns:p14="http://schemas.microsoft.com/office/powerpoint/2010/main" val="2265768901"/>
+      </p:ext>
+    </p:extLst>
+  </p:cSld>
+  <p:clrMapOvr>
+    <a:masterClrMapping/>
+  </p:clrMapOvr>
+</p:sld>
+</file>
+
 <file path=ppt/slides/slide3.xml><?xml version="1.0" encoding="utf-8"?>
 <p:sld xmlns:a="http://schemas.openxmlformats.org/drawingml/2006/main" xmlns:r="http://schemas.openxmlformats.org/officeDocument/2006/relationships" xmlns:p="http://schemas.openxmlformats.org/presentationml/2006/main">
   <p:cSld>
@@ -7776,7 +7891,7 @@
             </a:r>
             <a:r>
               <a:rPr lang="en-US" sz="2400" dirty="0"/>
-              <a:t>Can we look for correlations between median home price and various external factors year over year at the total state level and at the zip code level and see whether they are correlated to increases and decreases in median price.</a:t>
+              <a:t>Look for correlations between median home price and various external factors year over year at the total state level and at the zip code level and see whether they are correlated to increases and decreases in median price.</a:t>
             </a:r>
           </a:p>
         </p:txBody>

</xml_diff>

<commit_message>
Final Slide Updates 2.4, Presentation draft
</commit_message>
<xml_diff>
--- a/Project 1 Div 101 Updated Slides.pptx
+++ b/Project 1 Div 101 Updated Slides.pptx
@@ -5,7 +5,7 @@
     <p:sldMasterId id="2147483673" r:id="rId1"/>
   </p:sldMasterIdLst>
   <p:notesMasterIdLst>
-    <p:notesMasterId r:id="rId23"/>
+    <p:notesMasterId r:id="rId25"/>
   </p:notesMasterIdLst>
   <p:sldIdLst>
     <p:sldId id="257" r:id="rId2"/>
@@ -13,22 +13,24 @@
     <p:sldId id="262" r:id="rId4"/>
     <p:sldId id="263" r:id="rId5"/>
     <p:sldId id="264" r:id="rId6"/>
-    <p:sldId id="272" r:id="rId7"/>
-    <p:sldId id="274" r:id="rId8"/>
-    <p:sldId id="275" r:id="rId9"/>
-    <p:sldId id="276" r:id="rId10"/>
-    <p:sldId id="278" r:id="rId11"/>
-    <p:sldId id="277" r:id="rId12"/>
-    <p:sldId id="286" r:id="rId13"/>
-    <p:sldId id="281" r:id="rId14"/>
-    <p:sldId id="287" r:id="rId15"/>
-    <p:sldId id="279" r:id="rId16"/>
-    <p:sldId id="267" r:id="rId17"/>
-    <p:sldId id="282" r:id="rId18"/>
-    <p:sldId id="283" r:id="rId19"/>
-    <p:sldId id="284" r:id="rId20"/>
-    <p:sldId id="285" r:id="rId21"/>
-    <p:sldId id="288" r:id="rId22"/>
+    <p:sldId id="289" r:id="rId7"/>
+    <p:sldId id="272" r:id="rId8"/>
+    <p:sldId id="274" r:id="rId9"/>
+    <p:sldId id="275" r:id="rId10"/>
+    <p:sldId id="276" r:id="rId11"/>
+    <p:sldId id="290" r:id="rId12"/>
+    <p:sldId id="278" r:id="rId13"/>
+    <p:sldId id="277" r:id="rId14"/>
+    <p:sldId id="286" r:id="rId15"/>
+    <p:sldId id="281" r:id="rId16"/>
+    <p:sldId id="287" r:id="rId17"/>
+    <p:sldId id="279" r:id="rId18"/>
+    <p:sldId id="267" r:id="rId19"/>
+    <p:sldId id="282" r:id="rId20"/>
+    <p:sldId id="283" r:id="rId21"/>
+    <p:sldId id="284" r:id="rId22"/>
+    <p:sldId id="285" r:id="rId23"/>
+    <p:sldId id="288" r:id="rId24"/>
   </p:sldIdLst>
   <p:sldSz cx="12192000" cy="6858000"/>
   <p:notesSz cx="6858000" cy="9144000"/>
@@ -144,7 +146,7 @@
 <file path=ppt/revisionInfo.xml><?xml version="1.0" encoding="utf-8"?>
 <p1510:revInfo xmlns:a="http://schemas.openxmlformats.org/drawingml/2006/main" xmlns:r="http://schemas.openxmlformats.org/officeDocument/2006/relationships" xmlns:p1510="http://schemas.microsoft.com/office/powerpoint/2015/10/main">
   <p1510:revLst>
-    <p1510:client id="{FD2D1C58-4419-4CC0-B86D-C1542BBC3AE0}" v="298" dt="2020-02-04T22:39:20.415"/>
+    <p1510:client id="{FD2D1C58-4419-4CC0-B86D-C1542BBC3AE0}" v="313" dt="2020-02-04T23:35:05.881"/>
   </p1510:revLst>
 </p1510:revInfo>
 </file>
@@ -4958,36 +4960,12 @@
               </a:spcAft>
             </a:pPr>
             <a:r>
-              <a:rPr lang="en-US" dirty="0" err="1">
-                <a:solidFill>
-                  <a:schemeClr val="tx1"/>
-                </a:solidFill>
-              </a:rPr>
-              <a:t>Yannik</a:t>
-            </a:r>
-            <a:r>
               <a:rPr lang="en-US" dirty="0">
                 <a:solidFill>
                   <a:schemeClr val="tx1"/>
                 </a:solidFill>
               </a:rPr>
-              <a:t> </a:t>
-            </a:r>
-            <a:r>
-              <a:rPr lang="en-US" dirty="0" err="1">
-                <a:solidFill>
-                  <a:schemeClr val="tx1"/>
-                </a:solidFill>
-              </a:rPr>
-              <a:t>Alinyoh</a:t>
-            </a:r>
-            <a:r>
-              <a:rPr lang="en-US" dirty="0">
-                <a:solidFill>
-                  <a:schemeClr val="tx1"/>
-                </a:solidFill>
-              </a:rPr>
-              <a:t>		Kevin Balhoff</a:t>
+              <a:t>Yannik Alinyoh		Kevin Balhoff</a:t>
             </a:r>
           </a:p>
           <a:p>
@@ -5328,7 +5306,7 @@
           <p:cNvPr id="2" name="Title 1">
             <a:extLst>
               <a:ext uri="{FF2B5EF4-FFF2-40B4-BE49-F238E27FC236}">
-                <a16:creationId xmlns:a16="http://schemas.microsoft.com/office/drawing/2014/main" id="{80424138-66F7-4170-87EC-2D22214AAA7E}"/>
+                <a16:creationId xmlns:a16="http://schemas.microsoft.com/office/drawing/2014/main" id="{318BCF67-E019-4BB8-9AB2-F752B055A462}"/>
               </a:ext>
             </a:extLst>
           </p:cNvPr>
@@ -5346,48 +5324,132 @@
           <a:p>
             <a:r>
               <a:rPr lang="en-US" dirty="0"/>
-              <a:t>Hold for </a:t>
-            </a:r>
-            <a:r>
-              <a:rPr lang="en-US" dirty="0" err="1"/>
-              <a:t>Yannik</a:t>
-            </a:r>
-            <a:r>
-              <a:rPr lang="en-US" dirty="0"/>
-              <a:t> Slides (Population Growth)</a:t>
-            </a:r>
-          </a:p>
-        </p:txBody>
-      </p:sp>
-      <p:sp>
-        <p:nvSpPr>
-          <p:cNvPr id="3" name="Content Placeholder 2">
+              <a:t>Median Income in Metro Atlanta</a:t>
+            </a:r>
+          </a:p>
+        </p:txBody>
+      </p:sp>
+      <p:pic>
+        <p:nvPicPr>
+          <p:cNvPr id="4" name="Picture 3">
             <a:extLst>
               <a:ext uri="{FF2B5EF4-FFF2-40B4-BE49-F238E27FC236}">
-                <a16:creationId xmlns:a16="http://schemas.microsoft.com/office/drawing/2014/main" id="{C6FF12C0-6FE2-45DE-8176-662DBDFD9565}"/>
+                <a16:creationId xmlns:a16="http://schemas.microsoft.com/office/drawing/2014/main" id="{B051C29A-8F78-416F-AB76-FAE05BF8FCE7}"/>
               </a:ext>
             </a:extLst>
           </p:cNvPr>
-          <p:cNvSpPr>
-            <a:spLocks noGrp="1"/>
-          </p:cNvSpPr>
-          <p:nvPr>
-            <p:ph idx="1"/>
-          </p:nvPr>
-        </p:nvSpPr>
-        <p:spPr/>
+          <p:cNvPicPr/>
+          <p:nvPr/>
+        </p:nvPicPr>
+        <p:blipFill>
+          <a:blip r:embed="rId2">
+            <a:extLst>
+              <a:ext uri="{28A0092B-C50C-407E-A947-70E740481C1C}">
+                <a14:useLocalDpi xmlns:a14="http://schemas.microsoft.com/office/drawing/2010/main" val="0"/>
+              </a:ext>
+            </a:extLst>
+          </a:blip>
+          <a:srcRect/>
+          <a:stretch>
+            <a:fillRect/>
+          </a:stretch>
+        </p:blipFill>
+        <p:spPr bwMode="auto">
+          <a:xfrm>
+            <a:off x="3124200" y="1681983"/>
+            <a:ext cx="5943600" cy="4457700"/>
+          </a:xfrm>
+          <a:prstGeom prst="rect">
+            <a:avLst/>
+          </a:prstGeom>
+          <a:noFill/>
+          <a:ln>
+            <a:noFill/>
+          </a:ln>
+        </p:spPr>
+      </p:pic>
+      <p:sp>
+        <p:nvSpPr>
+          <p:cNvPr id="5" name="TextBox 4">
+            <a:extLst>
+              <a:ext uri="{FF2B5EF4-FFF2-40B4-BE49-F238E27FC236}">
+                <a16:creationId xmlns:a16="http://schemas.microsoft.com/office/drawing/2014/main" id="{72FB1970-B899-4A61-B92F-58AAA61B58E3}"/>
+              </a:ext>
+            </a:extLst>
+          </p:cNvPr>
+          <p:cNvSpPr txBox="1"/>
+          <p:nvPr/>
+        </p:nvSpPr>
+        <p:spPr>
+          <a:xfrm>
+            <a:off x="9272588" y="3172169"/>
+            <a:ext cx="2347913" cy="1477328"/>
+          </a:xfrm>
+          <a:prstGeom prst="rect">
+            <a:avLst/>
+          </a:prstGeom>
+          <a:solidFill>
+            <a:schemeClr val="tx1">
+              <a:lumMod val="65000"/>
+              <a:lumOff val="35000"/>
+            </a:schemeClr>
+          </a:solidFill>
+        </p:spPr>
+        <p:txBody>
+          <a:bodyPr wrap="square" rtlCol="0">
+            <a:spAutoFit/>
+          </a:bodyPr>
+          <a:lstStyle/>
+          <a:p>
+            <a:pPr algn="ctr"/>
+            <a:r>
+              <a:rPr lang="en-US" dirty="0">
+                <a:solidFill>
+                  <a:schemeClr val="bg1"/>
+                </a:solidFill>
+              </a:rPr>
+              <a:t>Takeaway: Median Income increases year over year in the Metro Atlanta area.</a:t>
+            </a:r>
+          </a:p>
+        </p:txBody>
+      </p:sp>
+      <p:sp>
+        <p:nvSpPr>
+          <p:cNvPr id="6" name="Footer Placeholder 3">
+            <a:extLst>
+              <a:ext uri="{FF2B5EF4-FFF2-40B4-BE49-F238E27FC236}">
+                <a16:creationId xmlns:a16="http://schemas.microsoft.com/office/drawing/2014/main" id="{0670D8E0-1CE2-4A80-B75A-FF873F741857}"/>
+              </a:ext>
+            </a:extLst>
+          </p:cNvPr>
+          <p:cNvSpPr>
+            <a:spLocks noGrp="1"/>
+          </p:cNvSpPr>
+          <p:nvPr>
+            <p:ph type="ftr" sz="quarter" idx="11"/>
+          </p:nvPr>
+        </p:nvSpPr>
+        <p:spPr>
+          <a:xfrm>
+            <a:off x="1066800" y="6035040"/>
+            <a:ext cx="5816600" cy="365760"/>
+          </a:xfrm>
+        </p:spPr>
         <p:txBody>
           <a:bodyPr/>
           <a:lstStyle/>
           <a:p>
-            <a:endParaRPr lang="en-US"/>
+            <a:r>
+              <a:rPr lang="en-US" dirty="0"/>
+              <a:t>DataUSA.io</a:t>
+            </a:r>
           </a:p>
         </p:txBody>
       </p:sp>
     </p:spTree>
     <p:extLst>
       <p:ext uri="{BB962C8B-B14F-4D97-AF65-F5344CB8AC3E}">
-        <p14:creationId xmlns:p14="http://schemas.microsoft.com/office/powerpoint/2010/main" val="1312312425"/>
+        <p14:creationId xmlns:p14="http://schemas.microsoft.com/office/powerpoint/2010/main" val="2593583500"/>
       </p:ext>
     </p:extLst>
   </p:cSld>
@@ -5419,7 +5481,7 @@
           <p:cNvPr id="2" name="Title 1">
             <a:extLst>
               <a:ext uri="{FF2B5EF4-FFF2-40B4-BE49-F238E27FC236}">
-                <a16:creationId xmlns:a16="http://schemas.microsoft.com/office/drawing/2014/main" id="{737F0781-F9D8-4B95-A554-A082FD9AB1B4}"/>
+                <a16:creationId xmlns:a16="http://schemas.microsoft.com/office/drawing/2014/main" id="{3007F014-ECBF-4261-BB80-E59343A1C187}"/>
               </a:ext>
             </a:extLst>
           </p:cNvPr>
@@ -5437,22 +5499,22 @@
           <a:p>
             <a:r>
               <a:rPr lang="en-US" dirty="0"/>
-              <a:t>Does Poverty Rate Impact Home Price?</a:t>
+              <a:t>Wage Distribution in Georgia</a:t>
             </a:r>
           </a:p>
         </p:txBody>
       </p:sp>
       <p:pic>
         <p:nvPicPr>
-          <p:cNvPr id="7174" name="Picture 6">
+          <p:cNvPr id="6" name="Picture 5">
             <a:extLst>
               <a:ext uri="{FF2B5EF4-FFF2-40B4-BE49-F238E27FC236}">
-                <a16:creationId xmlns:a16="http://schemas.microsoft.com/office/drawing/2014/main" id="{34F8770E-A483-4123-A1F9-E02C8EB93E61}"/>
+                <a16:creationId xmlns:a16="http://schemas.microsoft.com/office/drawing/2014/main" id="{41267781-7F32-4C49-B4DF-0E506A992585}"/>
               </a:ext>
             </a:extLst>
           </p:cNvPr>
           <p:cNvPicPr>
-            <a:picLocks noChangeAspect="1" noChangeArrowheads="1"/>
+            <a:picLocks noChangeAspect="1"/>
           </p:cNvPicPr>
           <p:nvPr/>
         </p:nvPicPr>
@@ -5464,223 +5526,26 @@
               </a:ext>
             </a:extLst>
           </a:blip>
-          <a:srcRect/>
           <a:stretch>
             <a:fillRect/>
           </a:stretch>
         </p:blipFill>
-        <p:spPr bwMode="auto">
-          <a:xfrm>
-            <a:off x="9086508" y="2474907"/>
-            <a:ext cx="2737724" cy="2737724"/>
+        <p:spPr>
+          <a:xfrm>
+            <a:off x="3664743" y="1923706"/>
+            <a:ext cx="4862513" cy="3842528"/>
           </a:xfrm>
           <a:prstGeom prst="rect">
             <a:avLst/>
           </a:prstGeom>
-          <a:noFill/>
-          <a:extLst>
-            <a:ext uri="{909E8E84-426E-40DD-AFC4-6F175D3DCCD1}">
-              <a14:hiddenFill xmlns:a14="http://schemas.microsoft.com/office/drawing/2010/main">
-                <a:solidFill>
-                  <a:srgbClr val="FFFFFF"/>
-                </a:solidFill>
-              </a14:hiddenFill>
-            </a:ext>
-          </a:extLst>
         </p:spPr>
       </p:pic>
-      <p:pic>
-        <p:nvPicPr>
-          <p:cNvPr id="7176" name="Picture 8">
+      <p:sp>
+        <p:nvSpPr>
+          <p:cNvPr id="7" name="Footer Placeholder 3">
             <a:extLst>
               <a:ext uri="{FF2B5EF4-FFF2-40B4-BE49-F238E27FC236}">
-                <a16:creationId xmlns:a16="http://schemas.microsoft.com/office/drawing/2014/main" id="{315406DA-CA0C-4684-8808-8220F1618DB3}"/>
-              </a:ext>
-            </a:extLst>
-          </p:cNvPr>
-          <p:cNvPicPr>
-            <a:picLocks noChangeAspect="1" noChangeArrowheads="1"/>
-          </p:cNvPicPr>
-          <p:nvPr/>
-        </p:nvPicPr>
-        <p:blipFill>
-          <a:blip r:embed="rId3">
-            <a:extLst>
-              <a:ext uri="{28A0092B-C50C-407E-A947-70E740481C1C}">
-                <a14:useLocalDpi xmlns:a14="http://schemas.microsoft.com/office/drawing/2010/main" val="0"/>
-              </a:ext>
-            </a:extLst>
-          </a:blip>
-          <a:srcRect/>
-          <a:stretch>
-            <a:fillRect/>
-          </a:stretch>
-        </p:blipFill>
-        <p:spPr bwMode="auto">
-          <a:xfrm>
-            <a:off x="6155091" y="2474907"/>
-            <a:ext cx="2737724" cy="2737724"/>
-          </a:xfrm>
-          <a:prstGeom prst="rect">
-            <a:avLst/>
-          </a:prstGeom>
-          <a:noFill/>
-          <a:extLst>
-            <a:ext uri="{909E8E84-426E-40DD-AFC4-6F175D3DCCD1}">
-              <a14:hiddenFill xmlns:a14="http://schemas.microsoft.com/office/drawing/2010/main">
-                <a:solidFill>
-                  <a:srgbClr val="FFFFFF"/>
-                </a:solidFill>
-              </a14:hiddenFill>
-            </a:ext>
-          </a:extLst>
-        </p:spPr>
-      </p:pic>
-      <p:pic>
-        <p:nvPicPr>
-          <p:cNvPr id="7178" name="Picture 10">
-            <a:extLst>
-              <a:ext uri="{FF2B5EF4-FFF2-40B4-BE49-F238E27FC236}">
-                <a16:creationId xmlns:a16="http://schemas.microsoft.com/office/drawing/2014/main" id="{00DB5FBB-840C-4651-B15D-5F5C8B2D9756}"/>
-              </a:ext>
-            </a:extLst>
-          </p:cNvPr>
-          <p:cNvPicPr>
-            <a:picLocks noChangeAspect="1" noChangeArrowheads="1"/>
-          </p:cNvPicPr>
-          <p:nvPr/>
-        </p:nvPicPr>
-        <p:blipFill>
-          <a:blip r:embed="rId4">
-            <a:extLst>
-              <a:ext uri="{28A0092B-C50C-407E-A947-70E740481C1C}">
-                <a14:useLocalDpi xmlns:a14="http://schemas.microsoft.com/office/drawing/2010/main" val="0"/>
-              </a:ext>
-            </a:extLst>
-          </a:blip>
-          <a:srcRect/>
-          <a:stretch>
-            <a:fillRect/>
-          </a:stretch>
-        </p:blipFill>
-        <p:spPr bwMode="auto">
-          <a:xfrm>
-            <a:off x="3267479" y="2474908"/>
-            <a:ext cx="2737723" cy="2737723"/>
-          </a:xfrm>
-          <a:prstGeom prst="rect">
-            <a:avLst/>
-          </a:prstGeom>
-          <a:noFill/>
-          <a:extLst>
-            <a:ext uri="{909E8E84-426E-40DD-AFC4-6F175D3DCCD1}">
-              <a14:hiddenFill xmlns:a14="http://schemas.microsoft.com/office/drawing/2010/main">
-                <a:solidFill>
-                  <a:srgbClr val="FFFFFF"/>
-                </a:solidFill>
-              </a14:hiddenFill>
-            </a:ext>
-          </a:extLst>
-        </p:spPr>
-      </p:pic>
-      <p:pic>
-        <p:nvPicPr>
-          <p:cNvPr id="7180" name="Picture 12">
-            <a:extLst>
-              <a:ext uri="{FF2B5EF4-FFF2-40B4-BE49-F238E27FC236}">
-                <a16:creationId xmlns:a16="http://schemas.microsoft.com/office/drawing/2014/main" id="{4DA0EA7E-1C91-4230-BF76-167A20DC20DF}"/>
-              </a:ext>
-            </a:extLst>
-          </p:cNvPr>
-          <p:cNvPicPr>
-            <a:picLocks noChangeAspect="1" noChangeArrowheads="1"/>
-          </p:cNvPicPr>
-          <p:nvPr/>
-        </p:nvPicPr>
-        <p:blipFill>
-          <a:blip r:embed="rId5">
-            <a:extLst>
-              <a:ext uri="{28A0092B-C50C-407E-A947-70E740481C1C}">
-                <a14:useLocalDpi xmlns:a14="http://schemas.microsoft.com/office/drawing/2010/main" val="0"/>
-              </a:ext>
-            </a:extLst>
-          </a:blip>
-          <a:srcRect/>
-          <a:stretch>
-            <a:fillRect/>
-          </a:stretch>
-        </p:blipFill>
-        <p:spPr bwMode="auto">
-          <a:xfrm>
-            <a:off x="400619" y="2474908"/>
-            <a:ext cx="2737724" cy="2737724"/>
-          </a:xfrm>
-          <a:prstGeom prst="rect">
-            <a:avLst/>
-          </a:prstGeom>
-          <a:noFill/>
-          <a:extLst>
-            <a:ext uri="{909E8E84-426E-40DD-AFC4-6F175D3DCCD1}">
-              <a14:hiddenFill xmlns:a14="http://schemas.microsoft.com/office/drawing/2010/main">
-                <a:solidFill>
-                  <a:srgbClr val="FFFFFF"/>
-                </a:solidFill>
-              </a14:hiddenFill>
-            </a:ext>
-          </a:extLst>
-        </p:spPr>
-      </p:pic>
-      <p:sp>
-        <p:nvSpPr>
-          <p:cNvPr id="10" name="TextBox 9">
-            <a:extLst>
-              <a:ext uri="{FF2B5EF4-FFF2-40B4-BE49-F238E27FC236}">
-                <a16:creationId xmlns:a16="http://schemas.microsoft.com/office/drawing/2014/main" id="{0D29C158-19A2-4F58-8609-AF2096620483}"/>
-              </a:ext>
-            </a:extLst>
-          </p:cNvPr>
-          <p:cNvSpPr txBox="1"/>
-          <p:nvPr/>
-        </p:nvSpPr>
-        <p:spPr>
-          <a:xfrm>
-            <a:off x="1271217" y="5573233"/>
-            <a:ext cx="9853983" cy="369332"/>
-          </a:xfrm>
-          <a:prstGeom prst="rect">
-            <a:avLst/>
-          </a:prstGeom>
-          <a:solidFill>
-            <a:schemeClr val="tx1">
-              <a:lumMod val="65000"/>
-              <a:lumOff val="35000"/>
-            </a:schemeClr>
-          </a:solidFill>
-        </p:spPr>
-        <p:txBody>
-          <a:bodyPr wrap="square" rtlCol="0">
-            <a:spAutoFit/>
-          </a:bodyPr>
-          <a:lstStyle/>
-          <a:p>
-            <a:pPr algn="ctr"/>
-            <a:r>
-              <a:rPr lang="en-US" dirty="0">
-                <a:solidFill>
-                  <a:schemeClr val="bg1"/>
-                </a:solidFill>
-              </a:rPr>
-              <a:t>Takeaway: Median home price increases across years when the poverty rate increases</a:t>
-            </a:r>
-          </a:p>
-        </p:txBody>
-      </p:sp>
-      <p:sp>
-        <p:nvSpPr>
-          <p:cNvPr id="11" name="Footer Placeholder 3">
-            <a:extLst>
-              <a:ext uri="{FF2B5EF4-FFF2-40B4-BE49-F238E27FC236}">
-                <a16:creationId xmlns:a16="http://schemas.microsoft.com/office/drawing/2014/main" id="{3C750B37-1312-493D-B453-CFB28601C81B}"/>
+                <a16:creationId xmlns:a16="http://schemas.microsoft.com/office/drawing/2014/main" id="{D1B91FB3-5D5B-4191-A639-ADC6FE484B3E}"/>
               </a:ext>
             </a:extLst>
           </p:cNvPr>
@@ -5703,187 +5568,7 @@
           <a:p>
             <a:r>
               <a:rPr lang="en-US" dirty="0"/>
-              <a:t>Zillow Research Data, Census API Data</a:t>
-            </a:r>
-          </a:p>
-        </p:txBody>
-      </p:sp>
-      <p:sp>
-        <p:nvSpPr>
-          <p:cNvPr id="12" name="TextBox 11">
-            <a:extLst>
-              <a:ext uri="{FF2B5EF4-FFF2-40B4-BE49-F238E27FC236}">
-                <a16:creationId xmlns:a16="http://schemas.microsoft.com/office/drawing/2014/main" id="{16F0F219-CDCB-41AA-90E5-0143869F9A24}"/>
-              </a:ext>
-            </a:extLst>
-          </p:cNvPr>
-          <p:cNvSpPr txBox="1"/>
-          <p:nvPr/>
-        </p:nvSpPr>
-        <p:spPr>
-          <a:xfrm>
-            <a:off x="832723" y="1948031"/>
-            <a:ext cx="1873516" cy="369332"/>
-          </a:xfrm>
-          <a:prstGeom prst="rect">
-            <a:avLst/>
-          </a:prstGeom>
-          <a:solidFill>
-            <a:schemeClr val="tx1">
-              <a:lumMod val="65000"/>
-              <a:lumOff val="35000"/>
-            </a:schemeClr>
-          </a:solidFill>
-        </p:spPr>
-        <p:txBody>
-          <a:bodyPr wrap="square" rtlCol="0">
-            <a:spAutoFit/>
-          </a:bodyPr>
-          <a:lstStyle/>
-          <a:p>
-            <a:pPr algn="ctr"/>
-            <a:r>
-              <a:rPr lang="en-US" dirty="0">
-                <a:solidFill>
-                  <a:schemeClr val="bg1"/>
-                </a:solidFill>
-              </a:rPr>
-              <a:t>2015</a:t>
-            </a:r>
-          </a:p>
-        </p:txBody>
-      </p:sp>
-      <p:sp>
-        <p:nvSpPr>
-          <p:cNvPr id="13" name="TextBox 12">
-            <a:extLst>
-              <a:ext uri="{FF2B5EF4-FFF2-40B4-BE49-F238E27FC236}">
-                <a16:creationId xmlns:a16="http://schemas.microsoft.com/office/drawing/2014/main" id="{07FD693C-8911-43FE-8B3D-2364366B520D}"/>
-              </a:ext>
-            </a:extLst>
-          </p:cNvPr>
-          <p:cNvSpPr txBox="1"/>
-          <p:nvPr/>
-        </p:nvSpPr>
-        <p:spPr>
-          <a:xfrm>
-            <a:off x="3699582" y="1948031"/>
-            <a:ext cx="1873516" cy="369332"/>
-          </a:xfrm>
-          <a:prstGeom prst="rect">
-            <a:avLst/>
-          </a:prstGeom>
-          <a:solidFill>
-            <a:schemeClr val="tx1">
-              <a:lumMod val="65000"/>
-              <a:lumOff val="35000"/>
-            </a:schemeClr>
-          </a:solidFill>
-        </p:spPr>
-        <p:txBody>
-          <a:bodyPr wrap="square" rtlCol="0">
-            <a:spAutoFit/>
-          </a:bodyPr>
-          <a:lstStyle/>
-          <a:p>
-            <a:pPr algn="ctr"/>
-            <a:r>
-              <a:rPr lang="en-US" dirty="0">
-                <a:solidFill>
-                  <a:schemeClr val="bg1"/>
-                </a:solidFill>
-              </a:rPr>
-              <a:t>2016</a:t>
-            </a:r>
-          </a:p>
-        </p:txBody>
-      </p:sp>
-      <p:sp>
-        <p:nvSpPr>
-          <p:cNvPr id="14" name="TextBox 13">
-            <a:extLst>
-              <a:ext uri="{FF2B5EF4-FFF2-40B4-BE49-F238E27FC236}">
-                <a16:creationId xmlns:a16="http://schemas.microsoft.com/office/drawing/2014/main" id="{01AC2F9C-B4DE-4480-B02D-33FE67E67EC6}"/>
-              </a:ext>
-            </a:extLst>
-          </p:cNvPr>
-          <p:cNvSpPr txBox="1"/>
-          <p:nvPr/>
-        </p:nvSpPr>
-        <p:spPr>
-          <a:xfrm>
-            <a:off x="6618904" y="1948031"/>
-            <a:ext cx="1873516" cy="369332"/>
-          </a:xfrm>
-          <a:prstGeom prst="rect">
-            <a:avLst/>
-          </a:prstGeom>
-          <a:solidFill>
-            <a:schemeClr val="tx1">
-              <a:lumMod val="65000"/>
-              <a:lumOff val="35000"/>
-            </a:schemeClr>
-          </a:solidFill>
-        </p:spPr>
-        <p:txBody>
-          <a:bodyPr wrap="square" rtlCol="0">
-            <a:spAutoFit/>
-          </a:bodyPr>
-          <a:lstStyle/>
-          <a:p>
-            <a:pPr algn="ctr"/>
-            <a:r>
-              <a:rPr lang="en-US" dirty="0">
-                <a:solidFill>
-                  <a:schemeClr val="bg1"/>
-                </a:solidFill>
-              </a:rPr>
-              <a:t>2017</a:t>
-            </a:r>
-          </a:p>
-        </p:txBody>
-      </p:sp>
-      <p:sp>
-        <p:nvSpPr>
-          <p:cNvPr id="15" name="TextBox 14">
-            <a:extLst>
-              <a:ext uri="{FF2B5EF4-FFF2-40B4-BE49-F238E27FC236}">
-                <a16:creationId xmlns:a16="http://schemas.microsoft.com/office/drawing/2014/main" id="{B6E8AF94-3096-4EA7-99C1-3291401B5D51}"/>
-              </a:ext>
-            </a:extLst>
-          </p:cNvPr>
-          <p:cNvSpPr txBox="1"/>
-          <p:nvPr/>
-        </p:nvSpPr>
-        <p:spPr>
-          <a:xfrm>
-            <a:off x="9631316" y="1948031"/>
-            <a:ext cx="1873516" cy="369332"/>
-          </a:xfrm>
-          <a:prstGeom prst="rect">
-            <a:avLst/>
-          </a:prstGeom>
-          <a:solidFill>
-            <a:schemeClr val="tx1">
-              <a:lumMod val="65000"/>
-              <a:lumOff val="35000"/>
-            </a:schemeClr>
-          </a:solidFill>
-        </p:spPr>
-        <p:txBody>
-          <a:bodyPr wrap="square" rtlCol="0">
-            <a:spAutoFit/>
-          </a:bodyPr>
-          <a:lstStyle/>
-          <a:p>
-            <a:pPr algn="ctr"/>
-            <a:r>
-              <a:rPr lang="en-US" dirty="0">
-                <a:solidFill>
-                  <a:schemeClr val="bg1"/>
-                </a:solidFill>
-              </a:rPr>
-              <a:t>2018</a:t>
+              <a:t>DataUSA.io</a:t>
             </a:r>
           </a:p>
         </p:txBody>
@@ -5891,7 +5576,7 @@
     </p:spTree>
     <p:extLst>
       <p:ext uri="{BB962C8B-B14F-4D97-AF65-F5344CB8AC3E}">
-        <p14:creationId xmlns:p14="http://schemas.microsoft.com/office/powerpoint/2010/main" val="1680002086"/>
+        <p14:creationId xmlns:p14="http://schemas.microsoft.com/office/powerpoint/2010/main" val="3320407996"/>
       </p:ext>
     </p:extLst>
   </p:cSld>
@@ -5923,7 +5608,7 @@
           <p:cNvPr id="2" name="Title 1">
             <a:extLst>
               <a:ext uri="{FF2B5EF4-FFF2-40B4-BE49-F238E27FC236}">
-                <a16:creationId xmlns:a16="http://schemas.microsoft.com/office/drawing/2014/main" id="{737F0781-F9D8-4B95-A554-A082FD9AB1B4}"/>
+                <a16:creationId xmlns:a16="http://schemas.microsoft.com/office/drawing/2014/main" id="{80424138-66F7-4170-87EC-2D22214AAA7E}"/>
               </a:ext>
             </a:extLst>
           </p:cNvPr>
@@ -5936,458 +5621,137 @@
         </p:nvSpPr>
         <p:spPr/>
         <p:txBody>
-          <a:bodyPr/>
-          <a:lstStyle/>
-          <a:p>
-            <a:r>
-              <a:rPr lang="en-US" dirty="0"/>
-              <a:t>Does Unemployment Rate Impact House Price?</a:t>
-            </a:r>
-          </a:p>
-        </p:txBody>
-      </p:sp>
-      <p:sp>
-        <p:nvSpPr>
-          <p:cNvPr id="10" name="TextBox 9">
-            <a:extLst>
-              <a:ext uri="{FF2B5EF4-FFF2-40B4-BE49-F238E27FC236}">
-                <a16:creationId xmlns:a16="http://schemas.microsoft.com/office/drawing/2014/main" id="{0D29C158-19A2-4F58-8609-AF2096620483}"/>
-              </a:ext>
-            </a:extLst>
-          </p:cNvPr>
-          <p:cNvSpPr txBox="1"/>
-          <p:nvPr/>
-        </p:nvSpPr>
-        <p:spPr>
-          <a:xfrm>
-            <a:off x="1271217" y="5383584"/>
-            <a:ext cx="9853983" cy="646331"/>
-          </a:xfrm>
-          <a:prstGeom prst="rect">
-            <a:avLst/>
-          </a:prstGeom>
-          <a:solidFill>
-            <a:schemeClr val="tx1">
-              <a:lumMod val="65000"/>
-              <a:lumOff val="35000"/>
-            </a:schemeClr>
-          </a:solidFill>
-        </p:spPr>
-        <p:txBody>
-          <a:bodyPr wrap="square" rtlCol="0">
-            <a:spAutoFit/>
+          <a:bodyPr>
+            <a:normAutofit fontScale="90000"/>
           </a:bodyPr>
           <a:lstStyle/>
           <a:p>
-            <a:pPr algn="ctr"/>
-            <a:r>
-              <a:rPr lang="en-US" dirty="0">
-                <a:solidFill>
-                  <a:schemeClr val="bg1"/>
-                </a:solidFill>
-              </a:rPr>
-              <a:t>Takeaway: Areas with a higher unemployment rate among homeowners are less expensive to live in than areas with a low unemployment rate among homeowners</a:t>
-            </a:r>
-          </a:p>
-        </p:txBody>
-      </p:sp>
-      <p:sp>
-        <p:nvSpPr>
-          <p:cNvPr id="11" name="Footer Placeholder 3">
-            <a:extLst>
-              <a:ext uri="{FF2B5EF4-FFF2-40B4-BE49-F238E27FC236}">
-                <a16:creationId xmlns:a16="http://schemas.microsoft.com/office/drawing/2014/main" id="{3C750B37-1312-493D-B453-CFB28601C81B}"/>
-              </a:ext>
-            </a:extLst>
-          </p:cNvPr>
-          <p:cNvSpPr>
-            <a:spLocks noGrp="1"/>
-          </p:cNvSpPr>
-          <p:nvPr>
-            <p:ph type="ftr" sz="quarter" idx="11"/>
-          </p:nvPr>
-        </p:nvSpPr>
-        <p:spPr>
-          <a:xfrm>
-            <a:off x="1066800" y="6035040"/>
-            <a:ext cx="5816600" cy="365760"/>
-          </a:xfrm>
-        </p:spPr>
-        <p:txBody>
-          <a:bodyPr/>
-          <a:lstStyle/>
-          <a:p>
             <a:r>
               <a:rPr lang="en-US" dirty="0"/>
-              <a:t>Zillow Research Data, Census API Data</a:t>
+              <a:t>How does the growth in population have an effect on housing prices in the region?</a:t>
             </a:r>
           </a:p>
         </p:txBody>
       </p:sp>
       <p:pic>
         <p:nvPicPr>
-          <p:cNvPr id="11268" name="Picture 4">
+          <p:cNvPr id="4" name="Picture 3">
             <a:extLst>
               <a:ext uri="{FF2B5EF4-FFF2-40B4-BE49-F238E27FC236}">
-                <a16:creationId xmlns:a16="http://schemas.microsoft.com/office/drawing/2014/main" id="{FD27CEAA-BA64-4303-B6B8-82A0CED3B108}"/>
+                <a16:creationId xmlns:a16="http://schemas.microsoft.com/office/drawing/2014/main" id="{0535B93F-46AE-4368-9823-9151FE7CBBD2}"/>
               </a:ext>
             </a:extLst>
           </p:cNvPr>
           <p:cNvPicPr>
-            <a:picLocks noChangeAspect="1" noChangeArrowheads="1"/>
+            <a:picLocks noChangeAspect="1"/>
           </p:cNvPicPr>
           <p:nvPr/>
         </p:nvPicPr>
         <p:blipFill>
-          <a:blip r:embed="rId2">
-            <a:extLst>
-              <a:ext uri="{28A0092B-C50C-407E-A947-70E740481C1C}">
-                <a14:useLocalDpi xmlns:a14="http://schemas.microsoft.com/office/drawing/2010/main" val="0"/>
-              </a:ext>
-            </a:extLst>
-          </a:blip>
-          <a:srcRect/>
+          <a:blip r:embed="rId2"/>
           <a:stretch>
             <a:fillRect/>
           </a:stretch>
         </p:blipFill>
-        <p:spPr bwMode="auto">
-          <a:xfrm>
-            <a:off x="723672" y="2504593"/>
-            <a:ext cx="2543771" cy="2543771"/>
+        <p:spPr>
+          <a:xfrm>
+            <a:off x="2266951" y="4387062"/>
+            <a:ext cx="7390958" cy="2080464"/>
           </a:xfrm>
           <a:prstGeom prst="rect">
             <a:avLst/>
           </a:prstGeom>
-          <a:noFill/>
-          <a:extLst>
-            <a:ext uri="{909E8E84-426E-40DD-AFC4-6F175D3DCCD1}">
-              <a14:hiddenFill xmlns:a14="http://schemas.microsoft.com/office/drawing/2010/main">
-                <a:solidFill>
-                  <a:srgbClr val="FFFFFF"/>
-                </a:solidFill>
-              </a14:hiddenFill>
-            </a:ext>
-          </a:extLst>
         </p:spPr>
       </p:pic>
       <p:pic>
         <p:nvPicPr>
-          <p:cNvPr id="11270" name="Picture 6">
+          <p:cNvPr id="5" name="Picture 4">
             <a:extLst>
               <a:ext uri="{FF2B5EF4-FFF2-40B4-BE49-F238E27FC236}">
-                <a16:creationId xmlns:a16="http://schemas.microsoft.com/office/drawing/2014/main" id="{28891A54-E837-4934-AAF8-290BD301369A}"/>
+                <a16:creationId xmlns:a16="http://schemas.microsoft.com/office/drawing/2014/main" id="{5FCC7CC6-FC79-4F62-AC2B-45C57CCE4F21}"/>
               </a:ext>
             </a:extLst>
           </p:cNvPr>
           <p:cNvPicPr>
-            <a:picLocks noChangeAspect="1" noChangeArrowheads="1"/>
+            <a:picLocks noChangeAspect="1"/>
           </p:cNvPicPr>
           <p:nvPr/>
         </p:nvPicPr>
         <p:blipFill>
-          <a:blip r:embed="rId3">
-            <a:extLst>
-              <a:ext uri="{28A0092B-C50C-407E-A947-70E740481C1C}">
-                <a14:useLocalDpi xmlns:a14="http://schemas.microsoft.com/office/drawing/2010/main" val="0"/>
-              </a:ext>
-            </a:extLst>
-          </a:blip>
-          <a:srcRect/>
+          <a:blip r:embed="rId3"/>
           <a:stretch>
             <a:fillRect/>
           </a:stretch>
         </p:blipFill>
-        <p:spPr bwMode="auto">
-          <a:xfrm>
-            <a:off x="3605827" y="2504591"/>
-            <a:ext cx="2543771" cy="2543771"/>
+        <p:spPr>
+          <a:xfrm>
+            <a:off x="1604964" y="1828457"/>
+            <a:ext cx="3657600" cy="2487168"/>
           </a:xfrm>
           <a:prstGeom prst="rect">
             <a:avLst/>
           </a:prstGeom>
-          <a:noFill/>
-          <a:extLst>
-            <a:ext uri="{909E8E84-426E-40DD-AFC4-6F175D3DCCD1}">
-              <a14:hiddenFill xmlns:a14="http://schemas.microsoft.com/office/drawing/2010/main">
-                <a:solidFill>
-                  <a:srgbClr val="FFFFFF"/>
-                </a:solidFill>
-              </a14:hiddenFill>
-            </a:ext>
-          </a:extLst>
         </p:spPr>
       </p:pic>
       <p:pic>
         <p:nvPicPr>
-          <p:cNvPr id="11272" name="Picture 8">
+          <p:cNvPr id="6" name="Picture 5">
             <a:extLst>
               <a:ext uri="{FF2B5EF4-FFF2-40B4-BE49-F238E27FC236}">
-                <a16:creationId xmlns:a16="http://schemas.microsoft.com/office/drawing/2014/main" id="{B06570CC-BCB7-4016-B159-00577F379879}"/>
+                <a16:creationId xmlns:a16="http://schemas.microsoft.com/office/drawing/2014/main" id="{417F3829-E279-4CC1-824A-A93365C3C5E4}"/>
               </a:ext>
             </a:extLst>
           </p:cNvPr>
           <p:cNvPicPr>
-            <a:picLocks noChangeAspect="1" noChangeArrowheads="1"/>
+            <a:picLocks noChangeAspect="1"/>
           </p:cNvPicPr>
           <p:nvPr/>
         </p:nvPicPr>
         <p:blipFill>
-          <a:blip r:embed="rId4">
-            <a:extLst>
-              <a:ext uri="{28A0092B-C50C-407E-A947-70E740481C1C}">
-                <a14:useLocalDpi xmlns:a14="http://schemas.microsoft.com/office/drawing/2010/main" val="0"/>
-              </a:ext>
-            </a:extLst>
-          </a:blip>
-          <a:srcRect/>
+          <a:blip r:embed="rId4"/>
           <a:stretch>
             <a:fillRect/>
           </a:stretch>
         </p:blipFill>
-        <p:spPr bwMode="auto">
-          <a:xfrm>
-            <a:off x="6380788" y="2504591"/>
-            <a:ext cx="2543771" cy="2543771"/>
+        <p:spPr>
+          <a:xfrm>
+            <a:off x="6341855" y="1828457"/>
+            <a:ext cx="3902281" cy="2487168"/>
           </a:xfrm>
           <a:prstGeom prst="rect">
             <a:avLst/>
           </a:prstGeom>
-          <a:noFill/>
-          <a:extLst>
-            <a:ext uri="{909E8E84-426E-40DD-AFC4-6F175D3DCCD1}">
-              <a14:hiddenFill xmlns:a14="http://schemas.microsoft.com/office/drawing/2010/main">
-                <a:solidFill>
-                  <a:srgbClr val="FFFFFF"/>
-                </a:solidFill>
-              </a14:hiddenFill>
-            </a:ext>
-          </a:extLst>
         </p:spPr>
       </p:pic>
-      <p:pic>
-        <p:nvPicPr>
-          <p:cNvPr id="11274" name="Picture 10">
+      <p:sp>
+        <p:nvSpPr>
+          <p:cNvPr id="7" name="Footer Placeholder 3">
             <a:extLst>
               <a:ext uri="{FF2B5EF4-FFF2-40B4-BE49-F238E27FC236}">
-                <a16:creationId xmlns:a16="http://schemas.microsoft.com/office/drawing/2014/main" id="{0895ED79-3E0C-4C8F-ACB7-D58F8B78B1D0}"/>
+                <a16:creationId xmlns:a16="http://schemas.microsoft.com/office/drawing/2014/main" id="{80DF7BED-6397-406D-BD18-304B22B79E47}"/>
               </a:ext>
             </a:extLst>
           </p:cNvPr>
-          <p:cNvPicPr>
-            <a:picLocks noChangeAspect="1" noChangeArrowheads="1"/>
-          </p:cNvPicPr>
-          <p:nvPr/>
-        </p:nvPicPr>
-        <p:blipFill>
-          <a:blip r:embed="rId5">
-            <a:extLst>
-              <a:ext uri="{28A0092B-C50C-407E-A947-70E740481C1C}">
-                <a14:useLocalDpi xmlns:a14="http://schemas.microsoft.com/office/drawing/2010/main" val="0"/>
-              </a:ext>
-            </a:extLst>
-          </a:blip>
-          <a:srcRect/>
-          <a:stretch>
-            <a:fillRect/>
-          </a:stretch>
-        </p:blipFill>
-        <p:spPr bwMode="auto">
-          <a:xfrm>
-            <a:off x="9155749" y="2504591"/>
-            <a:ext cx="2543771" cy="2543771"/>
-          </a:xfrm>
-          <a:prstGeom prst="rect">
-            <a:avLst/>
-          </a:prstGeom>
-          <a:noFill/>
-          <a:extLst>
-            <a:ext uri="{909E8E84-426E-40DD-AFC4-6F175D3DCCD1}">
-              <a14:hiddenFill xmlns:a14="http://schemas.microsoft.com/office/drawing/2010/main">
-                <a:solidFill>
-                  <a:srgbClr val="FFFFFF"/>
-                </a:solidFill>
-              </a14:hiddenFill>
-            </a:ext>
-          </a:extLst>
-        </p:spPr>
-      </p:pic>
-      <p:sp>
-        <p:nvSpPr>
-          <p:cNvPr id="14" name="TextBox 13">
-            <a:extLst>
-              <a:ext uri="{FF2B5EF4-FFF2-40B4-BE49-F238E27FC236}">
-                <a16:creationId xmlns:a16="http://schemas.microsoft.com/office/drawing/2014/main" id="{153B5689-1C1D-41E7-9606-B6787B74FD1D}"/>
-              </a:ext>
-            </a:extLst>
-          </p:cNvPr>
-          <p:cNvSpPr txBox="1"/>
-          <p:nvPr/>
+          <p:cNvSpPr>
+            <a:spLocks noGrp="1"/>
+          </p:cNvSpPr>
+          <p:nvPr>
+            <p:ph type="ftr" sz="quarter" idx="11"/>
+          </p:nvPr>
         </p:nvSpPr>
         <p:spPr>
           <a:xfrm>
-            <a:off x="1058799" y="1948033"/>
-            <a:ext cx="1873516" cy="369332"/>
-          </a:xfrm>
-          <a:prstGeom prst="rect">
-            <a:avLst/>
-          </a:prstGeom>
-          <a:solidFill>
-            <a:schemeClr val="tx1">
-              <a:lumMod val="65000"/>
-              <a:lumOff val="35000"/>
-            </a:schemeClr>
-          </a:solidFill>
-        </p:spPr>
-        <p:txBody>
-          <a:bodyPr wrap="square" rtlCol="0">
-            <a:spAutoFit/>
-          </a:bodyPr>
+            <a:off x="1066800" y="6035040"/>
+            <a:ext cx="5816600" cy="365760"/>
+          </a:xfrm>
+        </p:spPr>
+        <p:txBody>
+          <a:bodyPr/>
           <a:lstStyle/>
           <a:p>
-            <a:pPr algn="ctr"/>
-            <a:r>
-              <a:rPr lang="en-US" dirty="0">
-                <a:solidFill>
-                  <a:schemeClr val="bg1"/>
-                </a:solidFill>
-              </a:rPr>
-              <a:t>2015</a:t>
-            </a:r>
-          </a:p>
-        </p:txBody>
-      </p:sp>
-      <p:sp>
-        <p:nvSpPr>
-          <p:cNvPr id="15" name="TextBox 14">
-            <a:extLst>
-              <a:ext uri="{FF2B5EF4-FFF2-40B4-BE49-F238E27FC236}">
-                <a16:creationId xmlns:a16="http://schemas.microsoft.com/office/drawing/2014/main" id="{F979EEEB-0804-424E-A12B-74CE26627BC0}"/>
-              </a:ext>
-            </a:extLst>
-          </p:cNvPr>
-          <p:cNvSpPr txBox="1"/>
-          <p:nvPr/>
-        </p:nvSpPr>
-        <p:spPr>
-          <a:xfrm>
-            <a:off x="4047481" y="1948031"/>
-            <a:ext cx="1873516" cy="369332"/>
-          </a:xfrm>
-          <a:prstGeom prst="rect">
-            <a:avLst/>
-          </a:prstGeom>
-          <a:solidFill>
-            <a:schemeClr val="tx1">
-              <a:lumMod val="65000"/>
-              <a:lumOff val="35000"/>
-            </a:schemeClr>
-          </a:solidFill>
-        </p:spPr>
-        <p:txBody>
-          <a:bodyPr wrap="square" rtlCol="0">
-            <a:spAutoFit/>
-          </a:bodyPr>
-          <a:lstStyle/>
-          <a:p>
-            <a:pPr algn="ctr"/>
-            <a:r>
-              <a:rPr lang="en-US" dirty="0">
-                <a:solidFill>
-                  <a:schemeClr val="bg1"/>
-                </a:solidFill>
-              </a:rPr>
-              <a:t>2016</a:t>
-            </a:r>
-          </a:p>
-        </p:txBody>
-      </p:sp>
-      <p:sp>
-        <p:nvSpPr>
-          <p:cNvPr id="16" name="TextBox 15">
-            <a:extLst>
-              <a:ext uri="{FF2B5EF4-FFF2-40B4-BE49-F238E27FC236}">
-                <a16:creationId xmlns:a16="http://schemas.microsoft.com/office/drawing/2014/main" id="{175A0B3E-9769-4715-8DF3-A7551CC0F977}"/>
-              </a:ext>
-            </a:extLst>
-          </p:cNvPr>
-          <p:cNvSpPr txBox="1"/>
-          <p:nvPr/>
-        </p:nvSpPr>
-        <p:spPr>
-          <a:xfrm>
-            <a:off x="6767867" y="1948031"/>
-            <a:ext cx="1873516" cy="369332"/>
-          </a:xfrm>
-          <a:prstGeom prst="rect">
-            <a:avLst/>
-          </a:prstGeom>
-          <a:solidFill>
-            <a:schemeClr val="tx1">
-              <a:lumMod val="65000"/>
-              <a:lumOff val="35000"/>
-            </a:schemeClr>
-          </a:solidFill>
-        </p:spPr>
-        <p:txBody>
-          <a:bodyPr wrap="square" rtlCol="0">
-            <a:spAutoFit/>
-          </a:bodyPr>
-          <a:lstStyle/>
-          <a:p>
-            <a:pPr algn="ctr"/>
-            <a:r>
-              <a:rPr lang="en-US" dirty="0">
-                <a:solidFill>
-                  <a:schemeClr val="bg1"/>
-                </a:solidFill>
-              </a:rPr>
-              <a:t>2017</a:t>
-            </a:r>
-          </a:p>
-        </p:txBody>
-      </p:sp>
-      <p:sp>
-        <p:nvSpPr>
-          <p:cNvPr id="17" name="TextBox 16">
-            <a:extLst>
-              <a:ext uri="{FF2B5EF4-FFF2-40B4-BE49-F238E27FC236}">
-                <a16:creationId xmlns:a16="http://schemas.microsoft.com/office/drawing/2014/main" id="{A52045B8-E7FA-4EC5-A691-EAEC886113CD}"/>
-              </a:ext>
-            </a:extLst>
-          </p:cNvPr>
-          <p:cNvSpPr txBox="1"/>
-          <p:nvPr/>
-        </p:nvSpPr>
-        <p:spPr>
-          <a:xfrm>
-            <a:off x="9490876" y="1948031"/>
-            <a:ext cx="1873516" cy="369332"/>
-          </a:xfrm>
-          <a:prstGeom prst="rect">
-            <a:avLst/>
-          </a:prstGeom>
-          <a:solidFill>
-            <a:schemeClr val="tx1">
-              <a:lumMod val="65000"/>
-              <a:lumOff val="35000"/>
-            </a:schemeClr>
-          </a:solidFill>
-        </p:spPr>
-        <p:txBody>
-          <a:bodyPr wrap="square" rtlCol="0">
-            <a:spAutoFit/>
-          </a:bodyPr>
-          <a:lstStyle/>
-          <a:p>
-            <a:pPr algn="ctr"/>
-            <a:r>
-              <a:rPr lang="en-US" dirty="0">
-                <a:solidFill>
-                  <a:schemeClr val="bg1"/>
-                </a:solidFill>
-              </a:rPr>
-              <a:t>2018</a:t>
+            <a:r>
+              <a:rPr lang="en-US" dirty="0"/>
+              <a:t>DataUSA.io</a:t>
             </a:r>
           </a:p>
         </p:txBody>
@@ -6395,7 +5759,7 @@
     </p:spTree>
     <p:extLst>
       <p:ext uri="{BB962C8B-B14F-4D97-AF65-F5344CB8AC3E}">
-        <p14:creationId xmlns:p14="http://schemas.microsoft.com/office/powerpoint/2010/main" val="1509445066"/>
+        <p14:creationId xmlns:p14="http://schemas.microsoft.com/office/powerpoint/2010/main" val="1312312425"/>
       </p:ext>
     </p:extLst>
   </p:cSld>
@@ -6427,7 +5791,7 @@
           <p:cNvPr id="2" name="Title 1">
             <a:extLst>
               <a:ext uri="{FF2B5EF4-FFF2-40B4-BE49-F238E27FC236}">
-                <a16:creationId xmlns:a16="http://schemas.microsoft.com/office/drawing/2014/main" id="{F070D64D-BA64-4601-901A-5F3F1FC10F15}"/>
+                <a16:creationId xmlns:a16="http://schemas.microsoft.com/office/drawing/2014/main" id="{737F0781-F9D8-4B95-A554-A082FD9AB1B4}"/>
               </a:ext>
             </a:extLst>
           </p:cNvPr>
@@ -6445,17 +5809,17 @@
           <a:p>
             <a:r>
               <a:rPr lang="en-US" dirty="0"/>
-              <a:t>How Does Education Impact The Median Home Prices by Zip Code?</a:t>
+              <a:t>Does Poverty Rate Impact Home Price?</a:t>
             </a:r>
           </a:p>
         </p:txBody>
       </p:sp>
       <p:pic>
         <p:nvPicPr>
-          <p:cNvPr id="7" name="Picture 2">
+          <p:cNvPr id="7174" name="Picture 6">
             <a:extLst>
               <a:ext uri="{FF2B5EF4-FFF2-40B4-BE49-F238E27FC236}">
-                <a16:creationId xmlns:a16="http://schemas.microsoft.com/office/drawing/2014/main" id="{E359F2E0-D420-423D-89EF-B924DD83AF61}"/>
+                <a16:creationId xmlns:a16="http://schemas.microsoft.com/office/drawing/2014/main" id="{34F8770E-A483-4123-A1F9-E02C8EB93E61}"/>
               </a:ext>
             </a:extLst>
           </p:cNvPr>
@@ -6479,8 +5843,8 @@
         </p:blipFill>
         <p:spPr bwMode="auto">
           <a:xfrm>
-            <a:off x="526556" y="2564570"/>
-            <a:ext cx="2429720" cy="2429720"/>
+            <a:off x="9086508" y="2474907"/>
+            <a:ext cx="2737724" cy="2737724"/>
           </a:xfrm>
           <a:prstGeom prst="rect">
             <a:avLst/>
@@ -6499,10 +5863,10 @@
       </p:pic>
       <p:pic>
         <p:nvPicPr>
-          <p:cNvPr id="9224" name="Picture 8">
+          <p:cNvPr id="7176" name="Picture 8">
             <a:extLst>
               <a:ext uri="{FF2B5EF4-FFF2-40B4-BE49-F238E27FC236}">
-                <a16:creationId xmlns:a16="http://schemas.microsoft.com/office/drawing/2014/main" id="{76C6A34F-DBE7-4506-B9AF-3687ED6DBC64}"/>
+                <a16:creationId xmlns:a16="http://schemas.microsoft.com/office/drawing/2014/main" id="{315406DA-CA0C-4684-8808-8220F1618DB3}"/>
               </a:ext>
             </a:extLst>
           </p:cNvPr>
@@ -6526,8 +5890,8 @@
         </p:blipFill>
         <p:spPr bwMode="auto">
           <a:xfrm>
-            <a:off x="3395691" y="2564570"/>
-            <a:ext cx="2429720" cy="2429720"/>
+            <a:off x="6155091" y="2474907"/>
+            <a:ext cx="2737724" cy="2737724"/>
           </a:xfrm>
           <a:prstGeom prst="rect">
             <a:avLst/>
@@ -6546,10 +5910,10 @@
       </p:pic>
       <p:pic>
         <p:nvPicPr>
-          <p:cNvPr id="9226" name="Picture 10">
+          <p:cNvPr id="7178" name="Picture 10">
             <a:extLst>
               <a:ext uri="{FF2B5EF4-FFF2-40B4-BE49-F238E27FC236}">
-                <a16:creationId xmlns:a16="http://schemas.microsoft.com/office/drawing/2014/main" id="{2E4F3DA0-16A2-45A1-9A7A-306F48C6311D}"/>
+                <a16:creationId xmlns:a16="http://schemas.microsoft.com/office/drawing/2014/main" id="{00DB5FBB-840C-4651-B15D-5F5C8B2D9756}"/>
               </a:ext>
             </a:extLst>
           </p:cNvPr>
@@ -6573,8 +5937,8 @@
         </p:blipFill>
         <p:spPr bwMode="auto">
           <a:xfrm>
-            <a:off x="6215547" y="2564570"/>
-            <a:ext cx="2429720" cy="2429720"/>
+            <a:off x="3267479" y="2474908"/>
+            <a:ext cx="2737723" cy="2737723"/>
           </a:xfrm>
           <a:prstGeom prst="rect">
             <a:avLst/>
@@ -6593,10 +5957,10 @@
       </p:pic>
       <p:pic>
         <p:nvPicPr>
-          <p:cNvPr id="9228" name="Picture 12">
+          <p:cNvPr id="7180" name="Picture 12">
             <a:extLst>
               <a:ext uri="{FF2B5EF4-FFF2-40B4-BE49-F238E27FC236}">
-                <a16:creationId xmlns:a16="http://schemas.microsoft.com/office/drawing/2014/main" id="{4D024026-6066-481B-989C-ED8AE007523B}"/>
+                <a16:creationId xmlns:a16="http://schemas.microsoft.com/office/drawing/2014/main" id="{4DA0EA7E-1C91-4230-BF76-167A20DC20DF}"/>
               </a:ext>
             </a:extLst>
           </p:cNvPr>
@@ -6620,8 +5984,8 @@
         </p:blipFill>
         <p:spPr bwMode="auto">
           <a:xfrm>
-            <a:off x="8958747" y="2564570"/>
-            <a:ext cx="2429720" cy="2429720"/>
+            <a:off x="400619" y="2474908"/>
+            <a:ext cx="2737724" cy="2737724"/>
           </a:xfrm>
           <a:prstGeom prst="rect">
             <a:avLst/>
@@ -6640,10 +6004,10 @@
       </p:pic>
       <p:sp>
         <p:nvSpPr>
-          <p:cNvPr id="11" name="TextBox 10">
+          <p:cNvPr id="10" name="TextBox 9">
             <a:extLst>
               <a:ext uri="{FF2B5EF4-FFF2-40B4-BE49-F238E27FC236}">
-                <a16:creationId xmlns:a16="http://schemas.microsoft.com/office/drawing/2014/main" id="{6B5E1C57-240F-4E7B-849B-ACD73C5CA67A}"/>
+                <a16:creationId xmlns:a16="http://schemas.microsoft.com/office/drawing/2014/main" id="{0D29C158-19A2-4F58-8609-AF2096620483}"/>
               </a:ext>
             </a:extLst>
           </p:cNvPr>
@@ -6652,8 +6016,8 @@
         </p:nvSpPr>
         <p:spPr>
           <a:xfrm>
-            <a:off x="1271217" y="5135200"/>
-            <a:ext cx="9853983" cy="923330"/>
+            <a:off x="1128713" y="5573233"/>
+            <a:ext cx="10153650" cy="369332"/>
           </a:xfrm>
           <a:prstGeom prst="rect">
             <a:avLst/>
@@ -6678,17 +6042,17 @@
                   <a:schemeClr val="bg1"/>
                 </a:solidFill>
               </a:rPr>
-              <a:t>Takeaway: On average, zip codes that contain more people who have completed a Bachelor’s degree are more expensive to live in than zip codes where fewer people have completed a Bachelor’s degree</a:t>
-            </a:r>
-          </a:p>
-        </p:txBody>
-      </p:sp>
-      <p:sp>
-        <p:nvSpPr>
-          <p:cNvPr id="12" name="Footer Placeholder 3">
+              <a:t>Takeaway: Median home price increases across years when the poverty rate decreases</a:t>
+            </a:r>
+          </a:p>
+        </p:txBody>
+      </p:sp>
+      <p:sp>
+        <p:nvSpPr>
+          <p:cNvPr id="11" name="Footer Placeholder 3">
             <a:extLst>
               <a:ext uri="{FF2B5EF4-FFF2-40B4-BE49-F238E27FC236}">
-                <a16:creationId xmlns:a16="http://schemas.microsoft.com/office/drawing/2014/main" id="{9F679D7B-F533-40C1-8A3D-A79C88A180E7}"/>
+                <a16:creationId xmlns:a16="http://schemas.microsoft.com/office/drawing/2014/main" id="{3C750B37-1312-493D-B453-CFB28601C81B}"/>
               </a:ext>
             </a:extLst>
           </p:cNvPr>
@@ -6718,10 +6082,10 @@
       </p:sp>
       <p:sp>
         <p:nvSpPr>
-          <p:cNvPr id="13" name="TextBox 12">
+          <p:cNvPr id="12" name="TextBox 11">
             <a:extLst>
               <a:ext uri="{FF2B5EF4-FFF2-40B4-BE49-F238E27FC236}">
-                <a16:creationId xmlns:a16="http://schemas.microsoft.com/office/drawing/2014/main" id="{469EC402-2CDE-42AB-87E3-74704EE3BCDF}"/>
+                <a16:creationId xmlns:a16="http://schemas.microsoft.com/office/drawing/2014/main" id="{16F0F219-CDCB-41AA-90E5-0143869F9A24}"/>
               </a:ext>
             </a:extLst>
           </p:cNvPr>
@@ -6730,7 +6094,7 @@
         </p:nvSpPr>
         <p:spPr>
           <a:xfrm>
-            <a:off x="804658" y="2054328"/>
+            <a:off x="832723" y="1948031"/>
             <a:ext cx="1873516" cy="369332"/>
           </a:xfrm>
           <a:prstGeom prst="rect">
@@ -6763,10 +6127,10 @@
       </p:sp>
       <p:sp>
         <p:nvSpPr>
-          <p:cNvPr id="14" name="TextBox 13">
+          <p:cNvPr id="13" name="TextBox 12">
             <a:extLst>
               <a:ext uri="{FF2B5EF4-FFF2-40B4-BE49-F238E27FC236}">
-                <a16:creationId xmlns:a16="http://schemas.microsoft.com/office/drawing/2014/main" id="{EF34E711-072E-4B83-9DE0-85D36E3055A6}"/>
+                <a16:creationId xmlns:a16="http://schemas.microsoft.com/office/drawing/2014/main" id="{07FD693C-8911-43FE-8B3D-2364366B520D}"/>
               </a:ext>
             </a:extLst>
           </p:cNvPr>
@@ -6775,7 +6139,7 @@
         </p:nvSpPr>
         <p:spPr>
           <a:xfrm>
-            <a:off x="3673793" y="2054328"/>
+            <a:off x="3699582" y="1948031"/>
             <a:ext cx="1873516" cy="369332"/>
           </a:xfrm>
           <a:prstGeom prst="rect">
@@ -6808,10 +6172,10 @@
       </p:sp>
       <p:sp>
         <p:nvSpPr>
-          <p:cNvPr id="15" name="TextBox 14">
+          <p:cNvPr id="14" name="TextBox 13">
             <a:extLst>
               <a:ext uri="{FF2B5EF4-FFF2-40B4-BE49-F238E27FC236}">
-                <a16:creationId xmlns:a16="http://schemas.microsoft.com/office/drawing/2014/main" id="{5925C548-509F-4F6A-A857-5ECC79998430}"/>
+                <a16:creationId xmlns:a16="http://schemas.microsoft.com/office/drawing/2014/main" id="{01AC2F9C-B4DE-4480-B02D-33FE67E67EC6}"/>
               </a:ext>
             </a:extLst>
           </p:cNvPr>
@@ -6820,7 +6184,7 @@
         </p:nvSpPr>
         <p:spPr>
           <a:xfrm>
-            <a:off x="6493649" y="2054328"/>
+            <a:off x="6618904" y="1948031"/>
             <a:ext cx="1873516" cy="369332"/>
           </a:xfrm>
           <a:prstGeom prst="rect">
@@ -6853,10 +6217,10 @@
       </p:sp>
       <p:sp>
         <p:nvSpPr>
-          <p:cNvPr id="16" name="TextBox 15">
+          <p:cNvPr id="15" name="TextBox 14">
             <a:extLst>
               <a:ext uri="{FF2B5EF4-FFF2-40B4-BE49-F238E27FC236}">
-                <a16:creationId xmlns:a16="http://schemas.microsoft.com/office/drawing/2014/main" id="{C4E4CE75-CC73-444B-B97B-2F924294F8B6}"/>
+                <a16:creationId xmlns:a16="http://schemas.microsoft.com/office/drawing/2014/main" id="{B6E8AF94-3096-4EA7-99C1-3291401B5D51}"/>
               </a:ext>
             </a:extLst>
           </p:cNvPr>
@@ -6865,7 +6229,7 @@
         </p:nvSpPr>
         <p:spPr>
           <a:xfrm>
-            <a:off x="9167824" y="2054328"/>
+            <a:off x="9631316" y="1948031"/>
             <a:ext cx="1873516" cy="369332"/>
           </a:xfrm>
           <a:prstGeom prst="rect">
@@ -6899,7 +6263,7 @@
     </p:spTree>
     <p:extLst>
       <p:ext uri="{BB962C8B-B14F-4D97-AF65-F5344CB8AC3E}">
-        <p14:creationId xmlns:p14="http://schemas.microsoft.com/office/powerpoint/2010/main" val="2617795900"/>
+        <p14:creationId xmlns:p14="http://schemas.microsoft.com/office/powerpoint/2010/main" val="1680002086"/>
       </p:ext>
     </p:extLst>
   </p:cSld>
@@ -6931,7 +6295,7 @@
           <p:cNvPr id="2" name="Title 1">
             <a:extLst>
               <a:ext uri="{FF2B5EF4-FFF2-40B4-BE49-F238E27FC236}">
-                <a16:creationId xmlns:a16="http://schemas.microsoft.com/office/drawing/2014/main" id="{77CF0920-EE46-4ADF-8AFE-90DFA403912B}"/>
+                <a16:creationId xmlns:a16="http://schemas.microsoft.com/office/drawing/2014/main" id="{737F0781-F9D8-4B95-A554-A082FD9AB1B4}"/>
               </a:ext>
             </a:extLst>
           </p:cNvPr>
@@ -6949,82 +6313,461 @@
           <a:p>
             <a:r>
               <a:rPr lang="en-US" dirty="0"/>
-              <a:t>Conclusions</a:t>
-            </a:r>
-          </a:p>
-        </p:txBody>
-      </p:sp>
-      <p:sp>
-        <p:nvSpPr>
-          <p:cNvPr id="3" name="Content Placeholder 2">
+              <a:t>Does Unemployment Rate Impact House Price?</a:t>
+            </a:r>
+          </a:p>
+        </p:txBody>
+      </p:sp>
+      <p:sp>
+        <p:nvSpPr>
+          <p:cNvPr id="10" name="TextBox 9">
             <a:extLst>
               <a:ext uri="{FF2B5EF4-FFF2-40B4-BE49-F238E27FC236}">
-                <a16:creationId xmlns:a16="http://schemas.microsoft.com/office/drawing/2014/main" id="{DC2029A2-C07E-40E2-AEB4-CFAB6045B215}"/>
+                <a16:creationId xmlns:a16="http://schemas.microsoft.com/office/drawing/2014/main" id="{0D29C158-19A2-4F58-8609-AF2096620483}"/>
               </a:ext>
             </a:extLst>
           </p:cNvPr>
-          <p:cNvSpPr>
-            <a:spLocks noGrp="1"/>
-          </p:cNvSpPr>
-          <p:nvPr>
-            <p:ph idx="1"/>
-          </p:nvPr>
-        </p:nvSpPr>
-        <p:spPr/>
+          <p:cNvSpPr txBox="1"/>
+          <p:nvPr/>
+        </p:nvSpPr>
+        <p:spPr>
+          <a:xfrm>
+            <a:off x="1271217" y="5383584"/>
+            <a:ext cx="9853983" cy="646331"/>
+          </a:xfrm>
+          <a:prstGeom prst="rect">
+            <a:avLst/>
+          </a:prstGeom>
+          <a:solidFill>
+            <a:schemeClr val="tx1">
+              <a:lumMod val="65000"/>
+              <a:lumOff val="35000"/>
+            </a:schemeClr>
+          </a:solidFill>
+        </p:spPr>
+        <p:txBody>
+          <a:bodyPr wrap="square" rtlCol="0">
+            <a:spAutoFit/>
+          </a:bodyPr>
+          <a:lstStyle/>
+          <a:p>
+            <a:pPr algn="ctr"/>
+            <a:r>
+              <a:rPr lang="en-US" dirty="0">
+                <a:solidFill>
+                  <a:schemeClr val="bg1"/>
+                </a:solidFill>
+              </a:rPr>
+              <a:t>Takeaway: Areas with a higher unemployment rate among homeowners are less expensive to live in than areas with a low unemployment rate among homeowners</a:t>
+            </a:r>
+          </a:p>
+        </p:txBody>
+      </p:sp>
+      <p:sp>
+        <p:nvSpPr>
+          <p:cNvPr id="11" name="Footer Placeholder 3">
+            <a:extLst>
+              <a:ext uri="{FF2B5EF4-FFF2-40B4-BE49-F238E27FC236}">
+                <a16:creationId xmlns:a16="http://schemas.microsoft.com/office/drawing/2014/main" id="{3C750B37-1312-493D-B453-CFB28601C81B}"/>
+              </a:ext>
+            </a:extLst>
+          </p:cNvPr>
+          <p:cNvSpPr>
+            <a:spLocks noGrp="1"/>
+          </p:cNvSpPr>
+          <p:nvPr>
+            <p:ph type="ftr" sz="quarter" idx="11"/>
+          </p:nvPr>
+        </p:nvSpPr>
+        <p:spPr>
+          <a:xfrm>
+            <a:off x="1066800" y="6035040"/>
+            <a:ext cx="5816600" cy="365760"/>
+          </a:xfrm>
+        </p:spPr>
         <p:txBody>
           <a:bodyPr/>
           <a:lstStyle/>
           <a:p>
             <a:r>
               <a:rPr lang="en-US" dirty="0"/>
-              <a:t>As expected, the price of homes in Georgia is increasing year over year across zip codes.</a:t>
-            </a:r>
-          </a:p>
-          <a:p>
-            <a:r>
-              <a:rPr lang="en-US" dirty="0"/>
-              <a:t>Tara points……………..</a:t>
-            </a:r>
-          </a:p>
-          <a:p>
-            <a:r>
-              <a:rPr lang="en-US" dirty="0"/>
-              <a:t>Yannick points…………….</a:t>
-            </a:r>
-          </a:p>
-          <a:p>
-            <a:r>
-              <a:rPr lang="en-US" dirty="0"/>
-              <a:t>Zip codes with higher poverty rates in Georgia are less expensive to live in than those with lower poverty rates</a:t>
-            </a:r>
-          </a:p>
-          <a:p>
-            <a:r>
-              <a:rPr lang="en-US" dirty="0"/>
-              <a:t>Zip codes with higher unemployment rates in Georgia are less expensive to live in than those with lower unemployment rates</a:t>
-            </a:r>
-          </a:p>
-          <a:p>
-            <a:r>
-              <a:rPr lang="en-US" dirty="0"/>
-              <a:t>Zip codes with fewer highly educated people in Georgia are less expensive to live in than those with more highly educated people</a:t>
-            </a:r>
-          </a:p>
-          <a:p>
-            <a:r>
-              <a:rPr lang="en-US" dirty="0"/>
-              <a:t>Many of these factors are intertwined, and a more robust analysis with a more robust data set would be helpful to identify the key factors that are most correlated with home price in an area.</a:t>
-            </a:r>
-          </a:p>
-          <a:p>
-            <a:endParaRPr lang="en-US" dirty="0"/>
+              <a:t>Zillow Research Data, Census API Data</a:t>
+            </a:r>
+          </a:p>
+        </p:txBody>
+      </p:sp>
+      <p:pic>
+        <p:nvPicPr>
+          <p:cNvPr id="11268" name="Picture 4">
+            <a:extLst>
+              <a:ext uri="{FF2B5EF4-FFF2-40B4-BE49-F238E27FC236}">
+                <a16:creationId xmlns:a16="http://schemas.microsoft.com/office/drawing/2014/main" id="{FD27CEAA-BA64-4303-B6B8-82A0CED3B108}"/>
+              </a:ext>
+            </a:extLst>
+          </p:cNvPr>
+          <p:cNvPicPr>
+            <a:picLocks noChangeAspect="1" noChangeArrowheads="1"/>
+          </p:cNvPicPr>
+          <p:nvPr/>
+        </p:nvPicPr>
+        <p:blipFill>
+          <a:blip r:embed="rId2">
+            <a:extLst>
+              <a:ext uri="{28A0092B-C50C-407E-A947-70E740481C1C}">
+                <a14:useLocalDpi xmlns:a14="http://schemas.microsoft.com/office/drawing/2010/main" val="0"/>
+              </a:ext>
+            </a:extLst>
+          </a:blip>
+          <a:srcRect/>
+          <a:stretch>
+            <a:fillRect/>
+          </a:stretch>
+        </p:blipFill>
+        <p:spPr bwMode="auto">
+          <a:xfrm>
+            <a:off x="723672" y="2504593"/>
+            <a:ext cx="2543771" cy="2543771"/>
+          </a:xfrm>
+          <a:prstGeom prst="rect">
+            <a:avLst/>
+          </a:prstGeom>
+          <a:noFill/>
+          <a:extLst>
+            <a:ext uri="{909E8E84-426E-40DD-AFC4-6F175D3DCCD1}">
+              <a14:hiddenFill xmlns:a14="http://schemas.microsoft.com/office/drawing/2010/main">
+                <a:solidFill>
+                  <a:srgbClr val="FFFFFF"/>
+                </a:solidFill>
+              </a14:hiddenFill>
+            </a:ext>
+          </a:extLst>
+        </p:spPr>
+      </p:pic>
+      <p:pic>
+        <p:nvPicPr>
+          <p:cNvPr id="11270" name="Picture 6">
+            <a:extLst>
+              <a:ext uri="{FF2B5EF4-FFF2-40B4-BE49-F238E27FC236}">
+                <a16:creationId xmlns:a16="http://schemas.microsoft.com/office/drawing/2014/main" id="{28891A54-E837-4934-AAF8-290BD301369A}"/>
+              </a:ext>
+            </a:extLst>
+          </p:cNvPr>
+          <p:cNvPicPr>
+            <a:picLocks noChangeAspect="1" noChangeArrowheads="1"/>
+          </p:cNvPicPr>
+          <p:nvPr/>
+        </p:nvPicPr>
+        <p:blipFill>
+          <a:blip r:embed="rId3">
+            <a:extLst>
+              <a:ext uri="{28A0092B-C50C-407E-A947-70E740481C1C}">
+                <a14:useLocalDpi xmlns:a14="http://schemas.microsoft.com/office/drawing/2010/main" val="0"/>
+              </a:ext>
+            </a:extLst>
+          </a:blip>
+          <a:srcRect/>
+          <a:stretch>
+            <a:fillRect/>
+          </a:stretch>
+        </p:blipFill>
+        <p:spPr bwMode="auto">
+          <a:xfrm>
+            <a:off x="3605827" y="2504591"/>
+            <a:ext cx="2543771" cy="2543771"/>
+          </a:xfrm>
+          <a:prstGeom prst="rect">
+            <a:avLst/>
+          </a:prstGeom>
+          <a:noFill/>
+          <a:extLst>
+            <a:ext uri="{909E8E84-426E-40DD-AFC4-6F175D3DCCD1}">
+              <a14:hiddenFill xmlns:a14="http://schemas.microsoft.com/office/drawing/2010/main">
+                <a:solidFill>
+                  <a:srgbClr val="FFFFFF"/>
+                </a:solidFill>
+              </a14:hiddenFill>
+            </a:ext>
+          </a:extLst>
+        </p:spPr>
+      </p:pic>
+      <p:pic>
+        <p:nvPicPr>
+          <p:cNvPr id="11272" name="Picture 8">
+            <a:extLst>
+              <a:ext uri="{FF2B5EF4-FFF2-40B4-BE49-F238E27FC236}">
+                <a16:creationId xmlns:a16="http://schemas.microsoft.com/office/drawing/2014/main" id="{B06570CC-BCB7-4016-B159-00577F379879}"/>
+              </a:ext>
+            </a:extLst>
+          </p:cNvPr>
+          <p:cNvPicPr>
+            <a:picLocks noChangeAspect="1" noChangeArrowheads="1"/>
+          </p:cNvPicPr>
+          <p:nvPr/>
+        </p:nvPicPr>
+        <p:blipFill>
+          <a:blip r:embed="rId4">
+            <a:extLst>
+              <a:ext uri="{28A0092B-C50C-407E-A947-70E740481C1C}">
+                <a14:useLocalDpi xmlns:a14="http://schemas.microsoft.com/office/drawing/2010/main" val="0"/>
+              </a:ext>
+            </a:extLst>
+          </a:blip>
+          <a:srcRect/>
+          <a:stretch>
+            <a:fillRect/>
+          </a:stretch>
+        </p:blipFill>
+        <p:spPr bwMode="auto">
+          <a:xfrm>
+            <a:off x="6380788" y="2504591"/>
+            <a:ext cx="2543771" cy="2543771"/>
+          </a:xfrm>
+          <a:prstGeom prst="rect">
+            <a:avLst/>
+          </a:prstGeom>
+          <a:noFill/>
+          <a:extLst>
+            <a:ext uri="{909E8E84-426E-40DD-AFC4-6F175D3DCCD1}">
+              <a14:hiddenFill xmlns:a14="http://schemas.microsoft.com/office/drawing/2010/main">
+                <a:solidFill>
+                  <a:srgbClr val="FFFFFF"/>
+                </a:solidFill>
+              </a14:hiddenFill>
+            </a:ext>
+          </a:extLst>
+        </p:spPr>
+      </p:pic>
+      <p:pic>
+        <p:nvPicPr>
+          <p:cNvPr id="11274" name="Picture 10">
+            <a:extLst>
+              <a:ext uri="{FF2B5EF4-FFF2-40B4-BE49-F238E27FC236}">
+                <a16:creationId xmlns:a16="http://schemas.microsoft.com/office/drawing/2014/main" id="{0895ED79-3E0C-4C8F-ACB7-D58F8B78B1D0}"/>
+              </a:ext>
+            </a:extLst>
+          </p:cNvPr>
+          <p:cNvPicPr>
+            <a:picLocks noChangeAspect="1" noChangeArrowheads="1"/>
+          </p:cNvPicPr>
+          <p:nvPr/>
+        </p:nvPicPr>
+        <p:blipFill>
+          <a:blip r:embed="rId5">
+            <a:extLst>
+              <a:ext uri="{28A0092B-C50C-407E-A947-70E740481C1C}">
+                <a14:useLocalDpi xmlns:a14="http://schemas.microsoft.com/office/drawing/2010/main" val="0"/>
+              </a:ext>
+            </a:extLst>
+          </a:blip>
+          <a:srcRect/>
+          <a:stretch>
+            <a:fillRect/>
+          </a:stretch>
+        </p:blipFill>
+        <p:spPr bwMode="auto">
+          <a:xfrm>
+            <a:off x="9155749" y="2504591"/>
+            <a:ext cx="2543771" cy="2543771"/>
+          </a:xfrm>
+          <a:prstGeom prst="rect">
+            <a:avLst/>
+          </a:prstGeom>
+          <a:noFill/>
+          <a:extLst>
+            <a:ext uri="{909E8E84-426E-40DD-AFC4-6F175D3DCCD1}">
+              <a14:hiddenFill xmlns:a14="http://schemas.microsoft.com/office/drawing/2010/main">
+                <a:solidFill>
+                  <a:srgbClr val="FFFFFF"/>
+                </a:solidFill>
+              </a14:hiddenFill>
+            </a:ext>
+          </a:extLst>
+        </p:spPr>
+      </p:pic>
+      <p:sp>
+        <p:nvSpPr>
+          <p:cNvPr id="14" name="TextBox 13">
+            <a:extLst>
+              <a:ext uri="{FF2B5EF4-FFF2-40B4-BE49-F238E27FC236}">
+                <a16:creationId xmlns:a16="http://schemas.microsoft.com/office/drawing/2014/main" id="{153B5689-1C1D-41E7-9606-B6787B74FD1D}"/>
+              </a:ext>
+            </a:extLst>
+          </p:cNvPr>
+          <p:cNvSpPr txBox="1"/>
+          <p:nvPr/>
+        </p:nvSpPr>
+        <p:spPr>
+          <a:xfrm>
+            <a:off x="1058799" y="1948033"/>
+            <a:ext cx="1873516" cy="369332"/>
+          </a:xfrm>
+          <a:prstGeom prst="rect">
+            <a:avLst/>
+          </a:prstGeom>
+          <a:solidFill>
+            <a:schemeClr val="tx1">
+              <a:lumMod val="65000"/>
+              <a:lumOff val="35000"/>
+            </a:schemeClr>
+          </a:solidFill>
+        </p:spPr>
+        <p:txBody>
+          <a:bodyPr wrap="square" rtlCol="0">
+            <a:spAutoFit/>
+          </a:bodyPr>
+          <a:lstStyle/>
+          <a:p>
+            <a:pPr algn="ctr"/>
+            <a:r>
+              <a:rPr lang="en-US" dirty="0">
+                <a:solidFill>
+                  <a:schemeClr val="bg1"/>
+                </a:solidFill>
+              </a:rPr>
+              <a:t>2015</a:t>
+            </a:r>
+          </a:p>
+        </p:txBody>
+      </p:sp>
+      <p:sp>
+        <p:nvSpPr>
+          <p:cNvPr id="15" name="TextBox 14">
+            <a:extLst>
+              <a:ext uri="{FF2B5EF4-FFF2-40B4-BE49-F238E27FC236}">
+                <a16:creationId xmlns:a16="http://schemas.microsoft.com/office/drawing/2014/main" id="{F979EEEB-0804-424E-A12B-74CE26627BC0}"/>
+              </a:ext>
+            </a:extLst>
+          </p:cNvPr>
+          <p:cNvSpPr txBox="1"/>
+          <p:nvPr/>
+        </p:nvSpPr>
+        <p:spPr>
+          <a:xfrm>
+            <a:off x="4047481" y="1948031"/>
+            <a:ext cx="1873516" cy="369332"/>
+          </a:xfrm>
+          <a:prstGeom prst="rect">
+            <a:avLst/>
+          </a:prstGeom>
+          <a:solidFill>
+            <a:schemeClr val="tx1">
+              <a:lumMod val="65000"/>
+              <a:lumOff val="35000"/>
+            </a:schemeClr>
+          </a:solidFill>
+        </p:spPr>
+        <p:txBody>
+          <a:bodyPr wrap="square" rtlCol="0">
+            <a:spAutoFit/>
+          </a:bodyPr>
+          <a:lstStyle/>
+          <a:p>
+            <a:pPr algn="ctr"/>
+            <a:r>
+              <a:rPr lang="en-US" dirty="0">
+                <a:solidFill>
+                  <a:schemeClr val="bg1"/>
+                </a:solidFill>
+              </a:rPr>
+              <a:t>2016</a:t>
+            </a:r>
+          </a:p>
+        </p:txBody>
+      </p:sp>
+      <p:sp>
+        <p:nvSpPr>
+          <p:cNvPr id="16" name="TextBox 15">
+            <a:extLst>
+              <a:ext uri="{FF2B5EF4-FFF2-40B4-BE49-F238E27FC236}">
+                <a16:creationId xmlns:a16="http://schemas.microsoft.com/office/drawing/2014/main" id="{175A0B3E-9769-4715-8DF3-A7551CC0F977}"/>
+              </a:ext>
+            </a:extLst>
+          </p:cNvPr>
+          <p:cNvSpPr txBox="1"/>
+          <p:nvPr/>
+        </p:nvSpPr>
+        <p:spPr>
+          <a:xfrm>
+            <a:off x="6767867" y="1948031"/>
+            <a:ext cx="1873516" cy="369332"/>
+          </a:xfrm>
+          <a:prstGeom prst="rect">
+            <a:avLst/>
+          </a:prstGeom>
+          <a:solidFill>
+            <a:schemeClr val="tx1">
+              <a:lumMod val="65000"/>
+              <a:lumOff val="35000"/>
+            </a:schemeClr>
+          </a:solidFill>
+        </p:spPr>
+        <p:txBody>
+          <a:bodyPr wrap="square" rtlCol="0">
+            <a:spAutoFit/>
+          </a:bodyPr>
+          <a:lstStyle/>
+          <a:p>
+            <a:pPr algn="ctr"/>
+            <a:r>
+              <a:rPr lang="en-US" dirty="0">
+                <a:solidFill>
+                  <a:schemeClr val="bg1"/>
+                </a:solidFill>
+              </a:rPr>
+              <a:t>2017</a:t>
+            </a:r>
+          </a:p>
+        </p:txBody>
+      </p:sp>
+      <p:sp>
+        <p:nvSpPr>
+          <p:cNvPr id="17" name="TextBox 16">
+            <a:extLst>
+              <a:ext uri="{FF2B5EF4-FFF2-40B4-BE49-F238E27FC236}">
+                <a16:creationId xmlns:a16="http://schemas.microsoft.com/office/drawing/2014/main" id="{A52045B8-E7FA-4EC5-A691-EAEC886113CD}"/>
+              </a:ext>
+            </a:extLst>
+          </p:cNvPr>
+          <p:cNvSpPr txBox="1"/>
+          <p:nvPr/>
+        </p:nvSpPr>
+        <p:spPr>
+          <a:xfrm>
+            <a:off x="9490876" y="1948031"/>
+            <a:ext cx="1873516" cy="369332"/>
+          </a:xfrm>
+          <a:prstGeom prst="rect">
+            <a:avLst/>
+          </a:prstGeom>
+          <a:solidFill>
+            <a:schemeClr val="tx1">
+              <a:lumMod val="65000"/>
+              <a:lumOff val="35000"/>
+            </a:schemeClr>
+          </a:solidFill>
+        </p:spPr>
+        <p:txBody>
+          <a:bodyPr wrap="square" rtlCol="0">
+            <a:spAutoFit/>
+          </a:bodyPr>
+          <a:lstStyle/>
+          <a:p>
+            <a:pPr algn="ctr"/>
+            <a:r>
+              <a:rPr lang="en-US" dirty="0">
+                <a:solidFill>
+                  <a:schemeClr val="bg1"/>
+                </a:solidFill>
+              </a:rPr>
+              <a:t>2018</a:t>
+            </a:r>
           </a:p>
         </p:txBody>
       </p:sp>
     </p:spTree>
     <p:extLst>
       <p:ext uri="{BB962C8B-B14F-4D97-AF65-F5344CB8AC3E}">
-        <p14:creationId xmlns:p14="http://schemas.microsoft.com/office/powerpoint/2010/main" val="4188248600"/>
+        <p14:creationId xmlns:p14="http://schemas.microsoft.com/office/powerpoint/2010/main" val="1509445066"/>
       </p:ext>
     </p:extLst>
   </p:cSld>
@@ -7056,7 +6799,7 @@
           <p:cNvPr id="2" name="Title 1">
             <a:extLst>
               <a:ext uri="{FF2B5EF4-FFF2-40B4-BE49-F238E27FC236}">
-                <a16:creationId xmlns:a16="http://schemas.microsoft.com/office/drawing/2014/main" id="{13934363-2F03-4422-B996-F499D6A560E2}"/>
+                <a16:creationId xmlns:a16="http://schemas.microsoft.com/office/drawing/2014/main" id="{F070D64D-BA64-4601-901A-5F3F1FC10F15}"/>
               </a:ext>
             </a:extLst>
           </p:cNvPr>
@@ -7074,112 +6817,461 @@
           <a:p>
             <a:r>
               <a:rPr lang="en-US" dirty="0"/>
-              <a:t>What’s Next?</a:t>
-            </a:r>
-          </a:p>
-        </p:txBody>
-      </p:sp>
-      <p:sp>
-        <p:nvSpPr>
-          <p:cNvPr id="3" name="Content Placeholder 2">
+              <a:t>How Does Education Impact The Median Home Prices by Zip Code?</a:t>
+            </a:r>
+          </a:p>
+        </p:txBody>
+      </p:sp>
+      <p:pic>
+        <p:nvPicPr>
+          <p:cNvPr id="7" name="Picture 2">
             <a:extLst>
               <a:ext uri="{FF2B5EF4-FFF2-40B4-BE49-F238E27FC236}">
-                <a16:creationId xmlns:a16="http://schemas.microsoft.com/office/drawing/2014/main" id="{B5D5F71B-9D32-4663-A240-D664E71BE9A4}"/>
+                <a16:creationId xmlns:a16="http://schemas.microsoft.com/office/drawing/2014/main" id="{E359F2E0-D420-423D-89EF-B924DD83AF61}"/>
               </a:ext>
             </a:extLst>
           </p:cNvPr>
-          <p:cNvSpPr>
-            <a:spLocks noGrp="1"/>
-          </p:cNvSpPr>
-          <p:nvPr>
-            <p:ph idx="1"/>
-          </p:nvPr>
+          <p:cNvPicPr>
+            <a:picLocks noChangeAspect="1" noChangeArrowheads="1"/>
+          </p:cNvPicPr>
+          <p:nvPr/>
+        </p:nvPicPr>
+        <p:blipFill>
+          <a:blip r:embed="rId2">
+            <a:extLst>
+              <a:ext uri="{28A0092B-C50C-407E-A947-70E740481C1C}">
+                <a14:useLocalDpi xmlns:a14="http://schemas.microsoft.com/office/drawing/2010/main" val="0"/>
+              </a:ext>
+            </a:extLst>
+          </a:blip>
+          <a:srcRect/>
+          <a:stretch>
+            <a:fillRect/>
+          </a:stretch>
+        </p:blipFill>
+        <p:spPr bwMode="auto">
+          <a:xfrm>
+            <a:off x="526556" y="2564570"/>
+            <a:ext cx="2429720" cy="2429720"/>
+          </a:xfrm>
+          <a:prstGeom prst="rect">
+            <a:avLst/>
+          </a:prstGeom>
+          <a:noFill/>
+          <a:extLst>
+            <a:ext uri="{909E8E84-426E-40DD-AFC4-6F175D3DCCD1}">
+              <a14:hiddenFill xmlns:a14="http://schemas.microsoft.com/office/drawing/2010/main">
+                <a:solidFill>
+                  <a:srgbClr val="FFFFFF"/>
+                </a:solidFill>
+              </a14:hiddenFill>
+            </a:ext>
+          </a:extLst>
+        </p:spPr>
+      </p:pic>
+      <p:pic>
+        <p:nvPicPr>
+          <p:cNvPr id="9224" name="Picture 8">
+            <a:extLst>
+              <a:ext uri="{FF2B5EF4-FFF2-40B4-BE49-F238E27FC236}">
+                <a16:creationId xmlns:a16="http://schemas.microsoft.com/office/drawing/2014/main" id="{76C6A34F-DBE7-4506-B9AF-3687ED6DBC64}"/>
+              </a:ext>
+            </a:extLst>
+          </p:cNvPr>
+          <p:cNvPicPr>
+            <a:picLocks noChangeAspect="1" noChangeArrowheads="1"/>
+          </p:cNvPicPr>
+          <p:nvPr/>
+        </p:nvPicPr>
+        <p:blipFill>
+          <a:blip r:embed="rId3">
+            <a:extLst>
+              <a:ext uri="{28A0092B-C50C-407E-A947-70E740481C1C}">
+                <a14:useLocalDpi xmlns:a14="http://schemas.microsoft.com/office/drawing/2010/main" val="0"/>
+              </a:ext>
+            </a:extLst>
+          </a:blip>
+          <a:srcRect/>
+          <a:stretch>
+            <a:fillRect/>
+          </a:stretch>
+        </p:blipFill>
+        <p:spPr bwMode="auto">
+          <a:xfrm>
+            <a:off x="3395691" y="2564570"/>
+            <a:ext cx="2429720" cy="2429720"/>
+          </a:xfrm>
+          <a:prstGeom prst="rect">
+            <a:avLst/>
+          </a:prstGeom>
+          <a:noFill/>
+          <a:extLst>
+            <a:ext uri="{909E8E84-426E-40DD-AFC4-6F175D3DCCD1}">
+              <a14:hiddenFill xmlns:a14="http://schemas.microsoft.com/office/drawing/2010/main">
+                <a:solidFill>
+                  <a:srgbClr val="FFFFFF"/>
+                </a:solidFill>
+              </a14:hiddenFill>
+            </a:ext>
+          </a:extLst>
+        </p:spPr>
+      </p:pic>
+      <p:pic>
+        <p:nvPicPr>
+          <p:cNvPr id="9226" name="Picture 10">
+            <a:extLst>
+              <a:ext uri="{FF2B5EF4-FFF2-40B4-BE49-F238E27FC236}">
+                <a16:creationId xmlns:a16="http://schemas.microsoft.com/office/drawing/2014/main" id="{2E4F3DA0-16A2-45A1-9A7A-306F48C6311D}"/>
+              </a:ext>
+            </a:extLst>
+          </p:cNvPr>
+          <p:cNvPicPr>
+            <a:picLocks noChangeAspect="1" noChangeArrowheads="1"/>
+          </p:cNvPicPr>
+          <p:nvPr/>
+        </p:nvPicPr>
+        <p:blipFill>
+          <a:blip r:embed="rId4">
+            <a:extLst>
+              <a:ext uri="{28A0092B-C50C-407E-A947-70E740481C1C}">
+                <a14:useLocalDpi xmlns:a14="http://schemas.microsoft.com/office/drawing/2010/main" val="0"/>
+              </a:ext>
+            </a:extLst>
+          </a:blip>
+          <a:srcRect/>
+          <a:stretch>
+            <a:fillRect/>
+          </a:stretch>
+        </p:blipFill>
+        <p:spPr bwMode="auto">
+          <a:xfrm>
+            <a:off x="6215547" y="2564570"/>
+            <a:ext cx="2429720" cy="2429720"/>
+          </a:xfrm>
+          <a:prstGeom prst="rect">
+            <a:avLst/>
+          </a:prstGeom>
+          <a:noFill/>
+          <a:extLst>
+            <a:ext uri="{909E8E84-426E-40DD-AFC4-6F175D3DCCD1}">
+              <a14:hiddenFill xmlns:a14="http://schemas.microsoft.com/office/drawing/2010/main">
+                <a:solidFill>
+                  <a:srgbClr val="FFFFFF"/>
+                </a:solidFill>
+              </a14:hiddenFill>
+            </a:ext>
+          </a:extLst>
+        </p:spPr>
+      </p:pic>
+      <p:pic>
+        <p:nvPicPr>
+          <p:cNvPr id="9228" name="Picture 12">
+            <a:extLst>
+              <a:ext uri="{FF2B5EF4-FFF2-40B4-BE49-F238E27FC236}">
+                <a16:creationId xmlns:a16="http://schemas.microsoft.com/office/drawing/2014/main" id="{4D024026-6066-481B-989C-ED8AE007523B}"/>
+              </a:ext>
+            </a:extLst>
+          </p:cNvPr>
+          <p:cNvPicPr>
+            <a:picLocks noChangeAspect="1" noChangeArrowheads="1"/>
+          </p:cNvPicPr>
+          <p:nvPr/>
+        </p:nvPicPr>
+        <p:blipFill>
+          <a:blip r:embed="rId5">
+            <a:extLst>
+              <a:ext uri="{28A0092B-C50C-407E-A947-70E740481C1C}">
+                <a14:useLocalDpi xmlns:a14="http://schemas.microsoft.com/office/drawing/2010/main" val="0"/>
+              </a:ext>
+            </a:extLst>
+          </a:blip>
+          <a:srcRect/>
+          <a:stretch>
+            <a:fillRect/>
+          </a:stretch>
+        </p:blipFill>
+        <p:spPr bwMode="auto">
+          <a:xfrm>
+            <a:off x="8958747" y="2564570"/>
+            <a:ext cx="2429720" cy="2429720"/>
+          </a:xfrm>
+          <a:prstGeom prst="rect">
+            <a:avLst/>
+          </a:prstGeom>
+          <a:noFill/>
+          <a:extLst>
+            <a:ext uri="{909E8E84-426E-40DD-AFC4-6F175D3DCCD1}">
+              <a14:hiddenFill xmlns:a14="http://schemas.microsoft.com/office/drawing/2010/main">
+                <a:solidFill>
+                  <a:srgbClr val="FFFFFF"/>
+                </a:solidFill>
+              </a14:hiddenFill>
+            </a:ext>
+          </a:extLst>
+        </p:spPr>
+      </p:pic>
+      <p:sp>
+        <p:nvSpPr>
+          <p:cNvPr id="11" name="TextBox 10">
+            <a:extLst>
+              <a:ext uri="{FF2B5EF4-FFF2-40B4-BE49-F238E27FC236}">
+                <a16:creationId xmlns:a16="http://schemas.microsoft.com/office/drawing/2014/main" id="{6B5E1C57-240F-4E7B-849B-ACD73C5CA67A}"/>
+              </a:ext>
+            </a:extLst>
+          </p:cNvPr>
+          <p:cNvSpPr txBox="1"/>
+          <p:nvPr/>
         </p:nvSpPr>
         <p:spPr>
           <a:xfrm>
-            <a:off x="1066800" y="2103120"/>
-            <a:ext cx="10207150" cy="3849624"/>
-          </a:xfrm>
-        </p:spPr>
-        <p:txBody>
-          <a:bodyPr>
-            <a:normAutofit fontScale="85000" lnSpcReduction="20000"/>
+            <a:off x="1271217" y="5135200"/>
+            <a:ext cx="9853983" cy="923330"/>
+          </a:xfrm>
+          <a:prstGeom prst="rect">
+            <a:avLst/>
+          </a:prstGeom>
+          <a:solidFill>
+            <a:schemeClr val="tx1">
+              <a:lumMod val="65000"/>
+              <a:lumOff val="35000"/>
+            </a:schemeClr>
+          </a:solidFill>
+        </p:spPr>
+        <p:txBody>
+          <a:bodyPr wrap="square" rtlCol="0">
+            <a:spAutoFit/>
           </a:bodyPr>
           <a:lstStyle/>
           <a:p>
-            <a:pPr marL="0" indent="0">
-              <a:buNone/>
-            </a:pPr>
-            <a:r>
-              <a:rPr lang="en-US" sz="2200" b="1" dirty="0"/>
-              <a:t>If we had a few more weeks to investigate…</a:t>
-            </a:r>
-          </a:p>
-          <a:p>
-            <a:r>
-              <a:rPr lang="en-US" sz="2200" dirty="0"/>
-              <a:t>We’d love to look at how various data points are correlated:</a:t>
-            </a:r>
-          </a:p>
-          <a:p>
-            <a:pPr lvl="1"/>
-            <a:r>
-              <a:rPr lang="en-US" sz="2000" dirty="0"/>
-              <a:t>Does count of bachelor’s degrees per capita increase as stronger job opportunities increase?</a:t>
-            </a:r>
-          </a:p>
-          <a:p>
-            <a:pPr lvl="1"/>
-            <a:r>
-              <a:rPr lang="en-US" sz="2000" dirty="0"/>
-              <a:t>Does the split of white collar/blue collar job opportunities impact home price?</a:t>
-            </a:r>
-          </a:p>
-          <a:p>
-            <a:pPr lvl="1"/>
-            <a:r>
-              <a:rPr lang="en-US" sz="2000" dirty="0"/>
-              <a:t>How do things like commute distances to the city, walking scores, and access to public transportation factor into home price?</a:t>
-            </a:r>
-          </a:p>
-          <a:p>
-            <a:pPr lvl="1"/>
-            <a:r>
-              <a:rPr lang="en-US" sz="2000" dirty="0"/>
-              <a:t>Does split of rental opportunities versus “owned” homes impact the median price of sale?</a:t>
-            </a:r>
-          </a:p>
-          <a:p>
-            <a:pPr lvl="1"/>
-            <a:r>
-              <a:rPr lang="en-US" sz="2000" dirty="0"/>
-              <a:t>What factors are caused by the increase in median home price and what factors result in an increase in home price?</a:t>
-            </a:r>
-          </a:p>
-          <a:p>
-            <a:pPr lvl="2"/>
-            <a:r>
-              <a:rPr lang="en-US" sz="1900" dirty="0"/>
-              <a:t>i.e., do prices move down as poverty rates increase, or vice versa?</a:t>
-            </a:r>
-          </a:p>
-          <a:p>
-            <a:pPr lvl="2"/>
-            <a:r>
-              <a:rPr lang="en-US" sz="1900" dirty="0"/>
-              <a:t>Does having more Starbucks Coffee’s or Chipotle’s open in a neighborhood result in the price of rent increasing? Or does Starbucks Coffee and Chipotle select locations that have recently seen a wealthier clientele move in?</a:t>
-            </a:r>
-          </a:p>
-          <a:p>
-            <a:pPr lvl="1"/>
-            <a:endParaRPr lang="en-US" sz="2000" dirty="0"/>
+            <a:pPr algn="ctr"/>
+            <a:r>
+              <a:rPr lang="en-US" dirty="0">
+                <a:solidFill>
+                  <a:schemeClr val="bg1"/>
+                </a:solidFill>
+              </a:rPr>
+              <a:t>Takeaway: On average, zip codes that contain more people who have completed a Bachelor’s degree are more expensive to live in than zip codes where fewer people have completed a Bachelor’s degree</a:t>
+            </a:r>
+          </a:p>
+        </p:txBody>
+      </p:sp>
+      <p:sp>
+        <p:nvSpPr>
+          <p:cNvPr id="12" name="Footer Placeholder 3">
+            <a:extLst>
+              <a:ext uri="{FF2B5EF4-FFF2-40B4-BE49-F238E27FC236}">
+                <a16:creationId xmlns:a16="http://schemas.microsoft.com/office/drawing/2014/main" id="{9F679D7B-F533-40C1-8A3D-A79C88A180E7}"/>
+              </a:ext>
+            </a:extLst>
+          </p:cNvPr>
+          <p:cNvSpPr>
+            <a:spLocks noGrp="1"/>
+          </p:cNvSpPr>
+          <p:nvPr>
+            <p:ph type="ftr" sz="quarter" idx="11"/>
+          </p:nvPr>
+        </p:nvSpPr>
+        <p:spPr>
+          <a:xfrm>
+            <a:off x="1066800" y="6035040"/>
+            <a:ext cx="5816600" cy="365760"/>
+          </a:xfrm>
+        </p:spPr>
+        <p:txBody>
+          <a:bodyPr/>
+          <a:lstStyle/>
+          <a:p>
+            <a:r>
+              <a:rPr lang="en-US" dirty="0"/>
+              <a:t>Zillow Research Data, Census API Data</a:t>
+            </a:r>
+          </a:p>
+        </p:txBody>
+      </p:sp>
+      <p:sp>
+        <p:nvSpPr>
+          <p:cNvPr id="13" name="TextBox 12">
+            <a:extLst>
+              <a:ext uri="{FF2B5EF4-FFF2-40B4-BE49-F238E27FC236}">
+                <a16:creationId xmlns:a16="http://schemas.microsoft.com/office/drawing/2014/main" id="{469EC402-2CDE-42AB-87E3-74704EE3BCDF}"/>
+              </a:ext>
+            </a:extLst>
+          </p:cNvPr>
+          <p:cNvSpPr txBox="1"/>
+          <p:nvPr/>
+        </p:nvSpPr>
+        <p:spPr>
+          <a:xfrm>
+            <a:off x="804658" y="2054328"/>
+            <a:ext cx="1873516" cy="369332"/>
+          </a:xfrm>
+          <a:prstGeom prst="rect">
+            <a:avLst/>
+          </a:prstGeom>
+          <a:solidFill>
+            <a:schemeClr val="tx1">
+              <a:lumMod val="65000"/>
+              <a:lumOff val="35000"/>
+            </a:schemeClr>
+          </a:solidFill>
+        </p:spPr>
+        <p:txBody>
+          <a:bodyPr wrap="square" rtlCol="0">
+            <a:spAutoFit/>
+          </a:bodyPr>
+          <a:lstStyle/>
+          <a:p>
+            <a:pPr algn="ctr"/>
+            <a:r>
+              <a:rPr lang="en-US" dirty="0">
+                <a:solidFill>
+                  <a:schemeClr val="bg1"/>
+                </a:solidFill>
+              </a:rPr>
+              <a:t>2015</a:t>
+            </a:r>
+          </a:p>
+        </p:txBody>
+      </p:sp>
+      <p:sp>
+        <p:nvSpPr>
+          <p:cNvPr id="14" name="TextBox 13">
+            <a:extLst>
+              <a:ext uri="{FF2B5EF4-FFF2-40B4-BE49-F238E27FC236}">
+                <a16:creationId xmlns:a16="http://schemas.microsoft.com/office/drawing/2014/main" id="{EF34E711-072E-4B83-9DE0-85D36E3055A6}"/>
+              </a:ext>
+            </a:extLst>
+          </p:cNvPr>
+          <p:cNvSpPr txBox="1"/>
+          <p:nvPr/>
+        </p:nvSpPr>
+        <p:spPr>
+          <a:xfrm>
+            <a:off x="3673793" y="2054328"/>
+            <a:ext cx="1873516" cy="369332"/>
+          </a:xfrm>
+          <a:prstGeom prst="rect">
+            <a:avLst/>
+          </a:prstGeom>
+          <a:solidFill>
+            <a:schemeClr val="tx1">
+              <a:lumMod val="65000"/>
+              <a:lumOff val="35000"/>
+            </a:schemeClr>
+          </a:solidFill>
+        </p:spPr>
+        <p:txBody>
+          <a:bodyPr wrap="square" rtlCol="0">
+            <a:spAutoFit/>
+          </a:bodyPr>
+          <a:lstStyle/>
+          <a:p>
+            <a:pPr algn="ctr"/>
+            <a:r>
+              <a:rPr lang="en-US" dirty="0">
+                <a:solidFill>
+                  <a:schemeClr val="bg1"/>
+                </a:solidFill>
+              </a:rPr>
+              <a:t>2016</a:t>
+            </a:r>
+          </a:p>
+        </p:txBody>
+      </p:sp>
+      <p:sp>
+        <p:nvSpPr>
+          <p:cNvPr id="15" name="TextBox 14">
+            <a:extLst>
+              <a:ext uri="{FF2B5EF4-FFF2-40B4-BE49-F238E27FC236}">
+                <a16:creationId xmlns:a16="http://schemas.microsoft.com/office/drawing/2014/main" id="{5925C548-509F-4F6A-A857-5ECC79998430}"/>
+              </a:ext>
+            </a:extLst>
+          </p:cNvPr>
+          <p:cNvSpPr txBox="1"/>
+          <p:nvPr/>
+        </p:nvSpPr>
+        <p:spPr>
+          <a:xfrm>
+            <a:off x="6493649" y="2054328"/>
+            <a:ext cx="1873516" cy="369332"/>
+          </a:xfrm>
+          <a:prstGeom prst="rect">
+            <a:avLst/>
+          </a:prstGeom>
+          <a:solidFill>
+            <a:schemeClr val="tx1">
+              <a:lumMod val="65000"/>
+              <a:lumOff val="35000"/>
+            </a:schemeClr>
+          </a:solidFill>
+        </p:spPr>
+        <p:txBody>
+          <a:bodyPr wrap="square" rtlCol="0">
+            <a:spAutoFit/>
+          </a:bodyPr>
+          <a:lstStyle/>
+          <a:p>
+            <a:pPr algn="ctr"/>
+            <a:r>
+              <a:rPr lang="en-US" dirty="0">
+                <a:solidFill>
+                  <a:schemeClr val="bg1"/>
+                </a:solidFill>
+              </a:rPr>
+              <a:t>2017</a:t>
+            </a:r>
+          </a:p>
+        </p:txBody>
+      </p:sp>
+      <p:sp>
+        <p:nvSpPr>
+          <p:cNvPr id="16" name="TextBox 15">
+            <a:extLst>
+              <a:ext uri="{FF2B5EF4-FFF2-40B4-BE49-F238E27FC236}">
+                <a16:creationId xmlns:a16="http://schemas.microsoft.com/office/drawing/2014/main" id="{C4E4CE75-CC73-444B-B97B-2F924294F8B6}"/>
+              </a:ext>
+            </a:extLst>
+          </p:cNvPr>
+          <p:cNvSpPr txBox="1"/>
+          <p:nvPr/>
+        </p:nvSpPr>
+        <p:spPr>
+          <a:xfrm>
+            <a:off x="9167824" y="2054328"/>
+            <a:ext cx="1873516" cy="369332"/>
+          </a:xfrm>
+          <a:prstGeom prst="rect">
+            <a:avLst/>
+          </a:prstGeom>
+          <a:solidFill>
+            <a:schemeClr val="tx1">
+              <a:lumMod val="65000"/>
+              <a:lumOff val="35000"/>
+            </a:schemeClr>
+          </a:solidFill>
+        </p:spPr>
+        <p:txBody>
+          <a:bodyPr wrap="square" rtlCol="0">
+            <a:spAutoFit/>
+          </a:bodyPr>
+          <a:lstStyle/>
+          <a:p>
+            <a:pPr algn="ctr"/>
+            <a:r>
+              <a:rPr lang="en-US" dirty="0">
+                <a:solidFill>
+                  <a:schemeClr val="bg1"/>
+                </a:solidFill>
+              </a:rPr>
+              <a:t>2018</a:t>
+            </a:r>
           </a:p>
         </p:txBody>
       </p:sp>
     </p:spTree>
     <p:extLst>
       <p:ext uri="{BB962C8B-B14F-4D97-AF65-F5344CB8AC3E}">
-        <p14:creationId xmlns:p14="http://schemas.microsoft.com/office/powerpoint/2010/main" val="2217742411"/>
+        <p14:creationId xmlns:p14="http://schemas.microsoft.com/office/powerpoint/2010/main" val="2617795900"/>
       </p:ext>
     </p:extLst>
   </p:cSld>
@@ -7208,10 +7300,10 @@
       </p:grpSpPr>
       <p:sp>
         <p:nvSpPr>
-          <p:cNvPr id="4" name="Title 3">
+          <p:cNvPr id="2" name="Title 1">
             <a:extLst>
               <a:ext uri="{FF2B5EF4-FFF2-40B4-BE49-F238E27FC236}">
-                <a16:creationId xmlns:a16="http://schemas.microsoft.com/office/drawing/2014/main" id="{1DC3E42C-322F-4668-B91D-29559CA77912}"/>
+                <a16:creationId xmlns:a16="http://schemas.microsoft.com/office/drawing/2014/main" id="{77CF0920-EE46-4ADF-8AFE-90DFA403912B}"/>
               </a:ext>
             </a:extLst>
           </p:cNvPr>
@@ -7229,17 +7321,17 @@
           <a:p>
             <a:r>
               <a:rPr lang="en-US" dirty="0"/>
-              <a:t>Q&amp;A</a:t>
-            </a:r>
-          </a:p>
-        </p:txBody>
-      </p:sp>
-      <p:sp>
-        <p:nvSpPr>
-          <p:cNvPr id="5" name="Text Placeholder 4">
+              <a:t>Conclusions</a:t>
+            </a:r>
+          </a:p>
+        </p:txBody>
+      </p:sp>
+      <p:sp>
+        <p:nvSpPr>
+          <p:cNvPr id="3" name="Content Placeholder 2">
             <a:extLst>
               <a:ext uri="{FF2B5EF4-FFF2-40B4-BE49-F238E27FC236}">
-                <a16:creationId xmlns:a16="http://schemas.microsoft.com/office/drawing/2014/main" id="{0EC2B2B3-B7A1-4292-A5C2-74D8CB7ED2BC}"/>
+                <a16:creationId xmlns:a16="http://schemas.microsoft.com/office/drawing/2014/main" id="{DC2029A2-C07E-40E2-AEB4-CFAB6045B215}"/>
               </a:ext>
             </a:extLst>
           </p:cNvPr>
@@ -7247,7 +7339,7 @@
             <a:spLocks noGrp="1"/>
           </p:cNvSpPr>
           <p:nvPr>
-            <p:ph type="body" idx="1"/>
+            <p:ph idx="1"/>
           </p:nvPr>
         </p:nvSpPr>
         <p:spPr/>
@@ -7257,15 +7349,54 @@
           <a:p>
             <a:r>
               <a:rPr lang="en-US" dirty="0"/>
-              <a:t>Thank you!</a:t>
-            </a:r>
+              <a:t>As expected, the price of homes in Georgia is increasing year over year across zip codes.</a:t>
+            </a:r>
+          </a:p>
+          <a:p>
+            <a:r>
+              <a:rPr lang="en-US" dirty="0"/>
+              <a:t>Median income has an impact on the affordability of housing in metro Atlanta.</a:t>
+            </a:r>
+          </a:p>
+          <a:p>
+            <a:r>
+              <a:rPr lang="en-US" dirty="0"/>
+              <a:t>As population grows, property value increases due to the increased demand in a concentrated area.</a:t>
+            </a:r>
+          </a:p>
+          <a:p>
+            <a:r>
+              <a:rPr lang="en-US" dirty="0"/>
+              <a:t>Zip codes with higher poverty rates in Georgia are less expensive to live in than those with lower poverty rates</a:t>
+            </a:r>
+          </a:p>
+          <a:p>
+            <a:r>
+              <a:rPr lang="en-US" dirty="0"/>
+              <a:t>Zip codes with higher unemployment rates in Georgia are less expensive to live in than those with lower unemployment rates</a:t>
+            </a:r>
+          </a:p>
+          <a:p>
+            <a:r>
+              <a:rPr lang="en-US" dirty="0"/>
+              <a:t>Zip codes with fewer highly educated people in Georgia are less expensive to live in than those with more highly educated people</a:t>
+            </a:r>
+          </a:p>
+          <a:p>
+            <a:r>
+              <a:rPr lang="en-US" dirty="0"/>
+              <a:t>Many of these factors are intertwined, and a more robust analysis with a more robust data set would be helpful to identify the key factors that are most correlated with home price in an area.</a:t>
+            </a:r>
+          </a:p>
+          <a:p>
+            <a:endParaRPr lang="en-US" dirty="0"/>
           </a:p>
         </p:txBody>
       </p:sp>
     </p:spTree>
     <p:extLst>
       <p:ext uri="{BB962C8B-B14F-4D97-AF65-F5344CB8AC3E}">
-        <p14:creationId xmlns:p14="http://schemas.microsoft.com/office/powerpoint/2010/main" val="3635850535"/>
+        <p14:creationId xmlns:p14="http://schemas.microsoft.com/office/powerpoint/2010/main" val="4188248600"/>
       </p:ext>
     </p:extLst>
   </p:cSld>
@@ -7294,10 +7425,10 @@
       </p:grpSpPr>
       <p:sp>
         <p:nvSpPr>
-          <p:cNvPr id="4" name="Title 3">
+          <p:cNvPr id="2" name="Title 1">
             <a:extLst>
               <a:ext uri="{FF2B5EF4-FFF2-40B4-BE49-F238E27FC236}">
-                <a16:creationId xmlns:a16="http://schemas.microsoft.com/office/drawing/2014/main" id="{1DC3E42C-322F-4668-B91D-29559CA77912}"/>
+                <a16:creationId xmlns:a16="http://schemas.microsoft.com/office/drawing/2014/main" id="{13934363-2F03-4422-B996-F499D6A560E2}"/>
               </a:ext>
             </a:extLst>
           </p:cNvPr>
@@ -7315,15 +7446,112 @@
           <a:p>
             <a:r>
               <a:rPr lang="en-US" dirty="0"/>
-              <a:t>Appendix</a:t>
-            </a:r>
+              <a:t>What’s Next?</a:t>
+            </a:r>
+          </a:p>
+        </p:txBody>
+      </p:sp>
+      <p:sp>
+        <p:nvSpPr>
+          <p:cNvPr id="3" name="Content Placeholder 2">
+            <a:extLst>
+              <a:ext uri="{FF2B5EF4-FFF2-40B4-BE49-F238E27FC236}">
+                <a16:creationId xmlns:a16="http://schemas.microsoft.com/office/drawing/2014/main" id="{B5D5F71B-9D32-4663-A240-D664E71BE9A4}"/>
+              </a:ext>
+            </a:extLst>
+          </p:cNvPr>
+          <p:cNvSpPr>
+            <a:spLocks noGrp="1"/>
+          </p:cNvSpPr>
+          <p:nvPr>
+            <p:ph idx="1"/>
+          </p:nvPr>
+        </p:nvSpPr>
+        <p:spPr>
+          <a:xfrm>
+            <a:off x="1066800" y="2103120"/>
+            <a:ext cx="10207150" cy="3849624"/>
+          </a:xfrm>
+        </p:spPr>
+        <p:txBody>
+          <a:bodyPr>
+            <a:normAutofit fontScale="85000" lnSpcReduction="20000"/>
+          </a:bodyPr>
+          <a:lstStyle/>
+          <a:p>
+            <a:pPr marL="0" indent="0">
+              <a:buNone/>
+            </a:pPr>
+            <a:r>
+              <a:rPr lang="en-US" sz="2200" b="1" dirty="0"/>
+              <a:t>If we had a few more weeks to investigate…</a:t>
+            </a:r>
+          </a:p>
+          <a:p>
+            <a:r>
+              <a:rPr lang="en-US" sz="2200" dirty="0"/>
+              <a:t>We’d love to look at how various data points are correlated:</a:t>
+            </a:r>
+          </a:p>
+          <a:p>
+            <a:pPr lvl="1"/>
+            <a:r>
+              <a:rPr lang="en-US" sz="2000" dirty="0"/>
+              <a:t>Does count of bachelor’s degrees per capita increase as stronger job opportunities increase?</a:t>
+            </a:r>
+          </a:p>
+          <a:p>
+            <a:pPr lvl="1"/>
+            <a:r>
+              <a:rPr lang="en-US" sz="2000" dirty="0"/>
+              <a:t>Does the split of white collar/blue collar job opportunities impact home price?</a:t>
+            </a:r>
+          </a:p>
+          <a:p>
+            <a:pPr lvl="1"/>
+            <a:r>
+              <a:rPr lang="en-US" sz="2000" dirty="0"/>
+              <a:t>How do things like commute distances to the city, walking scores, and access to public transportation factor into home price?</a:t>
+            </a:r>
+          </a:p>
+          <a:p>
+            <a:pPr lvl="1"/>
+            <a:r>
+              <a:rPr lang="en-US" sz="2000" dirty="0"/>
+              <a:t>Does split of rental opportunities versus “owned” homes impact the median price of sale?</a:t>
+            </a:r>
+          </a:p>
+          <a:p>
+            <a:pPr lvl="1"/>
+            <a:r>
+              <a:rPr lang="en-US" sz="2000" dirty="0"/>
+              <a:t>What factors are caused by the increase in median home price and what factors result in an increase in home price?</a:t>
+            </a:r>
+          </a:p>
+          <a:p>
+            <a:pPr lvl="2"/>
+            <a:r>
+              <a:rPr lang="en-US" sz="1900" dirty="0"/>
+              <a:t>i.e., do prices move down as poverty rates increase, or vice versa?</a:t>
+            </a:r>
+          </a:p>
+          <a:p>
+            <a:pPr lvl="2"/>
+            <a:r>
+              <a:rPr lang="en-US" sz="1900" dirty="0"/>
+              <a:t>Does having more Starbucks Coffee’s or Chipotle’s open in a neighborhood result in the price of rent increasing? Or does Starbucks Coffee and Chipotle select locations that have recently seen a wealthier clientele move in?</a:t>
+            </a:r>
+          </a:p>
+          <a:p>
+            <a:pPr lvl="1"/>
+            <a:endParaRPr lang="en-US" sz="2000" dirty="0"/>
           </a:p>
         </p:txBody>
       </p:sp>
     </p:spTree>
     <p:extLst>
       <p:ext uri="{BB962C8B-B14F-4D97-AF65-F5344CB8AC3E}">
-        <p14:creationId xmlns:p14="http://schemas.microsoft.com/office/powerpoint/2010/main" val="2797155901"/>
+        <p14:creationId xmlns:p14="http://schemas.microsoft.com/office/powerpoint/2010/main" val="2217742411"/>
       </p:ext>
     </p:extLst>
   </p:cSld>
@@ -7352,10 +7580,10 @@
       </p:grpSpPr>
       <p:sp>
         <p:nvSpPr>
-          <p:cNvPr id="2" name="Title 1">
+          <p:cNvPr id="4" name="Title 3">
             <a:extLst>
               <a:ext uri="{FF2B5EF4-FFF2-40B4-BE49-F238E27FC236}">
-                <a16:creationId xmlns:a16="http://schemas.microsoft.com/office/drawing/2014/main" id="{F070D64D-BA64-4601-901A-5F3F1FC10F15}"/>
+                <a16:creationId xmlns:a16="http://schemas.microsoft.com/office/drawing/2014/main" id="{1DC3E42C-322F-4668-B91D-29559CA77912}"/>
               </a:ext>
             </a:extLst>
           </p:cNvPr>
@@ -7373,62 +7601,43 @@
           <a:p>
             <a:r>
               <a:rPr lang="en-US" dirty="0"/>
-              <a:t>Home Price By City Over Year</a:t>
-            </a:r>
-          </a:p>
-        </p:txBody>
-      </p:sp>
-      <p:pic>
-        <p:nvPicPr>
-          <p:cNvPr id="3074" name="Picture 2">
+              <a:t>Q&amp;A</a:t>
+            </a:r>
+          </a:p>
+        </p:txBody>
+      </p:sp>
+      <p:sp>
+        <p:nvSpPr>
+          <p:cNvPr id="5" name="Text Placeholder 4">
             <a:extLst>
               <a:ext uri="{FF2B5EF4-FFF2-40B4-BE49-F238E27FC236}">
-                <a16:creationId xmlns:a16="http://schemas.microsoft.com/office/drawing/2014/main" id="{C8BEF1EA-BC1E-427A-ADF2-2BB144B6B720}"/>
+                <a16:creationId xmlns:a16="http://schemas.microsoft.com/office/drawing/2014/main" id="{0EC2B2B3-B7A1-4292-A5C2-74D8CB7ED2BC}"/>
               </a:ext>
             </a:extLst>
           </p:cNvPr>
-          <p:cNvPicPr>
-            <a:picLocks noChangeAspect="1" noChangeArrowheads="1"/>
-          </p:cNvPicPr>
-          <p:nvPr/>
-        </p:nvPicPr>
-        <p:blipFill>
-          <a:blip r:embed="rId2">
-            <a:extLst>
-              <a:ext uri="{28A0092B-C50C-407E-A947-70E740481C1C}">
-                <a14:useLocalDpi xmlns:a14="http://schemas.microsoft.com/office/drawing/2010/main" val="0"/>
-              </a:ext>
-            </a:extLst>
-          </a:blip>
-          <a:srcRect/>
-          <a:stretch>
-            <a:fillRect/>
-          </a:stretch>
-        </p:blipFill>
-        <p:spPr bwMode="auto">
-          <a:xfrm>
-            <a:off x="2463952" y="1583867"/>
-            <a:ext cx="6953690" cy="4751227"/>
-          </a:xfrm>
-          <a:prstGeom prst="rect">
-            <a:avLst/>
-          </a:prstGeom>
-          <a:noFill/>
-          <a:extLst>
-            <a:ext uri="{909E8E84-426E-40DD-AFC4-6F175D3DCCD1}">
-              <a14:hiddenFill xmlns:a14="http://schemas.microsoft.com/office/drawing/2010/main">
-                <a:solidFill>
-                  <a:srgbClr val="FFFFFF"/>
-                </a:solidFill>
-              </a14:hiddenFill>
-            </a:ext>
-          </a:extLst>
-        </p:spPr>
-      </p:pic>
+          <p:cNvSpPr>
+            <a:spLocks noGrp="1"/>
+          </p:cNvSpPr>
+          <p:nvPr>
+            <p:ph type="body" idx="1"/>
+          </p:nvPr>
+        </p:nvSpPr>
+        <p:spPr/>
+        <p:txBody>
+          <a:bodyPr/>
+          <a:lstStyle/>
+          <a:p>
+            <a:r>
+              <a:rPr lang="en-US" dirty="0"/>
+              <a:t>Thank you!</a:t>
+            </a:r>
+          </a:p>
+        </p:txBody>
+      </p:sp>
     </p:spTree>
     <p:extLst>
       <p:ext uri="{BB962C8B-B14F-4D97-AF65-F5344CB8AC3E}">
-        <p14:creationId xmlns:p14="http://schemas.microsoft.com/office/powerpoint/2010/main" val="4172235550"/>
+        <p14:creationId xmlns:p14="http://schemas.microsoft.com/office/powerpoint/2010/main" val="3635850535"/>
       </p:ext>
     </p:extLst>
   </p:cSld>
@@ -7457,10 +7666,10 @@
       </p:grpSpPr>
       <p:sp>
         <p:nvSpPr>
-          <p:cNvPr id="2" name="Title 1">
+          <p:cNvPr id="4" name="Title 3">
             <a:extLst>
               <a:ext uri="{FF2B5EF4-FFF2-40B4-BE49-F238E27FC236}">
-                <a16:creationId xmlns:a16="http://schemas.microsoft.com/office/drawing/2014/main" id="{87DB1CCB-9980-4EB3-AC3A-11EC6FDC8B5E}"/>
+                <a16:creationId xmlns:a16="http://schemas.microsoft.com/office/drawing/2014/main" id="{1DC3E42C-322F-4668-B91D-29559CA77912}"/>
               </a:ext>
             </a:extLst>
           </p:cNvPr>
@@ -7478,62 +7687,15 @@
           <a:p>
             <a:r>
               <a:rPr lang="en-US" dirty="0"/>
-              <a:t>Home Price by County/City – The Economic Decline</a:t>
-            </a:r>
-          </a:p>
-        </p:txBody>
-      </p:sp>
-      <p:pic>
-        <p:nvPicPr>
-          <p:cNvPr id="5122" name="Picture 2">
-            <a:extLst>
-              <a:ext uri="{FF2B5EF4-FFF2-40B4-BE49-F238E27FC236}">
-                <a16:creationId xmlns:a16="http://schemas.microsoft.com/office/drawing/2014/main" id="{51E742A7-A1C8-4270-A28A-C4C4443FFE29}"/>
-              </a:ext>
-            </a:extLst>
-          </p:cNvPr>
-          <p:cNvPicPr>
-            <a:picLocks noChangeAspect="1" noChangeArrowheads="1"/>
-          </p:cNvPicPr>
-          <p:nvPr/>
-        </p:nvPicPr>
-        <p:blipFill>
-          <a:blip r:embed="rId2">
-            <a:extLst>
-              <a:ext uri="{28A0092B-C50C-407E-A947-70E740481C1C}">
-                <a14:useLocalDpi xmlns:a14="http://schemas.microsoft.com/office/drawing/2010/main" val="0"/>
-              </a:ext>
-            </a:extLst>
-          </a:blip>
-          <a:srcRect/>
-          <a:stretch>
-            <a:fillRect/>
-          </a:stretch>
-        </p:blipFill>
-        <p:spPr bwMode="auto">
-          <a:xfrm>
-            <a:off x="1946180" y="2068949"/>
-            <a:ext cx="8299640" cy="4477904"/>
-          </a:xfrm>
-          <a:prstGeom prst="rect">
-            <a:avLst/>
-          </a:prstGeom>
-          <a:noFill/>
-          <a:extLst>
-            <a:ext uri="{909E8E84-426E-40DD-AFC4-6F175D3DCCD1}">
-              <a14:hiddenFill xmlns:a14="http://schemas.microsoft.com/office/drawing/2010/main">
-                <a:solidFill>
-                  <a:srgbClr val="FFFFFF"/>
-                </a:solidFill>
-              </a14:hiddenFill>
-            </a:ext>
-          </a:extLst>
-        </p:spPr>
-      </p:pic>
+              <a:t>Appendix</a:t>
+            </a:r>
+          </a:p>
+        </p:txBody>
+      </p:sp>
     </p:spTree>
     <p:extLst>
       <p:ext uri="{BB962C8B-B14F-4D97-AF65-F5344CB8AC3E}">
-        <p14:creationId xmlns:p14="http://schemas.microsoft.com/office/powerpoint/2010/main" val="4146859826"/>
+        <p14:creationId xmlns:p14="http://schemas.microsoft.com/office/powerpoint/2010/main" val="2797155901"/>
       </p:ext>
     </p:extLst>
   </p:cSld>
@@ -7625,6 +7787,216 @@
           <p:cNvPr id="2" name="Title 1">
             <a:extLst>
               <a:ext uri="{FF2B5EF4-FFF2-40B4-BE49-F238E27FC236}">
+                <a16:creationId xmlns:a16="http://schemas.microsoft.com/office/drawing/2014/main" id="{F070D64D-BA64-4601-901A-5F3F1FC10F15}"/>
+              </a:ext>
+            </a:extLst>
+          </p:cNvPr>
+          <p:cNvSpPr>
+            <a:spLocks noGrp="1"/>
+          </p:cNvSpPr>
+          <p:nvPr>
+            <p:ph type="title"/>
+          </p:nvPr>
+        </p:nvSpPr>
+        <p:spPr/>
+        <p:txBody>
+          <a:bodyPr/>
+          <a:lstStyle/>
+          <a:p>
+            <a:r>
+              <a:rPr lang="en-US" dirty="0"/>
+              <a:t>Home Price By City Over Year</a:t>
+            </a:r>
+          </a:p>
+        </p:txBody>
+      </p:sp>
+      <p:pic>
+        <p:nvPicPr>
+          <p:cNvPr id="3074" name="Picture 2">
+            <a:extLst>
+              <a:ext uri="{FF2B5EF4-FFF2-40B4-BE49-F238E27FC236}">
+                <a16:creationId xmlns:a16="http://schemas.microsoft.com/office/drawing/2014/main" id="{C8BEF1EA-BC1E-427A-ADF2-2BB144B6B720}"/>
+              </a:ext>
+            </a:extLst>
+          </p:cNvPr>
+          <p:cNvPicPr>
+            <a:picLocks noChangeAspect="1" noChangeArrowheads="1"/>
+          </p:cNvPicPr>
+          <p:nvPr/>
+        </p:nvPicPr>
+        <p:blipFill>
+          <a:blip r:embed="rId2">
+            <a:extLst>
+              <a:ext uri="{28A0092B-C50C-407E-A947-70E740481C1C}">
+                <a14:useLocalDpi xmlns:a14="http://schemas.microsoft.com/office/drawing/2010/main" val="0"/>
+              </a:ext>
+            </a:extLst>
+          </a:blip>
+          <a:srcRect/>
+          <a:stretch>
+            <a:fillRect/>
+          </a:stretch>
+        </p:blipFill>
+        <p:spPr bwMode="auto">
+          <a:xfrm>
+            <a:off x="2463952" y="1583867"/>
+            <a:ext cx="6953690" cy="4751227"/>
+          </a:xfrm>
+          <a:prstGeom prst="rect">
+            <a:avLst/>
+          </a:prstGeom>
+          <a:noFill/>
+          <a:extLst>
+            <a:ext uri="{909E8E84-426E-40DD-AFC4-6F175D3DCCD1}">
+              <a14:hiddenFill xmlns:a14="http://schemas.microsoft.com/office/drawing/2010/main">
+                <a:solidFill>
+                  <a:srgbClr val="FFFFFF"/>
+                </a:solidFill>
+              </a14:hiddenFill>
+            </a:ext>
+          </a:extLst>
+        </p:spPr>
+      </p:pic>
+    </p:spTree>
+    <p:extLst>
+      <p:ext uri="{BB962C8B-B14F-4D97-AF65-F5344CB8AC3E}">
+        <p14:creationId xmlns:p14="http://schemas.microsoft.com/office/powerpoint/2010/main" val="4172235550"/>
+      </p:ext>
+    </p:extLst>
+  </p:cSld>
+  <p:clrMapOvr>
+    <a:masterClrMapping/>
+  </p:clrMapOvr>
+</p:sld>
+</file>
+
+<file path=ppt/slides/slide21.xml><?xml version="1.0" encoding="utf-8"?>
+<p:sld xmlns:a="http://schemas.openxmlformats.org/drawingml/2006/main" xmlns:r="http://schemas.openxmlformats.org/officeDocument/2006/relationships" xmlns:p="http://schemas.openxmlformats.org/presentationml/2006/main">
+  <p:cSld>
+    <p:spTree>
+      <p:nvGrpSpPr>
+        <p:cNvPr id="1" name=""/>
+        <p:cNvGrpSpPr/>
+        <p:nvPr/>
+      </p:nvGrpSpPr>
+      <p:grpSpPr>
+        <a:xfrm>
+          <a:off x="0" y="0"/>
+          <a:ext cx="0" cy="0"/>
+          <a:chOff x="0" y="0"/>
+          <a:chExt cx="0" cy="0"/>
+        </a:xfrm>
+      </p:grpSpPr>
+      <p:sp>
+        <p:nvSpPr>
+          <p:cNvPr id="2" name="Title 1">
+            <a:extLst>
+              <a:ext uri="{FF2B5EF4-FFF2-40B4-BE49-F238E27FC236}">
+                <a16:creationId xmlns:a16="http://schemas.microsoft.com/office/drawing/2014/main" id="{87DB1CCB-9980-4EB3-AC3A-11EC6FDC8B5E}"/>
+              </a:ext>
+            </a:extLst>
+          </p:cNvPr>
+          <p:cNvSpPr>
+            <a:spLocks noGrp="1"/>
+          </p:cNvSpPr>
+          <p:nvPr>
+            <p:ph type="title"/>
+          </p:nvPr>
+        </p:nvSpPr>
+        <p:spPr/>
+        <p:txBody>
+          <a:bodyPr/>
+          <a:lstStyle/>
+          <a:p>
+            <a:r>
+              <a:rPr lang="en-US" dirty="0"/>
+              <a:t>Home Price by County/City – The Economic Decline</a:t>
+            </a:r>
+          </a:p>
+        </p:txBody>
+      </p:sp>
+      <p:pic>
+        <p:nvPicPr>
+          <p:cNvPr id="5122" name="Picture 2">
+            <a:extLst>
+              <a:ext uri="{FF2B5EF4-FFF2-40B4-BE49-F238E27FC236}">
+                <a16:creationId xmlns:a16="http://schemas.microsoft.com/office/drawing/2014/main" id="{51E742A7-A1C8-4270-A28A-C4C4443FFE29}"/>
+              </a:ext>
+            </a:extLst>
+          </p:cNvPr>
+          <p:cNvPicPr>
+            <a:picLocks noChangeAspect="1" noChangeArrowheads="1"/>
+          </p:cNvPicPr>
+          <p:nvPr/>
+        </p:nvPicPr>
+        <p:blipFill>
+          <a:blip r:embed="rId2">
+            <a:extLst>
+              <a:ext uri="{28A0092B-C50C-407E-A947-70E740481C1C}">
+                <a14:useLocalDpi xmlns:a14="http://schemas.microsoft.com/office/drawing/2010/main" val="0"/>
+              </a:ext>
+            </a:extLst>
+          </a:blip>
+          <a:srcRect/>
+          <a:stretch>
+            <a:fillRect/>
+          </a:stretch>
+        </p:blipFill>
+        <p:spPr bwMode="auto">
+          <a:xfrm>
+            <a:off x="1946180" y="2068949"/>
+            <a:ext cx="8299640" cy="4477904"/>
+          </a:xfrm>
+          <a:prstGeom prst="rect">
+            <a:avLst/>
+          </a:prstGeom>
+          <a:noFill/>
+          <a:extLst>
+            <a:ext uri="{909E8E84-426E-40DD-AFC4-6F175D3DCCD1}">
+              <a14:hiddenFill xmlns:a14="http://schemas.microsoft.com/office/drawing/2010/main">
+                <a:solidFill>
+                  <a:srgbClr val="FFFFFF"/>
+                </a:solidFill>
+              </a14:hiddenFill>
+            </a:ext>
+          </a:extLst>
+        </p:spPr>
+      </p:pic>
+    </p:spTree>
+    <p:extLst>
+      <p:ext uri="{BB962C8B-B14F-4D97-AF65-F5344CB8AC3E}">
+        <p14:creationId xmlns:p14="http://schemas.microsoft.com/office/powerpoint/2010/main" val="4146859826"/>
+      </p:ext>
+    </p:extLst>
+  </p:cSld>
+  <p:clrMapOvr>
+    <a:masterClrMapping/>
+  </p:clrMapOvr>
+</p:sld>
+</file>
+
+<file path=ppt/slides/slide22.xml><?xml version="1.0" encoding="utf-8"?>
+<p:sld xmlns:a="http://schemas.openxmlformats.org/drawingml/2006/main" xmlns:r="http://schemas.openxmlformats.org/officeDocument/2006/relationships" xmlns:p="http://schemas.openxmlformats.org/presentationml/2006/main">
+  <p:cSld>
+    <p:spTree>
+      <p:nvGrpSpPr>
+        <p:cNvPr id="1" name=""/>
+        <p:cNvGrpSpPr/>
+        <p:nvPr/>
+      </p:nvGrpSpPr>
+      <p:grpSpPr>
+        <a:xfrm>
+          <a:off x="0" y="0"/>
+          <a:ext cx="0" cy="0"/>
+          <a:chOff x="0" y="0"/>
+          <a:chExt cx="0" cy="0"/>
+        </a:xfrm>
+      </p:grpSpPr>
+      <p:sp>
+        <p:nvSpPr>
+          <p:cNvPr id="2" name="Title 1">
+            <a:extLst>
+              <a:ext uri="{FF2B5EF4-FFF2-40B4-BE49-F238E27FC236}">
                 <a16:creationId xmlns:a16="http://schemas.microsoft.com/office/drawing/2014/main" id="{D360B541-BEFF-481C-AC2C-5EE1E681AEAF}"/>
               </a:ext>
             </a:extLst>
@@ -7708,7 +8080,7 @@
 </p:sld>
 </file>
 
-<file path=ppt/slides/slide21.xml><?xml version="1.0" encoding="utf-8"?>
+<file path=ppt/slides/slide23.xml><?xml version="1.0" encoding="utf-8"?>
 <p:sld xmlns:a="http://schemas.openxmlformats.org/drawingml/2006/main" xmlns:r="http://schemas.openxmlformats.org/officeDocument/2006/relationships" xmlns:p="http://schemas.openxmlformats.org/presentationml/2006/main">
   <p:cSld>
     <p:spTree>
@@ -8000,7 +8372,7 @@
             <a:pPr lvl="1"/>
             <a:r>
               <a:rPr lang="en-US" sz="1800" dirty="0"/>
-              <a:t>How does the growth in the population affect housing prices in the Georgia?</a:t>
+              <a:t>How does the growth in the population affect housing prices in Georgia?</a:t>
             </a:r>
           </a:p>
           <a:p>
@@ -8014,7 +8386,7 @@
             <a:pPr lvl="2"/>
             <a:r>
               <a:rPr lang="en-US" sz="1600" dirty="0"/>
-              <a:t>Does poverty rate impact home price?</a:t>
+              <a:t>Does poverty rate by zip code impact home price?</a:t>
             </a:r>
           </a:p>
           <a:p>
@@ -8283,10 +8655,10 @@
       </p:grpSpPr>
       <p:sp>
         <p:nvSpPr>
-          <p:cNvPr id="4" name="Title 3">
+          <p:cNvPr id="2" name="Title 1">
             <a:extLst>
               <a:ext uri="{FF2B5EF4-FFF2-40B4-BE49-F238E27FC236}">
-                <a16:creationId xmlns:a16="http://schemas.microsoft.com/office/drawing/2014/main" id="{1DC3E42C-322F-4668-B91D-29559CA77912}"/>
+                <a16:creationId xmlns:a16="http://schemas.microsoft.com/office/drawing/2014/main" id="{68FA1818-6AAA-704A-B13B-29ADCA1A2D8D}"/>
               </a:ext>
             </a:extLst>
           </p:cNvPr>
@@ -8304,15 +8676,196 @@
           <a:p>
             <a:r>
               <a:rPr lang="en-US" dirty="0"/>
-              <a:t>Data Analysis</a:t>
-            </a:r>
+              <a:t>Data Retrieval Process and Result </a:t>
+            </a:r>
+          </a:p>
+        </p:txBody>
+      </p:sp>
+      <p:pic>
+        <p:nvPicPr>
+          <p:cNvPr id="5" name="Picture 4" descr="A screenshot of a cell phone&#10;&#10;Description automatically generated">
+            <a:extLst>
+              <a:ext uri="{FF2B5EF4-FFF2-40B4-BE49-F238E27FC236}">
+                <a16:creationId xmlns:a16="http://schemas.microsoft.com/office/drawing/2014/main" id="{A2F39142-C58E-5D49-B9E2-A05DC988B30F}"/>
+              </a:ext>
+            </a:extLst>
+          </p:cNvPr>
+          <p:cNvPicPr>
+            <a:picLocks noChangeAspect="1"/>
+          </p:cNvPicPr>
+          <p:nvPr/>
+        </p:nvPicPr>
+        <p:blipFill>
+          <a:blip r:embed="rId2">
+            <a:extLst>
+              <a:ext uri="{28A0092B-C50C-407E-A947-70E740481C1C}">
+                <a14:useLocalDpi xmlns:a14="http://schemas.microsoft.com/office/drawing/2010/main" val="0"/>
+              </a:ext>
+            </a:extLst>
+          </a:blip>
+          <a:stretch>
+            <a:fillRect/>
+          </a:stretch>
+        </p:blipFill>
+        <p:spPr>
+          <a:xfrm>
+            <a:off x="7586661" y="4153434"/>
+            <a:ext cx="2608821" cy="1897324"/>
+          </a:xfrm>
+          <a:prstGeom prst="rect">
+            <a:avLst/>
+          </a:prstGeom>
+        </p:spPr>
+      </p:pic>
+      <p:pic>
+        <p:nvPicPr>
+          <p:cNvPr id="7" name="Picture 6" descr="A screenshot of a cell phone&#10;&#10;Description automatically generated">
+            <a:extLst>
+              <a:ext uri="{FF2B5EF4-FFF2-40B4-BE49-F238E27FC236}">
+                <a16:creationId xmlns:a16="http://schemas.microsoft.com/office/drawing/2014/main" id="{B94C08B0-02F3-7441-9F3E-B9CE8A937313}"/>
+              </a:ext>
+            </a:extLst>
+          </p:cNvPr>
+          <p:cNvPicPr>
+            <a:picLocks noChangeAspect="1"/>
+          </p:cNvPicPr>
+          <p:nvPr/>
+        </p:nvPicPr>
+        <p:blipFill>
+          <a:blip r:embed="rId3">
+            <a:extLst>
+              <a:ext uri="{28A0092B-C50C-407E-A947-70E740481C1C}">
+                <a14:useLocalDpi xmlns:a14="http://schemas.microsoft.com/office/drawing/2010/main" val="0"/>
+              </a:ext>
+            </a:extLst>
+          </a:blip>
+          <a:stretch>
+            <a:fillRect/>
+          </a:stretch>
+        </p:blipFill>
+        <p:spPr>
+          <a:xfrm>
+            <a:off x="1066800" y="1757118"/>
+            <a:ext cx="4667479" cy="2214807"/>
+          </a:xfrm>
+          <a:prstGeom prst="rect">
+            <a:avLst/>
+          </a:prstGeom>
+        </p:spPr>
+      </p:pic>
+      <p:pic>
+        <p:nvPicPr>
+          <p:cNvPr id="9" name="Picture 8" descr="A screenshot of a social media post&#10;&#10;Description automatically generated">
+            <a:extLst>
+              <a:ext uri="{FF2B5EF4-FFF2-40B4-BE49-F238E27FC236}">
+                <a16:creationId xmlns:a16="http://schemas.microsoft.com/office/drawing/2014/main" id="{2F591B89-876C-A741-B26E-82D1882C7D32}"/>
+              </a:ext>
+            </a:extLst>
+          </p:cNvPr>
+          <p:cNvPicPr>
+            <a:picLocks noChangeAspect="1"/>
+          </p:cNvPicPr>
+          <p:nvPr/>
+        </p:nvPicPr>
+        <p:blipFill>
+          <a:blip r:embed="rId4">
+            <a:extLst>
+              <a:ext uri="{28A0092B-C50C-407E-A947-70E740481C1C}">
+                <a14:useLocalDpi xmlns:a14="http://schemas.microsoft.com/office/drawing/2010/main" val="0"/>
+              </a:ext>
+            </a:extLst>
+          </a:blip>
+          <a:stretch>
+            <a:fillRect/>
+          </a:stretch>
+        </p:blipFill>
+        <p:spPr>
+          <a:xfrm>
+            <a:off x="1066800" y="4496343"/>
+            <a:ext cx="4667479" cy="1554415"/>
+          </a:xfrm>
+          <a:prstGeom prst="rect">
+            <a:avLst/>
+          </a:prstGeom>
+        </p:spPr>
+      </p:pic>
+      <p:sp>
+        <p:nvSpPr>
+          <p:cNvPr id="10" name="TextBox 9">
+            <a:extLst>
+              <a:ext uri="{FF2B5EF4-FFF2-40B4-BE49-F238E27FC236}">
+                <a16:creationId xmlns:a16="http://schemas.microsoft.com/office/drawing/2014/main" id="{E0A8A267-3110-BA46-B7F2-6E612E89F7CE}"/>
+              </a:ext>
+            </a:extLst>
+          </p:cNvPr>
+          <p:cNvSpPr txBox="1"/>
+          <p:nvPr/>
+        </p:nvSpPr>
+        <p:spPr>
+          <a:xfrm>
+            <a:off x="6096000" y="1711095"/>
+            <a:ext cx="5267325" cy="3200876"/>
+          </a:xfrm>
+          <a:prstGeom prst="rect">
+            <a:avLst/>
+          </a:prstGeom>
+          <a:noFill/>
+        </p:spPr>
+        <p:txBody>
+          <a:bodyPr wrap="square" rtlCol="0">
+            <a:spAutoFit/>
+          </a:bodyPr>
+          <a:lstStyle/>
+          <a:p>
+            <a:pPr marL="285750" indent="-285750">
+              <a:buFont typeface="Courier New" panose="02070309020205020404" pitchFamily="49" charset="0"/>
+              <a:buChar char="o"/>
+            </a:pPr>
+            <a:r>
+              <a:rPr lang="en-US" sz="1400" dirty="0"/>
+              <a:t>Six demographic characteristics were screened and identified as possible potential factors to housing prices: education level, family size, number of households, crime score, air quality score, and average expenditure</a:t>
+            </a:r>
+          </a:p>
+          <a:p>
+            <a:pPr marL="285750" indent="-285750">
+              <a:buFont typeface="Courier New" panose="02070309020205020404" pitchFamily="49" charset="0"/>
+              <a:buChar char="o"/>
+            </a:pPr>
+            <a:endParaRPr lang="en-US" sz="1400" dirty="0"/>
+          </a:p>
+          <a:p>
+            <a:pPr marL="285750" indent="-285750">
+              <a:buFont typeface="Courier New" panose="02070309020205020404" pitchFamily="49" charset="0"/>
+              <a:buChar char="o"/>
+            </a:pPr>
+            <a:r>
+              <a:rPr lang="en-US" sz="1400" dirty="0"/>
+              <a:t>There are 108 zip code areas in Atlanta, and we were able to extract 7 zip codes/run. The data were stored in an excel file, which we planned to export as csv format and run analyses. Unfortunately, the 21 cases which we were able to pull is insufficient to generate meaningful results</a:t>
+            </a:r>
+          </a:p>
+          <a:p>
+            <a:endParaRPr lang="en-US" sz="1600" dirty="0"/>
+          </a:p>
+          <a:p>
+            <a:pPr marL="285750" indent="-285750">
+              <a:buFont typeface="Courier New" panose="02070309020205020404" pitchFamily="49" charset="0"/>
+              <a:buChar char="o"/>
+            </a:pPr>
+            <a:endParaRPr lang="en-US" sz="1600" dirty="0"/>
+          </a:p>
+          <a:p>
+            <a:pPr marL="285750" indent="-285750">
+              <a:buFont typeface="Courier New" panose="02070309020205020404" pitchFamily="49" charset="0"/>
+              <a:buChar char="o"/>
+            </a:pPr>
+            <a:endParaRPr lang="en-US" sz="1600" dirty="0"/>
           </a:p>
         </p:txBody>
       </p:sp>
     </p:spTree>
     <p:extLst>
       <p:ext uri="{BB962C8B-B14F-4D97-AF65-F5344CB8AC3E}">
-        <p14:creationId xmlns:p14="http://schemas.microsoft.com/office/powerpoint/2010/main" val="3273078692"/>
+        <p14:creationId xmlns:p14="http://schemas.microsoft.com/office/powerpoint/2010/main" val="63551211"/>
       </p:ext>
     </p:extLst>
   </p:cSld>
@@ -8341,10 +8894,10 @@
       </p:grpSpPr>
       <p:sp>
         <p:nvSpPr>
-          <p:cNvPr id="2" name="Title 1">
+          <p:cNvPr id="4" name="Title 3">
             <a:extLst>
               <a:ext uri="{FF2B5EF4-FFF2-40B4-BE49-F238E27FC236}">
-                <a16:creationId xmlns:a16="http://schemas.microsoft.com/office/drawing/2014/main" id="{13934363-2F03-4422-B996-F499D6A560E2}"/>
+                <a16:creationId xmlns:a16="http://schemas.microsoft.com/office/drawing/2014/main" id="{1DC3E42C-322F-4668-B91D-29559CA77912}"/>
               </a:ext>
             </a:extLst>
           </p:cNvPr>
@@ -8363,130 +8916,6 @@
             <a:r>
               <a:rPr lang="en-US" dirty="0"/>
               <a:t>Data Analysis</a:t>
-            </a:r>
-          </a:p>
-        </p:txBody>
-      </p:sp>
-      <p:sp>
-        <p:nvSpPr>
-          <p:cNvPr id="3" name="Content Placeholder 2">
-            <a:extLst>
-              <a:ext uri="{FF2B5EF4-FFF2-40B4-BE49-F238E27FC236}">
-                <a16:creationId xmlns:a16="http://schemas.microsoft.com/office/drawing/2014/main" id="{B5D5F71B-9D32-4663-A240-D664E71BE9A4}"/>
-              </a:ext>
-            </a:extLst>
-          </p:cNvPr>
-          <p:cNvSpPr>
-            <a:spLocks noGrp="1"/>
-          </p:cNvSpPr>
-          <p:nvPr>
-            <p:ph idx="1"/>
-          </p:nvPr>
-        </p:nvSpPr>
-        <p:spPr>
-          <a:xfrm>
-            <a:off x="1066800" y="2103120"/>
-            <a:ext cx="6506049" cy="3849624"/>
-          </a:xfrm>
-        </p:spPr>
-        <p:txBody>
-          <a:bodyPr>
-            <a:normAutofit/>
-          </a:bodyPr>
-          <a:lstStyle/>
-          <a:p>
-            <a:r>
-              <a:rPr lang="en-US" sz="2200" dirty="0"/>
-              <a:t>Graphical analysis was primarily done with Matplotlib</a:t>
-            </a:r>
-          </a:p>
-          <a:p>
-            <a:r>
-              <a:rPr lang="en-US" sz="2200" dirty="0"/>
-              <a:t>There were many different ways to visualize our data, and this helped us to view the data from different points of view (scatter plots, line graphs, boxplots, </a:t>
-            </a:r>
-            <a:r>
-              <a:rPr lang="en-US" sz="2200" dirty="0" err="1"/>
-              <a:t>etc</a:t>
-            </a:r>
-            <a:r>
-              <a:rPr lang="en-US" sz="2200" dirty="0"/>
-              <a:t>).</a:t>
-            </a:r>
-          </a:p>
-        </p:txBody>
-      </p:sp>
-      <p:pic>
-        <p:nvPicPr>
-          <p:cNvPr id="1026" name="Picture 2" descr="Image result for data analysis&quot;">
-            <a:extLst>
-              <a:ext uri="{FF2B5EF4-FFF2-40B4-BE49-F238E27FC236}">
-                <a16:creationId xmlns:a16="http://schemas.microsoft.com/office/drawing/2014/main" id="{4CE6AF1B-980A-44BD-A529-BDE3542A3135}"/>
-              </a:ext>
-            </a:extLst>
-          </p:cNvPr>
-          <p:cNvPicPr>
-            <a:picLocks noChangeAspect="1" noChangeArrowheads="1"/>
-          </p:cNvPicPr>
-          <p:nvPr/>
-        </p:nvPicPr>
-        <p:blipFill>
-          <a:blip r:embed="rId2">
-            <a:extLst>
-              <a:ext uri="{28A0092B-C50C-407E-A947-70E740481C1C}">
-                <a14:useLocalDpi xmlns:a14="http://schemas.microsoft.com/office/drawing/2010/main" val="0"/>
-              </a:ext>
-            </a:extLst>
-          </a:blip>
-          <a:srcRect/>
-          <a:stretch>
-            <a:fillRect/>
-          </a:stretch>
-        </p:blipFill>
-        <p:spPr bwMode="auto">
-          <a:xfrm>
-            <a:off x="7945703" y="2484288"/>
-            <a:ext cx="3414619" cy="1889423"/>
-          </a:xfrm>
-          <a:prstGeom prst="rect">
-            <a:avLst/>
-          </a:prstGeom>
-          <a:noFill/>
-          <a:extLst>
-            <a:ext uri="{909E8E84-426E-40DD-AFC4-6F175D3DCCD1}">
-              <a14:hiddenFill xmlns:a14="http://schemas.microsoft.com/office/drawing/2010/main">
-                <a:solidFill>
-                  <a:srgbClr val="FFFFFF"/>
-                </a:solidFill>
-              </a14:hiddenFill>
-            </a:ext>
-          </a:extLst>
-        </p:spPr>
-      </p:pic>
-      <p:sp>
-        <p:nvSpPr>
-          <p:cNvPr id="4" name="Footer Placeholder 3">
-            <a:extLst>
-              <a:ext uri="{FF2B5EF4-FFF2-40B4-BE49-F238E27FC236}">
-                <a16:creationId xmlns:a16="http://schemas.microsoft.com/office/drawing/2014/main" id="{7AD0A7BA-3E50-48E7-8239-307EA7BA1307}"/>
-              </a:ext>
-            </a:extLst>
-          </p:cNvPr>
-          <p:cNvSpPr>
-            <a:spLocks noGrp="1"/>
-          </p:cNvSpPr>
-          <p:nvPr>
-            <p:ph type="ftr" sz="quarter" idx="11"/>
-          </p:nvPr>
-        </p:nvSpPr>
-        <p:spPr/>
-        <p:txBody>
-          <a:bodyPr/>
-          <a:lstStyle/>
-          <a:p>
-            <a:r>
-              <a:rPr lang="en-US" dirty="0"/>
-              <a:t>Image from Towards Data Science</a:t>
             </a:r>
           </a:p>
         </p:txBody>
@@ -8494,7 +8923,7 @@
     </p:spTree>
     <p:extLst>
       <p:ext uri="{BB962C8B-B14F-4D97-AF65-F5344CB8AC3E}">
-        <p14:creationId xmlns:p14="http://schemas.microsoft.com/office/powerpoint/2010/main" val="3918945532"/>
+        <p14:creationId xmlns:p14="http://schemas.microsoft.com/office/powerpoint/2010/main" val="3273078692"/>
       </p:ext>
     </p:extLst>
   </p:cSld>
@@ -8526,7 +8955,7 @@
           <p:cNvPr id="2" name="Title 1">
             <a:extLst>
               <a:ext uri="{FF2B5EF4-FFF2-40B4-BE49-F238E27FC236}">
-                <a16:creationId xmlns:a16="http://schemas.microsoft.com/office/drawing/2014/main" id="{1BADF701-516A-4587-9D12-EC8C959DBBAB}"/>
+                <a16:creationId xmlns:a16="http://schemas.microsoft.com/office/drawing/2014/main" id="{13934363-2F03-4422-B996-F499D6A560E2}"/>
               </a:ext>
             </a:extLst>
           </p:cNvPr>
@@ -8544,17 +8973,17 @@
           <a:p>
             <a:r>
               <a:rPr lang="en-US" dirty="0"/>
-              <a:t>Home Price Trends</a:t>
-            </a:r>
-          </a:p>
-        </p:txBody>
-      </p:sp>
-      <p:sp>
-        <p:nvSpPr>
-          <p:cNvPr id="5" name="Footer Placeholder 3">
+              <a:t>Data Analysis</a:t>
+            </a:r>
+          </a:p>
+        </p:txBody>
+      </p:sp>
+      <p:sp>
+        <p:nvSpPr>
+          <p:cNvPr id="3" name="Content Placeholder 2">
             <a:extLst>
               <a:ext uri="{FF2B5EF4-FFF2-40B4-BE49-F238E27FC236}">
-                <a16:creationId xmlns:a16="http://schemas.microsoft.com/office/drawing/2014/main" id="{841CB834-96E4-4B62-A77E-A586B97A928D}"/>
+                <a16:creationId xmlns:a16="http://schemas.microsoft.com/office/drawing/2014/main" id="{B5D5F71B-9D32-4663-A240-D664E71BE9A4}"/>
               </a:ext>
             </a:extLst>
           </p:cNvPr>
@@ -8562,105 +8991,121 @@
             <a:spLocks noGrp="1"/>
           </p:cNvSpPr>
           <p:nvPr>
-            <p:ph type="ftr" sz="quarter" idx="11"/>
+            <p:ph idx="1"/>
           </p:nvPr>
         </p:nvSpPr>
         <p:spPr>
           <a:xfrm>
-            <a:off x="1066800" y="6035040"/>
-            <a:ext cx="5816600" cy="365760"/>
-          </a:xfrm>
-        </p:spPr>
-        <p:txBody>
-          <a:bodyPr/>
-          <a:lstStyle/>
-          <a:p>
-            <a:r>
-              <a:rPr lang="en-US" dirty="0"/>
-              <a:t>Zillow Research Data</a:t>
-            </a:r>
-          </a:p>
-        </p:txBody>
-      </p:sp>
-      <p:sp>
-        <p:nvSpPr>
-          <p:cNvPr id="4" name="TextBox 3">
-            <a:extLst>
-              <a:ext uri="{FF2B5EF4-FFF2-40B4-BE49-F238E27FC236}">
-                <a16:creationId xmlns:a16="http://schemas.microsoft.com/office/drawing/2014/main" id="{C3FC4256-7289-4FA5-8446-CC27BBE8471A}"/>
-              </a:ext>
-            </a:extLst>
-          </p:cNvPr>
-          <p:cNvSpPr txBox="1"/>
-          <p:nvPr/>
-        </p:nvSpPr>
-        <p:spPr>
-          <a:xfrm>
-            <a:off x="8815473" y="3197661"/>
-            <a:ext cx="2732249" cy="1477328"/>
-          </a:xfrm>
-          <a:prstGeom prst="rect">
-            <a:avLst/>
-          </a:prstGeom>
-          <a:solidFill>
-            <a:schemeClr val="tx1">
-              <a:lumMod val="65000"/>
-              <a:lumOff val="35000"/>
-            </a:schemeClr>
-          </a:solidFill>
-        </p:spPr>
-        <p:txBody>
-          <a:bodyPr wrap="square" rtlCol="0">
-            <a:spAutoFit/>
+            <a:off x="1066800" y="2103120"/>
+            <a:ext cx="6506049" cy="3849624"/>
+          </a:xfrm>
+        </p:spPr>
+        <p:txBody>
+          <a:bodyPr>
+            <a:normAutofit/>
           </a:bodyPr>
           <a:lstStyle/>
           <a:p>
-            <a:pPr algn="ctr"/>
-            <a:r>
-              <a:rPr lang="en-US" dirty="0">
-                <a:solidFill>
-                  <a:schemeClr val="bg1"/>
-                </a:solidFill>
-              </a:rPr>
-              <a:t>Across cities in Georgia, we have seen home price increase steadily over the previous 5 years</a:t>
+            <a:r>
+              <a:rPr lang="en-US" sz="2200" dirty="0"/>
+              <a:t>Graphical analysis was primarily done with Matplotlib</a:t>
+            </a:r>
+          </a:p>
+          <a:p>
+            <a:r>
+              <a:rPr lang="en-US" sz="2200" dirty="0"/>
+              <a:t>There were many different ways to visualize our data, and this helped us to view the data from different points of view (scatter plots, line graphs, boxplots, </a:t>
+            </a:r>
+            <a:r>
+              <a:rPr lang="en-US" sz="2200" dirty="0" err="1"/>
+              <a:t>etc</a:t>
+            </a:r>
+            <a:r>
+              <a:rPr lang="en-US" sz="2200" dirty="0"/>
+              <a:t>).</a:t>
             </a:r>
           </a:p>
         </p:txBody>
       </p:sp>
       <p:pic>
         <p:nvPicPr>
-          <p:cNvPr id="7" name="Picture 6">
+          <p:cNvPr id="1026" name="Picture 2" descr="Image result for data analysis&quot;">
             <a:extLst>
               <a:ext uri="{FF2B5EF4-FFF2-40B4-BE49-F238E27FC236}">
-                <a16:creationId xmlns:a16="http://schemas.microsoft.com/office/drawing/2014/main" id="{B1A9E593-D102-4ACF-A934-68D0EA5A7D89}"/>
+                <a16:creationId xmlns:a16="http://schemas.microsoft.com/office/drawing/2014/main" id="{4CE6AF1B-980A-44BD-A529-BDE3542A3135}"/>
               </a:ext>
             </a:extLst>
           </p:cNvPr>
           <p:cNvPicPr>
-            <a:picLocks noChangeAspect="1"/>
+            <a:picLocks noChangeAspect="1" noChangeArrowheads="1"/>
           </p:cNvPicPr>
           <p:nvPr/>
         </p:nvPicPr>
         <p:blipFill>
-          <a:blip r:embed="rId2"/>
+          <a:blip r:embed="rId2">
+            <a:extLst>
+              <a:ext uri="{28A0092B-C50C-407E-A947-70E740481C1C}">
+                <a14:useLocalDpi xmlns:a14="http://schemas.microsoft.com/office/drawing/2010/main" val="0"/>
+              </a:ext>
+            </a:extLst>
+          </a:blip>
+          <a:srcRect/>
           <a:stretch>
             <a:fillRect/>
           </a:stretch>
         </p:blipFill>
-        <p:spPr>
-          <a:xfrm>
-            <a:off x="1066800" y="1926973"/>
-            <a:ext cx="7474023" cy="4195289"/>
+        <p:spPr bwMode="auto">
+          <a:xfrm>
+            <a:off x="7945703" y="2484288"/>
+            <a:ext cx="3414619" cy="1889423"/>
           </a:xfrm>
           <a:prstGeom prst="rect">
             <a:avLst/>
           </a:prstGeom>
+          <a:noFill/>
+          <a:extLst>
+            <a:ext uri="{909E8E84-426E-40DD-AFC4-6F175D3DCCD1}">
+              <a14:hiddenFill xmlns:a14="http://schemas.microsoft.com/office/drawing/2010/main">
+                <a:solidFill>
+                  <a:srgbClr val="FFFFFF"/>
+                </a:solidFill>
+              </a14:hiddenFill>
+            </a:ext>
+          </a:extLst>
         </p:spPr>
       </p:pic>
+      <p:sp>
+        <p:nvSpPr>
+          <p:cNvPr id="4" name="Footer Placeholder 3">
+            <a:extLst>
+              <a:ext uri="{FF2B5EF4-FFF2-40B4-BE49-F238E27FC236}">
+                <a16:creationId xmlns:a16="http://schemas.microsoft.com/office/drawing/2014/main" id="{7AD0A7BA-3E50-48E7-8239-307EA7BA1307}"/>
+              </a:ext>
+            </a:extLst>
+          </p:cNvPr>
+          <p:cNvSpPr>
+            <a:spLocks noGrp="1"/>
+          </p:cNvSpPr>
+          <p:nvPr>
+            <p:ph type="ftr" sz="quarter" idx="11"/>
+          </p:nvPr>
+        </p:nvSpPr>
+        <p:spPr/>
+        <p:txBody>
+          <a:bodyPr/>
+          <a:lstStyle/>
+          <a:p>
+            <a:r>
+              <a:rPr lang="en-US" dirty="0"/>
+              <a:t>Image from Towards Data Science</a:t>
+            </a:r>
+          </a:p>
+        </p:txBody>
+      </p:sp>
     </p:spTree>
     <p:extLst>
       <p:ext uri="{BB962C8B-B14F-4D97-AF65-F5344CB8AC3E}">
-        <p14:creationId xmlns:p14="http://schemas.microsoft.com/office/powerpoint/2010/main" val="3707654863"/>
+        <p14:creationId xmlns:p14="http://schemas.microsoft.com/office/powerpoint/2010/main" val="3918945532"/>
       </p:ext>
     </p:extLst>
   </p:cSld>
@@ -8692,7 +9137,7 @@
           <p:cNvPr id="2" name="Title 1">
             <a:extLst>
               <a:ext uri="{FF2B5EF4-FFF2-40B4-BE49-F238E27FC236}">
-                <a16:creationId xmlns:a16="http://schemas.microsoft.com/office/drawing/2014/main" id="{318BCF67-E019-4BB8-9AB2-F752B055A462}"/>
+                <a16:creationId xmlns:a16="http://schemas.microsoft.com/office/drawing/2014/main" id="{1BADF701-516A-4587-9D12-EC8C959DBBAB}"/>
               </a:ext>
             </a:extLst>
           </p:cNvPr>
@@ -8710,17 +9155,17 @@
           <a:p>
             <a:r>
               <a:rPr lang="en-US" dirty="0"/>
-              <a:t>Hold for income slides (Tara)</a:t>
-            </a:r>
-          </a:p>
-        </p:txBody>
-      </p:sp>
-      <p:sp>
-        <p:nvSpPr>
-          <p:cNvPr id="3" name="Content Placeholder 2">
+              <a:t>Home Price Trends</a:t>
+            </a:r>
+          </a:p>
+        </p:txBody>
+      </p:sp>
+      <p:sp>
+        <p:nvSpPr>
+          <p:cNvPr id="5" name="Footer Placeholder 3">
             <a:extLst>
               <a:ext uri="{FF2B5EF4-FFF2-40B4-BE49-F238E27FC236}">
-                <a16:creationId xmlns:a16="http://schemas.microsoft.com/office/drawing/2014/main" id="{09E687BB-9B1F-4761-9687-D185921068FE}"/>
+                <a16:creationId xmlns:a16="http://schemas.microsoft.com/office/drawing/2014/main" id="{841CB834-96E4-4B62-A77E-A586B97A928D}"/>
               </a:ext>
             </a:extLst>
           </p:cNvPr>
@@ -8728,22 +9173,105 @@
             <a:spLocks noGrp="1"/>
           </p:cNvSpPr>
           <p:nvPr>
-            <p:ph idx="1"/>
-          </p:nvPr>
-        </p:nvSpPr>
-        <p:spPr/>
+            <p:ph type="ftr" sz="quarter" idx="11"/>
+          </p:nvPr>
+        </p:nvSpPr>
+        <p:spPr>
+          <a:xfrm>
+            <a:off x="1066800" y="6035040"/>
+            <a:ext cx="5816600" cy="365760"/>
+          </a:xfrm>
+        </p:spPr>
         <p:txBody>
           <a:bodyPr/>
           <a:lstStyle/>
           <a:p>
-            <a:endParaRPr lang="en-US"/>
-          </a:p>
-        </p:txBody>
-      </p:sp>
+            <a:r>
+              <a:rPr lang="en-US" dirty="0"/>
+              <a:t>Zillow Research Data</a:t>
+            </a:r>
+          </a:p>
+        </p:txBody>
+      </p:sp>
+      <p:sp>
+        <p:nvSpPr>
+          <p:cNvPr id="4" name="TextBox 3">
+            <a:extLst>
+              <a:ext uri="{FF2B5EF4-FFF2-40B4-BE49-F238E27FC236}">
+                <a16:creationId xmlns:a16="http://schemas.microsoft.com/office/drawing/2014/main" id="{C3FC4256-7289-4FA5-8446-CC27BBE8471A}"/>
+              </a:ext>
+            </a:extLst>
+          </p:cNvPr>
+          <p:cNvSpPr txBox="1"/>
+          <p:nvPr/>
+        </p:nvSpPr>
+        <p:spPr>
+          <a:xfrm>
+            <a:off x="8815473" y="3197661"/>
+            <a:ext cx="2732249" cy="1477328"/>
+          </a:xfrm>
+          <a:prstGeom prst="rect">
+            <a:avLst/>
+          </a:prstGeom>
+          <a:solidFill>
+            <a:schemeClr val="tx1">
+              <a:lumMod val="65000"/>
+              <a:lumOff val="35000"/>
+            </a:schemeClr>
+          </a:solidFill>
+        </p:spPr>
+        <p:txBody>
+          <a:bodyPr wrap="square" rtlCol="0">
+            <a:spAutoFit/>
+          </a:bodyPr>
+          <a:lstStyle/>
+          <a:p>
+            <a:pPr algn="ctr"/>
+            <a:r>
+              <a:rPr lang="en-US" dirty="0">
+                <a:solidFill>
+                  <a:schemeClr val="bg1"/>
+                </a:solidFill>
+              </a:rPr>
+              <a:t>Across cities in Georgia, we have seen home price increase steadily over the previous 5 years</a:t>
+            </a:r>
+          </a:p>
+        </p:txBody>
+      </p:sp>
+      <p:pic>
+        <p:nvPicPr>
+          <p:cNvPr id="7" name="Picture 6">
+            <a:extLst>
+              <a:ext uri="{FF2B5EF4-FFF2-40B4-BE49-F238E27FC236}">
+                <a16:creationId xmlns:a16="http://schemas.microsoft.com/office/drawing/2014/main" id="{B1A9E593-D102-4ACF-A934-68D0EA5A7D89}"/>
+              </a:ext>
+            </a:extLst>
+          </p:cNvPr>
+          <p:cNvPicPr>
+            <a:picLocks noChangeAspect="1"/>
+          </p:cNvPicPr>
+          <p:nvPr/>
+        </p:nvPicPr>
+        <p:blipFill>
+          <a:blip r:embed="rId2"/>
+          <a:stretch>
+            <a:fillRect/>
+          </a:stretch>
+        </p:blipFill>
+        <p:spPr>
+          <a:xfrm>
+            <a:off x="1066800" y="1926973"/>
+            <a:ext cx="7474023" cy="4195289"/>
+          </a:xfrm>
+          <a:prstGeom prst="rect">
+            <a:avLst/>
+          </a:prstGeom>
+        </p:spPr>
+      </p:pic>
     </p:spTree>
     <p:extLst>
       <p:ext uri="{BB962C8B-B14F-4D97-AF65-F5344CB8AC3E}">
-        <p14:creationId xmlns:p14="http://schemas.microsoft.com/office/powerpoint/2010/main" val="2593583500"/>
+        <p14:creationId xmlns:p14="http://schemas.microsoft.com/office/powerpoint/2010/main" val="3707654863"/>
       </p:ext>
     </p:extLst>
   </p:cSld>

</xml_diff>